<commit_message>
Adding slides for ut, logic apps and event grid
</commit_message>
<xml_diff>
--- a/AzureDay2019/Developing services with Azure Functions.pptx
+++ b/AzureDay2019/Developing services with Azure Functions.pptx
@@ -44,6 +44,30 @@
     <p:sldId id="292" r:id="rId38"/>
     <p:sldId id="293" r:id="rId39"/>
     <p:sldId id="294" r:id="rId40"/>
+    <p:sldId id="303" r:id="rId41"/>
+    <p:sldId id="295" r:id="rId42"/>
+    <p:sldId id="296" r:id="rId43"/>
+    <p:sldId id="297" r:id="rId44"/>
+    <p:sldId id="298" r:id="rId45"/>
+    <p:sldId id="299" r:id="rId46"/>
+    <p:sldId id="300" r:id="rId47"/>
+    <p:sldId id="301" r:id="rId48"/>
+    <p:sldId id="302" r:id="rId49"/>
+    <p:sldId id="304" r:id="rId50"/>
+    <p:sldId id="308" r:id="rId51"/>
+    <p:sldId id="315" r:id="rId52"/>
+    <p:sldId id="311" r:id="rId53"/>
+    <p:sldId id="312" r:id="rId54"/>
+    <p:sldId id="309" r:id="rId55"/>
+    <p:sldId id="310" r:id="rId56"/>
+    <p:sldId id="314" r:id="rId57"/>
+    <p:sldId id="313" r:id="rId58"/>
+    <p:sldId id="306" r:id="rId59"/>
+    <p:sldId id="305" r:id="rId60"/>
+    <p:sldId id="316" r:id="rId61"/>
+    <p:sldId id="317" r:id="rId62"/>
+    <p:sldId id="318" r:id="rId63"/>
+    <p:sldId id="307" r:id="rId64"/>
   </p:sldIdLst>
   <p:sldSz cx="12192000" cy="6858000"/>
   <p:notesSz cx="6858000" cy="9144000"/>
@@ -245,7 +269,7 @@
           <a:effectLst/>
           <a:extLst>
             <a:ext uri="{91240B29-F687-4f45-9708-019B960494DF}">
-              <a14:hiddenLine xmlns="" xmlns:a14="http://schemas.microsoft.com/office/drawing/2010/main" w="9525">
+              <a14:hiddenLine xmlns:a14="http://schemas.microsoft.com/office/drawing/2010/main" xmlns="" w="9525">
                 <a:solidFill>
                   <a:srgbClr val="000000"/>
                 </a:solidFill>
@@ -438,7 +462,7 @@
             <a:fld id="{08B9EBBA-996F-894A-B54A-D6246ED52CEA}" type="datetimeFigureOut">
               <a:rPr lang="en-US" dirty="0"/>
               <a:pPr/>
-              <a:t>3/24/2019</a:t>
+              <a:t>3/26/19</a:t>
             </a:fld>
             <a:endParaRPr lang="en-US" dirty="0"/>
           </a:p>
@@ -753,7 +777,7 @@
             <a:fld id="{18C79C5D-2A6F-F04D-97DA-BEF2467B64E4}" type="datetimeFigureOut">
               <a:rPr lang="en-US" dirty="0"/>
               <a:pPr/>
-              <a:t>3/24/2019</a:t>
+              <a:t>3/26/19</a:t>
             </a:fld>
             <a:endParaRPr lang="en-US" dirty="0"/>
           </a:p>
@@ -1238,7 +1262,7 @@
             <a:fld id="{8DFA1846-DA80-1C48-A609-854EA85C59AD}" type="datetimeFigureOut">
               <a:rPr lang="en-US" dirty="0"/>
               <a:pPr/>
-              <a:t>3/24/2019</a:t>
+              <a:t>3/26/19</a:t>
             </a:fld>
             <a:endParaRPr lang="en-US" dirty="0"/>
           </a:p>
@@ -1604,7 +1628,7 @@
             <a:fld id="{FBF54567-0DE4-3F47-BF90-CB84690072F9}" type="datetimeFigureOut">
               <a:rPr lang="en-US" dirty="0"/>
               <a:pPr/>
-              <a:t>3/24/2019</a:t>
+              <a:t>3/26/19</a:t>
             </a:fld>
             <a:endParaRPr lang="en-US" dirty="0"/>
           </a:p>
@@ -1755,7 +1779,7 @@
           <a:ln/>
           <a:extLst>
             <a:ext uri="{91240B29-F687-4f45-9708-019B960494DF}">
-              <a14:hiddenLine xmlns="" xmlns:a14="http://schemas.microsoft.com/office/drawing/2010/main" w="9525">
+              <a14:hiddenLine xmlns:a14="http://schemas.microsoft.com/office/drawing/2010/main" xmlns="" w="9525">
                 <a:solidFill>
                   <a:srgbClr val="000000"/>
                 </a:solidFill>
@@ -1874,7 +1898,7 @@
             <a:fld id="{C6C52C72-DE31-F449-A4ED-4C594FD91407}" type="datetimeFigureOut">
               <a:rPr lang="en-US" dirty="0"/>
               <a:pPr/>
-              <a:t>3/24/2019</a:t>
+              <a:t>3/26/19</a:t>
             </a:fld>
             <a:endParaRPr lang="en-US" dirty="0"/>
           </a:p>
@@ -2027,7 +2051,7 @@
           <a:ln/>
           <a:extLst>
             <a:ext uri="{91240B29-F687-4f45-9708-019B960494DF}">
-              <a14:hiddenLine xmlns="" xmlns:a14="http://schemas.microsoft.com/office/drawing/2010/main" w="9525">
+              <a14:hiddenLine xmlns:a14="http://schemas.microsoft.com/office/drawing/2010/main" xmlns="" w="9525">
                 <a:solidFill>
                   <a:srgbClr val="000000"/>
                 </a:solidFill>
@@ -2156,7 +2180,7 @@
             <a:fld id="{ED62726E-379B-B349-9EED-81ED093FA806}" type="datetimeFigureOut">
               <a:rPr lang="en-US" dirty="0"/>
               <a:pPr/>
-              <a:t>3/24/2019</a:t>
+              <a:t>3/26/19</a:t>
             </a:fld>
             <a:endParaRPr lang="en-US" dirty="0"/>
           </a:p>
@@ -2307,7 +2331,7 @@
           <a:ln/>
           <a:extLst>
             <a:ext uri="{91240B29-F687-4f45-9708-019B960494DF}">
-              <a14:hiddenLine xmlns="" xmlns:a14="http://schemas.microsoft.com/office/drawing/2010/main" w="9525">
+              <a14:hiddenLine xmlns:a14="http://schemas.microsoft.com/office/drawing/2010/main" xmlns="" w="9525">
                 <a:solidFill>
                   <a:srgbClr val="000000"/>
                 </a:solidFill>
@@ -2436,7 +2460,7 @@
             <a:fld id="{9B3A1323-8D79-1946-B0D7-40001CF92E9D}" type="datetimeFigureOut">
               <a:rPr lang="en-US" dirty="0"/>
               <a:pPr/>
-              <a:t>3/24/2019</a:t>
+              <a:t>3/26/19</a:t>
             </a:fld>
             <a:endParaRPr lang="en-US" dirty="0"/>
           </a:p>
@@ -2776,7 +2800,7 @@
             <a:fld id="{8DFA1846-DA80-1C48-A609-854EA85C59AD}" type="datetimeFigureOut">
               <a:rPr lang="en-US" dirty="0"/>
               <a:pPr/>
-              <a:t>3/24/2019</a:t>
+              <a:t>3/26/19</a:t>
             </a:fld>
             <a:endParaRPr lang="en-US" dirty="0"/>
           </a:p>
@@ -2927,7 +2951,7 @@
           <a:ln/>
           <a:extLst>
             <a:ext uri="{91240B29-F687-4f45-9708-019B960494DF}">
-              <a14:hiddenLine xmlns="" xmlns:a14="http://schemas.microsoft.com/office/drawing/2010/main" w="9525">
+              <a14:hiddenLine xmlns:a14="http://schemas.microsoft.com/office/drawing/2010/main" xmlns="" w="9525">
                 <a:solidFill>
                   <a:srgbClr val="000000"/>
                 </a:solidFill>
@@ -3112,7 +3136,7 @@
             <a:fld id="{57302355-E14B-8545-A8F8-0FE83CC9D524}" type="datetimeFigureOut">
               <a:rPr lang="en-US" dirty="0"/>
               <a:pPr/>
-              <a:t>3/24/2019</a:t>
+              <a:t>3/26/19</a:t>
             </a:fld>
             <a:endParaRPr lang="en-US" dirty="0"/>
           </a:p>
@@ -3263,7 +3287,7 @@
           <a:ln/>
           <a:extLst>
             <a:ext uri="{91240B29-F687-4f45-9708-019B960494DF}">
-              <a14:hiddenLine xmlns="" xmlns:a14="http://schemas.microsoft.com/office/drawing/2010/main" w="9525">
+              <a14:hiddenLine xmlns:a14="http://schemas.microsoft.com/office/drawing/2010/main" xmlns="" w="9525">
                 <a:solidFill>
                   <a:srgbClr val="000000"/>
                 </a:solidFill>
@@ -3586,7 +3610,7 @@
             <a:fld id="{02640F58-564D-2B4F-AE67-E407BA4FCF45}" type="datetimeFigureOut">
               <a:rPr lang="en-US" dirty="0"/>
               <a:pPr/>
-              <a:t>3/24/2019</a:t>
+              <a:t>3/26/19</a:t>
             </a:fld>
             <a:endParaRPr lang="en-US" dirty="0"/>
           </a:p>
@@ -3737,7 +3761,7 @@
           <a:ln/>
           <a:extLst>
             <a:ext uri="{91240B29-F687-4f45-9708-019B960494DF}">
-              <a14:hiddenLine xmlns="" xmlns:a14="http://schemas.microsoft.com/office/drawing/2010/main" w="9525">
+              <a14:hiddenLine xmlns:a14="http://schemas.microsoft.com/office/drawing/2010/main" xmlns="" w="9525">
                 <a:solidFill>
                   <a:srgbClr val="000000"/>
                 </a:solidFill>
@@ -3804,7 +3828,7 @@
             <a:fld id="{F13A34C8-038E-2045-AF43-DF7DBB8E0E9E}" type="datetimeFigureOut">
               <a:rPr lang="en-US" dirty="0"/>
               <a:pPr/>
-              <a:t>3/24/2019</a:t>
+              <a:t>3/26/19</a:t>
             </a:fld>
             <a:endParaRPr lang="en-US" dirty="0"/>
           </a:p>
@@ -3896,7 +3920,7 @@
             <a:fld id="{8818C68F-D26B-8F47-958C-23B49CF8A634}" type="datetimeFigureOut">
               <a:rPr lang="en-US" dirty="0"/>
               <a:pPr/>
-              <a:t>3/24/2019</a:t>
+              <a:t>3/26/19</a:t>
             </a:fld>
             <a:endParaRPr lang="en-US" dirty="0"/>
           </a:p>
@@ -4160,7 +4184,7 @@
           <a:ln/>
           <a:extLst>
             <a:ext uri="{91240B29-F687-4f45-9708-019B960494DF}">
-              <a14:hiddenLine xmlns="" xmlns:a14="http://schemas.microsoft.com/office/drawing/2010/main" w="9525">
+              <a14:hiddenLine xmlns:a14="http://schemas.microsoft.com/office/drawing/2010/main" xmlns="" w="9525">
                 <a:solidFill>
                   <a:srgbClr val="000000"/>
                 </a:solidFill>
@@ -4360,7 +4384,7 @@
             <a:fld id="{D0DF5E60-9974-AC48-9591-99C2BB44B7CF}" type="datetimeFigureOut">
               <a:rPr lang="en-US" dirty="0"/>
               <a:pPr/>
-              <a:t>3/24/2019</a:t>
+              <a:t>3/26/19</a:t>
             </a:fld>
             <a:endParaRPr lang="en-US" dirty="0"/>
           </a:p>
@@ -4670,7 +4694,7 @@
             <a:fld id="{18C79C5D-2A6F-F04D-97DA-BEF2467B64E4}" type="datetimeFigureOut">
               <a:rPr lang="en-US" dirty="0"/>
               <a:pPr/>
-              <a:t>3/24/2019</a:t>
+              <a:t>3/26/19</a:t>
             </a:fld>
             <a:endParaRPr lang="en-US" dirty="0"/>
           </a:p>
@@ -4937,7 +4961,7 @@
             <a:fld id="{09B482E8-6E0E-1B4F-B1FD-C69DB9E858D9}" type="datetimeFigureOut">
               <a:rPr lang="en-US" dirty="0"/>
               <a:pPr/>
-              <a:t>3/24/2019</a:t>
+              <a:t>3/26/19</a:t>
             </a:fld>
             <a:endParaRPr lang="en-US" dirty="0"/>
           </a:p>
@@ -5822,7 +5846,7 @@
           <a:effectLst/>
           <a:extLst>
             <a:ext uri="{91240B29-F687-4f45-9708-019B960494DF}">
-              <a14:hiddenLine xmlns:a16="http://schemas.microsoft.com/office/drawing/2014/main" xmlns:a14="http://schemas.microsoft.com/office/drawing/2010/main" xmlns="" w="9525">
+              <a14:hiddenLine xmlns="" xmlns:a14="http://schemas.microsoft.com/office/drawing/2010/main" xmlns:a16="http://schemas.microsoft.com/office/drawing/2014/main" w="9525">
                 <a:solidFill>
                   <a:srgbClr val="000000"/>
                 </a:solidFill>
@@ -6197,7 +6221,7 @@
           <a:effectLst/>
           <a:extLst>
             <a:ext uri="{91240B29-F687-4f45-9708-019B960494DF}">
-              <a14:hiddenLine xmlns:a14="http://schemas.microsoft.com/office/drawing/2010/main" xmlns:p14="http://schemas.microsoft.com/office/powerpoint/2010/main" xmlns:a16="http://schemas.microsoft.com/office/drawing/2014/main" xmlns="" w="9525">
+              <a14:hiddenLine xmlns="" xmlns:a16="http://schemas.microsoft.com/office/drawing/2014/main" xmlns:p14="http://schemas.microsoft.com/office/powerpoint/2010/main" xmlns:a14="http://schemas.microsoft.com/office/drawing/2010/main" w="9525">
                 <a:solidFill>
                   <a:srgbClr val="000000"/>
                 </a:solidFill>
@@ -6357,7 +6381,7 @@
           </a:ln>
           <a:extLst>
             <a:ext uri="{91240B29-F687-4f45-9708-019B960494DF}">
-              <a14:hiddenLine xmlns:a14="http://schemas.microsoft.com/office/drawing/2010/main" xmlns:p14="http://schemas.microsoft.com/office/powerpoint/2010/main" xmlns:a16="http://schemas.microsoft.com/office/drawing/2014/main" xmlns="" w="9525">
+              <a14:hiddenLine xmlns="" xmlns:a16="http://schemas.microsoft.com/office/drawing/2014/main" xmlns:p14="http://schemas.microsoft.com/office/powerpoint/2010/main" xmlns:a14="http://schemas.microsoft.com/office/drawing/2010/main" w="9525">
                 <a:solidFill>
                   <a:srgbClr val="000000"/>
                 </a:solidFill>
@@ -6618,7 +6642,7 @@
           <a:effectLst/>
           <a:extLst>
             <a:ext uri="{91240B29-F687-4f45-9708-019B960494DF}">
-              <a14:hiddenLine xmlns:a16="http://schemas.microsoft.com/office/drawing/2014/main" xmlns:a14="http://schemas.microsoft.com/office/drawing/2010/main" xmlns="" w="9525">
+              <a14:hiddenLine xmlns="" xmlns:a14="http://schemas.microsoft.com/office/drawing/2010/main" xmlns:a16="http://schemas.microsoft.com/office/drawing/2014/main" w="9525">
                 <a:solidFill>
                   <a:srgbClr val="000000"/>
                 </a:solidFill>
@@ -7094,7 +7118,7 @@
           <a:effectLst/>
           <a:extLst>
             <a:ext uri="{91240B29-F687-4f45-9708-019B960494DF}">
-              <a14:hiddenLine xmlns:a14="http://schemas.microsoft.com/office/drawing/2010/main" xmlns:p14="http://schemas.microsoft.com/office/powerpoint/2010/main" xmlns:a16="http://schemas.microsoft.com/office/drawing/2014/main" xmlns="" w="9525">
+              <a14:hiddenLine xmlns="" xmlns:a16="http://schemas.microsoft.com/office/drawing/2014/main" xmlns:p14="http://schemas.microsoft.com/office/powerpoint/2010/main" xmlns:a14="http://schemas.microsoft.com/office/drawing/2010/main" w="9525">
                 <a:solidFill>
                   <a:srgbClr val="000000"/>
                 </a:solidFill>
@@ -7254,7 +7278,7 @@
           </a:ln>
           <a:extLst>
             <a:ext uri="{91240B29-F687-4f45-9708-019B960494DF}">
-              <a14:hiddenLine xmlns:a14="http://schemas.microsoft.com/office/drawing/2010/main" xmlns:p14="http://schemas.microsoft.com/office/powerpoint/2010/main" xmlns:a16="http://schemas.microsoft.com/office/drawing/2014/main" xmlns="" w="9525">
+              <a14:hiddenLine xmlns="" xmlns:a16="http://schemas.microsoft.com/office/drawing/2014/main" xmlns:p14="http://schemas.microsoft.com/office/powerpoint/2010/main" xmlns:a14="http://schemas.microsoft.com/office/drawing/2010/main" w="9525">
                 <a:solidFill>
                   <a:srgbClr val="000000"/>
                 </a:solidFill>
@@ -7517,7 +7541,7 @@
           <a:effectLst/>
           <a:extLst>
             <a:ext uri="{91240B29-F687-4f45-9708-019B960494DF}">
-              <a14:hiddenLine xmlns:a16="http://schemas.microsoft.com/office/drawing/2014/main" xmlns:a14="http://schemas.microsoft.com/office/drawing/2010/main" xmlns="" w="9525">
+              <a14:hiddenLine xmlns="" xmlns:a14="http://schemas.microsoft.com/office/drawing/2010/main" xmlns:a16="http://schemas.microsoft.com/office/drawing/2014/main" w="9525">
                 <a:solidFill>
                   <a:srgbClr val="000000"/>
                 </a:solidFill>
@@ -7913,7 +7937,7 @@
           <a:effectLst/>
           <a:extLst>
             <a:ext uri="{91240B29-F687-4f45-9708-019B960494DF}">
-              <a14:hiddenLine xmlns:a14="http://schemas.microsoft.com/office/drawing/2010/main" xmlns:p14="http://schemas.microsoft.com/office/powerpoint/2010/main" xmlns:a16="http://schemas.microsoft.com/office/drawing/2014/main" xmlns="" w="9525">
+              <a14:hiddenLine xmlns="" xmlns:a16="http://schemas.microsoft.com/office/drawing/2014/main" xmlns:p14="http://schemas.microsoft.com/office/powerpoint/2010/main" xmlns:a14="http://schemas.microsoft.com/office/drawing/2010/main" w="9525">
                 <a:solidFill>
                   <a:srgbClr val="000000"/>
                 </a:solidFill>
@@ -9129,7 +9153,7 @@
           <a:effectLst/>
           <a:extLst>
             <a:ext uri="{91240B29-F687-4f45-9708-019B960494DF}">
-              <a14:hiddenLine xmlns:a16="http://schemas.microsoft.com/office/drawing/2014/main" xmlns:a14="http://schemas.microsoft.com/office/drawing/2010/main" xmlns="" w="9525">
+              <a14:hiddenLine xmlns="" xmlns:a14="http://schemas.microsoft.com/office/drawing/2010/main" xmlns:a16="http://schemas.microsoft.com/office/drawing/2014/main" w="9525">
                 <a:solidFill>
                   <a:srgbClr val="000000"/>
                 </a:solidFill>
@@ -9577,7 +9601,7 @@
           <a:effectLst/>
           <a:extLst>
             <a:ext uri="{91240B29-F687-4f45-9708-019B960494DF}">
-              <a14:hiddenLine xmlns:a14="http://schemas.microsoft.com/office/drawing/2010/main" xmlns:p14="http://schemas.microsoft.com/office/powerpoint/2010/main" xmlns:a16="http://schemas.microsoft.com/office/drawing/2014/main" xmlns="" w="9525">
+              <a14:hiddenLine xmlns="" xmlns:a16="http://schemas.microsoft.com/office/drawing/2014/main" xmlns:p14="http://schemas.microsoft.com/office/powerpoint/2010/main" xmlns:a14="http://schemas.microsoft.com/office/drawing/2010/main" w="9525">
                 <a:solidFill>
                   <a:srgbClr val="000000"/>
                 </a:solidFill>
@@ -9914,7 +9938,7 @@
           <a:effectLst/>
           <a:extLst>
             <a:ext uri="{91240B29-F687-4f45-9708-019B960494DF}">
-              <a14:hiddenLine xmlns:a16="http://schemas.microsoft.com/office/drawing/2014/main" xmlns:p14="http://schemas.microsoft.com/office/powerpoint/2010/main" xmlns:a14="http://schemas.microsoft.com/office/drawing/2010/main" xmlns="" w="9525">
+              <a14:hiddenLine xmlns="" xmlns:a14="http://schemas.microsoft.com/office/drawing/2010/main" xmlns:p14="http://schemas.microsoft.com/office/powerpoint/2010/main" xmlns:a16="http://schemas.microsoft.com/office/drawing/2014/main" w="9525">
                 <a:solidFill>
                   <a:srgbClr val="000000"/>
                 </a:solidFill>
@@ -10239,7 +10263,7 @@
           </a:ln>
           <a:extLst>
             <a:ext uri="{91240B29-F687-4f45-9708-019B960494DF}">
-              <a14:hiddenLine xmlns:a14="http://schemas.microsoft.com/office/drawing/2010/main" xmlns:p14="http://schemas.microsoft.com/office/powerpoint/2010/main" xmlns:a16="http://schemas.microsoft.com/office/drawing/2014/main" xmlns="" w="9525">
+              <a14:hiddenLine xmlns="" xmlns:a16="http://schemas.microsoft.com/office/drawing/2014/main" xmlns:p14="http://schemas.microsoft.com/office/powerpoint/2010/main" xmlns:a14="http://schemas.microsoft.com/office/drawing/2010/main" w="9525">
                 <a:solidFill>
                   <a:srgbClr val="000000"/>
                 </a:solidFill>
@@ -10996,7 +11020,7 @@
           <a:effectLst/>
           <a:extLst>
             <a:ext uri="{91240B29-F687-4f45-9708-019B960494DF}">
-              <a14:hiddenLine xmlns:a16="http://schemas.microsoft.com/office/drawing/2014/main" xmlns:a14="http://schemas.microsoft.com/office/drawing/2010/main" xmlns="" w="9525">
+              <a14:hiddenLine xmlns="" xmlns:a14="http://schemas.microsoft.com/office/drawing/2010/main" xmlns:a16="http://schemas.microsoft.com/office/drawing/2014/main" w="9525">
                 <a:solidFill>
                   <a:srgbClr val="000000"/>
                 </a:solidFill>
@@ -11440,7 +11464,7 @@
           <a:effectLst/>
           <a:extLst>
             <a:ext uri="{91240B29-F687-4f45-9708-019B960494DF}">
-              <a14:hiddenLine xmlns:a14="http://schemas.microsoft.com/office/drawing/2010/main" xmlns:p14="http://schemas.microsoft.com/office/powerpoint/2010/main" xmlns:a16="http://schemas.microsoft.com/office/drawing/2014/main" xmlns="" w="9525">
+              <a14:hiddenLine xmlns="" xmlns:a16="http://schemas.microsoft.com/office/drawing/2014/main" xmlns:p14="http://schemas.microsoft.com/office/powerpoint/2010/main" xmlns:a14="http://schemas.microsoft.com/office/drawing/2010/main" w="9525">
                 <a:solidFill>
                   <a:srgbClr val="000000"/>
                 </a:solidFill>
@@ -11977,7 +12001,7 @@
           <a:effectLst/>
           <a:extLst>
             <a:ext uri="{91240B29-F687-4f45-9708-019B960494DF}">
-              <a14:hiddenLine xmlns:a16="http://schemas.microsoft.com/office/drawing/2014/main" xmlns:a14="http://schemas.microsoft.com/office/drawing/2010/main" xmlns="" w="9525">
+              <a14:hiddenLine xmlns="" xmlns:a14="http://schemas.microsoft.com/office/drawing/2010/main" xmlns:a16="http://schemas.microsoft.com/office/drawing/2014/main" w="9525">
                 <a:solidFill>
                   <a:srgbClr val="000000"/>
                 </a:solidFill>
@@ -12433,7 +12457,7 @@
           <a:effectLst/>
           <a:extLst>
             <a:ext uri="{91240B29-F687-4f45-9708-019B960494DF}">
-              <a14:hiddenLine xmlns:a14="http://schemas.microsoft.com/office/drawing/2010/main" xmlns:p14="http://schemas.microsoft.com/office/powerpoint/2010/main" xmlns:a16="http://schemas.microsoft.com/office/drawing/2014/main" xmlns="" w="9525">
+              <a14:hiddenLine xmlns="" xmlns:a16="http://schemas.microsoft.com/office/drawing/2014/main" xmlns:p14="http://schemas.microsoft.com/office/powerpoint/2010/main" xmlns:a14="http://schemas.microsoft.com/office/drawing/2010/main" w="9525">
                 <a:solidFill>
                   <a:srgbClr val="000000"/>
                 </a:solidFill>
@@ -13405,7 +13429,7 @@
           <a:effectLst/>
           <a:extLst>
             <a:ext uri="{91240B29-F687-4f45-9708-019B960494DF}">
-              <a14:hiddenLine xmlns:a16="http://schemas.microsoft.com/office/drawing/2014/main" xmlns:a14="http://schemas.microsoft.com/office/drawing/2010/main" xmlns="" w="9525">
+              <a14:hiddenLine xmlns="" xmlns:a14="http://schemas.microsoft.com/office/drawing/2010/main" xmlns:a16="http://schemas.microsoft.com/office/drawing/2014/main" w="9525">
                 <a:solidFill>
                   <a:srgbClr val="000000"/>
                 </a:solidFill>
@@ -13809,7 +13833,7 @@
           <a:effectLst/>
           <a:extLst>
             <a:ext uri="{91240B29-F687-4f45-9708-019B960494DF}">
-              <a14:hiddenLine xmlns:a14="http://schemas.microsoft.com/office/drawing/2010/main" xmlns:p14="http://schemas.microsoft.com/office/powerpoint/2010/main" xmlns:a16="http://schemas.microsoft.com/office/drawing/2014/main" xmlns="" w="9525">
+              <a14:hiddenLine xmlns="" xmlns:a16="http://schemas.microsoft.com/office/drawing/2014/main" xmlns:p14="http://schemas.microsoft.com/office/powerpoint/2010/main" xmlns:a14="http://schemas.microsoft.com/office/drawing/2010/main" w="9525">
                 <a:solidFill>
                   <a:srgbClr val="000000"/>
                 </a:solidFill>
@@ -14535,7 +14559,7 @@
           <a:effectLst/>
           <a:extLst>
             <a:ext uri="{91240B29-F687-4f45-9708-019B960494DF}">
-              <a14:hiddenLine xmlns:a16="http://schemas.microsoft.com/office/drawing/2014/main" xmlns:a14="http://schemas.microsoft.com/office/drawing/2010/main" xmlns="" w="9525">
+              <a14:hiddenLine xmlns="" xmlns:a14="http://schemas.microsoft.com/office/drawing/2010/main" xmlns:a16="http://schemas.microsoft.com/office/drawing/2014/main" w="9525">
                 <a:solidFill>
                   <a:srgbClr val="000000"/>
                 </a:solidFill>
@@ -14931,7 +14955,7 @@
           <a:effectLst/>
           <a:extLst>
             <a:ext uri="{91240B29-F687-4f45-9708-019B960494DF}">
-              <a14:hiddenLine xmlns:a14="http://schemas.microsoft.com/office/drawing/2010/main" xmlns:p14="http://schemas.microsoft.com/office/powerpoint/2010/main" xmlns:a16="http://schemas.microsoft.com/office/drawing/2014/main" xmlns="" w="9525">
+              <a14:hiddenLine xmlns="" xmlns:a16="http://schemas.microsoft.com/office/drawing/2014/main" xmlns:p14="http://schemas.microsoft.com/office/powerpoint/2010/main" xmlns:a14="http://schemas.microsoft.com/office/drawing/2010/main" w="9525">
                 <a:solidFill>
                   <a:srgbClr val="000000"/>
                 </a:solidFill>
@@ -15604,16 +15628,15 @@
           <a:lstStyle/>
           <a:p>
             <a:r>
-              <a:rPr lang="pl-PL" dirty="0"/>
-              <a:t>Dodaj coś od siebie </a:t>
-            </a:r>
-            <a:r>
-              <a:rPr lang="pl-PL" dirty="0">
-                <a:sym typeface="Wingdings" panose="05000000000000000000" pitchFamily="2" charset="2"/>
-              </a:rPr>
-              <a:t></a:t>
-            </a:r>
-            <a:endParaRPr lang="pl-PL" dirty="0"/>
+              <a:rPr lang="en-US" dirty="0"/>
+              <a:t>Husband, Father, trainer, consultant, blogger</a:t>
+            </a:r>
+          </a:p>
+          <a:p>
+            <a:r>
+              <a:rPr lang="en-US" dirty="0"/>
+              <a:t>Microsoft MVP</a:t>
+            </a:r>
           </a:p>
         </p:txBody>
       </p:sp>
@@ -15621,6 +15644,1865 @@
     <p:extLst>
       <p:ext uri="{BB962C8B-B14F-4D97-AF65-F5344CB8AC3E}">
         <p14:creationId xmlns:p14="http://schemas.microsoft.com/office/powerpoint/2010/main" val="560517696"/>
+      </p:ext>
+    </p:extLst>
+  </p:cSld>
+  <p:clrMapOvr>
+    <a:masterClrMapping/>
+  </p:clrMapOvr>
+</p:sld>
+</file>
+
+<file path=ppt/slides/slide40.xml><?xml version="1.0" encoding="utf-8"?>
+<p:sld xmlns:a="http://schemas.openxmlformats.org/drawingml/2006/main" xmlns:r="http://schemas.openxmlformats.org/officeDocument/2006/relationships" xmlns:p="http://schemas.openxmlformats.org/presentationml/2006/main">
+  <p:cSld>
+    <p:spTree>
+      <p:nvGrpSpPr>
+        <p:cNvPr id="1" name=""/>
+        <p:cNvGrpSpPr/>
+        <p:nvPr/>
+      </p:nvGrpSpPr>
+      <p:grpSpPr>
+        <a:xfrm>
+          <a:off x="0" y="0"/>
+          <a:ext cx="0" cy="0"/>
+          <a:chOff x="0" y="0"/>
+          <a:chExt cx="0" cy="0"/>
+        </a:xfrm>
+      </p:grpSpPr>
+      <p:sp>
+        <p:nvSpPr>
+          <p:cNvPr id="4" name="Tytuł 3">
+            <a:extLst>
+              <a:ext uri="{FF2B5EF4-FFF2-40B4-BE49-F238E27FC236}">
+                <a16:creationId xmlns:a16="http://schemas.microsoft.com/office/drawing/2014/main" id="{940AAD03-8286-4236-9EE3-B78F24BCA549}"/>
+              </a:ext>
+            </a:extLst>
+          </p:cNvPr>
+          <p:cNvSpPr>
+            <a:spLocks noGrp="1"/>
+          </p:cNvSpPr>
+          <p:nvPr>
+            <p:ph type="title"/>
+          </p:nvPr>
+        </p:nvSpPr>
+        <p:spPr/>
+        <p:txBody>
+          <a:bodyPr/>
+          <a:lstStyle/>
+          <a:p>
+            <a:r>
+              <a:rPr lang="en-US" dirty="0"/>
+              <a:t>Testing functions locally</a:t>
+            </a:r>
+          </a:p>
+        </p:txBody>
+      </p:sp>
+      <p:sp>
+        <p:nvSpPr>
+          <p:cNvPr id="5" name="Symbol zastępczy tekstu 4">
+            <a:extLst>
+              <a:ext uri="{FF2B5EF4-FFF2-40B4-BE49-F238E27FC236}">
+                <a16:creationId xmlns:a16="http://schemas.microsoft.com/office/drawing/2014/main" id="{311A8156-965D-471E-B80E-1B55ED7AFEFE}"/>
+              </a:ext>
+            </a:extLst>
+          </p:cNvPr>
+          <p:cNvSpPr>
+            <a:spLocks noGrp="1"/>
+          </p:cNvSpPr>
+          <p:nvPr>
+            <p:ph type="body" idx="1"/>
+          </p:nvPr>
+        </p:nvSpPr>
+        <p:spPr/>
+        <p:txBody>
+          <a:bodyPr/>
+          <a:lstStyle/>
+          <a:p>
+            <a:r>
+              <a:rPr lang="pl-PL" dirty="0" err="1"/>
+              <a:t>Writing</a:t>
+            </a:r>
+            <a:r>
+              <a:rPr lang="pl-PL" dirty="0"/>
+              <a:t> </a:t>
+            </a:r>
+            <a:r>
+              <a:rPr lang="pl-PL" dirty="0" err="1"/>
+              <a:t>your</a:t>
+            </a:r>
+            <a:r>
+              <a:rPr lang="pl-PL" dirty="0"/>
+              <a:t> </a:t>
+            </a:r>
+            <a:r>
+              <a:rPr lang="pl-PL" dirty="0" err="1"/>
+              <a:t>own</a:t>
+            </a:r>
+            <a:r>
+              <a:rPr lang="pl-PL" dirty="0"/>
+              <a:t> </a:t>
+            </a:r>
+            <a:r>
+              <a:rPr lang="pl-PL" dirty="0" err="1"/>
+              <a:t>tests</a:t>
+            </a:r>
+            <a:endParaRPr lang="pl-PL" dirty="0"/>
+          </a:p>
+        </p:txBody>
+      </p:sp>
+    </p:spTree>
+    <p:extLst>
+      <p:ext uri="{BB962C8B-B14F-4D97-AF65-F5344CB8AC3E}">
+        <p14:creationId xmlns:p14="http://schemas.microsoft.com/office/powerpoint/2010/main" val="3742703964"/>
+      </p:ext>
+    </p:extLst>
+  </p:cSld>
+  <p:clrMapOvr>
+    <a:masterClrMapping/>
+  </p:clrMapOvr>
+</p:sld>
+</file>
+
+<file path=ppt/slides/slide41.xml><?xml version="1.0" encoding="utf-8"?>
+<p:sld xmlns:a="http://schemas.openxmlformats.org/drawingml/2006/main" xmlns:r="http://schemas.openxmlformats.org/officeDocument/2006/relationships" xmlns:p="http://schemas.openxmlformats.org/presentationml/2006/main">
+  <p:cSld>
+    <p:bg>
+      <p:bgPr>
+        <a:solidFill>
+          <a:schemeClr val="bg1"/>
+        </a:solidFill>
+        <a:effectLst/>
+      </p:bgPr>
+    </p:bg>
+    <p:spTree>
+      <p:nvGrpSpPr>
+        <p:cNvPr id="1" name=""/>
+        <p:cNvGrpSpPr/>
+        <p:nvPr/>
+      </p:nvGrpSpPr>
+      <p:grpSpPr>
+        <a:xfrm>
+          <a:off x="0" y="0"/>
+          <a:ext cx="0" cy="0"/>
+          <a:chOff x="0" y="0"/>
+          <a:chExt cx="0" cy="0"/>
+        </a:xfrm>
+      </p:grpSpPr>
+      <p:sp>
+        <p:nvSpPr>
+          <p:cNvPr id="8" name="Freeform 6">
+            <a:extLst>
+              <a:ext uri="{FF2B5EF4-FFF2-40B4-BE49-F238E27FC236}">
+                <a16:creationId xmlns:a16="http://schemas.microsoft.com/office/drawing/2014/main" id="{8775F366-526C-4C42-8931-696FFE8AA517}"/>
+              </a:ext>
+              <a:ext uri="{C183D7F6-B498-43B3-948B-1728B52AA6E4}">
+                <adec:decorative xmlns:adec="http://schemas.microsoft.com/office/drawing/2017/decorative" val="1"/>
+              </a:ext>
+            </a:extLst>
+          </p:cNvPr>
+          <p:cNvSpPr>
+            <a:spLocks noGrp="1" noRot="1" noChangeAspect="1" noMove="1" noResize="1" noEditPoints="1" noAdjustHandles="1" noChangeArrowheads="1" noChangeShapeType="1" noTextEdit="1"/>
+          </p:cNvSpPr>
+          <p:nvPr>
+            <p:extLst>
+              <p:ext uri="{386F3935-93C4-4BCD-93E2-E3B085C9AB24}">
+                <p16:designElem xmlns:p16="http://schemas.microsoft.com/office/powerpoint/2015/main" val="1"/>
+              </p:ext>
+            </p:extLst>
+          </p:nvPr>
+        </p:nvSpPr>
+        <p:spPr bwMode="auto">
+          <a:xfrm>
+            <a:off x="0" y="-3175"/>
+            <a:ext cx="12192000" cy="5203825"/>
+          </a:xfrm>
+          <a:custGeom>
+            <a:avLst/>
+            <a:gdLst/>
+            <a:ahLst/>
+            <a:cxnLst/>
+            <a:rect l="0" t="0" r="r" b="b"/>
+            <a:pathLst>
+              <a:path w="5760" h="3278">
+                <a:moveTo>
+                  <a:pt x="5760" y="0"/>
+                </a:moveTo>
+                <a:lnTo>
+                  <a:pt x="0" y="0"/>
+                </a:lnTo>
+                <a:lnTo>
+                  <a:pt x="0" y="3090"/>
+                </a:lnTo>
+                <a:lnTo>
+                  <a:pt x="943" y="3090"/>
+                </a:lnTo>
+                <a:lnTo>
+                  <a:pt x="1123" y="3270"/>
+                </a:lnTo>
+                <a:lnTo>
+                  <a:pt x="1123" y="3270"/>
+                </a:lnTo>
+                <a:lnTo>
+                  <a:pt x="1127" y="3272"/>
+                </a:lnTo>
+                <a:lnTo>
+                  <a:pt x="1133" y="3275"/>
+                </a:lnTo>
+                <a:lnTo>
+                  <a:pt x="1139" y="3278"/>
+                </a:lnTo>
+                <a:lnTo>
+                  <a:pt x="1144" y="3278"/>
+                </a:lnTo>
+                <a:lnTo>
+                  <a:pt x="1150" y="3278"/>
+                </a:lnTo>
+                <a:lnTo>
+                  <a:pt x="1155" y="3275"/>
+                </a:lnTo>
+                <a:lnTo>
+                  <a:pt x="1161" y="3272"/>
+                </a:lnTo>
+                <a:lnTo>
+                  <a:pt x="1165" y="3270"/>
+                </a:lnTo>
+                <a:lnTo>
+                  <a:pt x="1345" y="3090"/>
+                </a:lnTo>
+                <a:lnTo>
+                  <a:pt x="5760" y="3090"/>
+                </a:lnTo>
+                <a:lnTo>
+                  <a:pt x="5760" y="0"/>
+                </a:lnTo>
+                <a:close/>
+              </a:path>
+            </a:pathLst>
+          </a:custGeom>
+          <a:ln/>
+          <a:effectLst/>
+          <a:extLst>
+            <a:ext uri="{91240B29-F687-4f45-9708-019B960494DF}">
+              <a14:hiddenLine xmlns="" xmlns:a14="http://schemas.microsoft.com/office/drawing/2010/main" xmlns:a16="http://schemas.microsoft.com/office/drawing/2014/main" w="9525">
+                <a:solidFill>
+                  <a:srgbClr val="000000"/>
+                </a:solidFill>
+                <a:round/>
+                <a:headEnd/>
+                <a:tailEnd/>
+              </a14:hiddenLine>
+            </a:ext>
+          </a:extLst>
+        </p:spPr>
+        <p:style>
+          <a:lnRef idx="1">
+            <a:schemeClr val="accent1"/>
+          </a:lnRef>
+          <a:fillRef idx="3">
+            <a:schemeClr val="accent1"/>
+          </a:fillRef>
+          <a:effectRef idx="2">
+            <a:schemeClr val="accent1"/>
+          </a:effectRef>
+          <a:fontRef idx="minor">
+            <a:schemeClr val="lt1"/>
+          </a:fontRef>
+        </p:style>
+      </p:sp>
+      <p:sp useBgFill="1">
+        <p:nvSpPr>
+          <p:cNvPr id="10" name="Rectangle 9">
+            <a:extLst>
+              <a:ext uri="{FF2B5EF4-FFF2-40B4-BE49-F238E27FC236}">
+                <a16:creationId xmlns:a16="http://schemas.microsoft.com/office/drawing/2014/main" id="{597EA66B-2AAB-42B0-9F9D-38920D8D82D7}"/>
+              </a:ext>
+              <a:ext uri="{C183D7F6-B498-43B3-948B-1728B52AA6E4}">
+                <adec:decorative xmlns:adec="http://schemas.microsoft.com/office/drawing/2017/decorative" val="1"/>
+              </a:ext>
+            </a:extLst>
+          </p:cNvPr>
+          <p:cNvSpPr>
+            <a:spLocks noGrp="1" noRot="1" noChangeAspect="1" noMove="1" noResize="1" noEditPoints="1" noAdjustHandles="1" noChangeArrowheads="1" noChangeShapeType="1" noTextEdit="1"/>
+          </p:cNvSpPr>
+          <p:nvPr>
+            <p:extLst>
+              <p:ext uri="{386F3935-93C4-4BCD-93E2-E3B085C9AB24}">
+                <p16:designElem xmlns:p16="http://schemas.microsoft.com/office/powerpoint/2015/main" val="1"/>
+              </p:ext>
+            </p:extLst>
+          </p:nvPr>
+        </p:nvSpPr>
+        <p:spPr>
+          <a:xfrm>
+            <a:off x="0" y="0"/>
+            <a:ext cx="12192000" cy="6858000"/>
+          </a:xfrm>
+          <a:prstGeom prst="rect">
+            <a:avLst/>
+          </a:prstGeom>
+          <a:ln>
+            <a:noFill/>
+          </a:ln>
+        </p:spPr>
+        <p:style>
+          <a:lnRef idx="2">
+            <a:schemeClr val="accent1">
+              <a:shade val="50000"/>
+            </a:schemeClr>
+          </a:lnRef>
+          <a:fillRef idx="1">
+            <a:schemeClr val="accent1"/>
+          </a:fillRef>
+          <a:effectRef idx="0">
+            <a:schemeClr val="accent1"/>
+          </a:effectRef>
+          <a:fontRef idx="minor">
+            <a:schemeClr val="lt1"/>
+          </a:fontRef>
+        </p:style>
+        <p:txBody>
+          <a:bodyPr rtlCol="0" anchor="ctr"/>
+          <a:lstStyle/>
+          <a:p>
+            <a:pPr algn="ctr"/>
+            <a:endParaRPr lang="en-US"/>
+          </a:p>
+        </p:txBody>
+      </p:sp>
+      <p:sp>
+        <p:nvSpPr>
+          <p:cNvPr id="2" name="Tytuł 1">
+            <a:extLst>
+              <a:ext uri="{FF2B5EF4-FFF2-40B4-BE49-F238E27FC236}">
+                <a16:creationId xmlns:a16="http://schemas.microsoft.com/office/drawing/2014/main" id="{A872828A-74DB-42C2-BED5-7E0536B8A711}"/>
+              </a:ext>
+            </a:extLst>
+          </p:cNvPr>
+          <p:cNvSpPr>
+            <a:spLocks noGrp="1"/>
+          </p:cNvSpPr>
+          <p:nvPr>
+            <p:ph type="title"/>
+          </p:nvPr>
+        </p:nvSpPr>
+        <p:spPr>
+          <a:xfrm>
+            <a:off x="965199" y="885433"/>
+            <a:ext cx="10261602" cy="3022257"/>
+          </a:xfrm>
+          <a:effectLst/>
+        </p:spPr>
+        <p:txBody>
+          <a:bodyPr vert="horz" lIns="91440" tIns="45720" rIns="91440" bIns="45720" rtlCol="0" anchor="b">
+            <a:normAutofit/>
+          </a:bodyPr>
+          <a:lstStyle/>
+          <a:p>
+            <a:pPr algn="ctr"/>
+            <a:r>
+              <a:rPr lang="pl-PL" sz="7200" dirty="0">
+                <a:solidFill>
+                  <a:schemeClr val="tx1"/>
+                </a:solidFill>
+              </a:rPr>
+              <a:t>Unit </a:t>
+            </a:r>
+            <a:r>
+              <a:rPr lang="pl-PL" sz="7200" dirty="0" err="1">
+                <a:solidFill>
+                  <a:schemeClr val="tx1"/>
+                </a:solidFill>
+              </a:rPr>
+              <a:t>Testing</a:t>
+            </a:r>
+            <a:endParaRPr lang="en-US" sz="7200" dirty="0">
+              <a:solidFill>
+                <a:schemeClr val="tx1"/>
+              </a:solidFill>
+            </a:endParaRPr>
+          </a:p>
+        </p:txBody>
+      </p:sp>
+      <p:sp>
+        <p:nvSpPr>
+          <p:cNvPr id="3" name="Symbol zastępczy zawartości 2">
+            <a:extLst>
+              <a:ext uri="{FF2B5EF4-FFF2-40B4-BE49-F238E27FC236}">
+                <a16:creationId xmlns:a16="http://schemas.microsoft.com/office/drawing/2014/main" id="{CB8FCCB2-9F8B-4D0F-B740-C64E8A52285F}"/>
+              </a:ext>
+            </a:extLst>
+          </p:cNvPr>
+          <p:cNvSpPr>
+            <a:spLocks noGrp="1"/>
+          </p:cNvSpPr>
+          <p:nvPr>
+            <p:ph idx="1"/>
+          </p:nvPr>
+        </p:nvSpPr>
+        <p:spPr>
+          <a:xfrm>
+            <a:off x="1906955" y="4033164"/>
+            <a:ext cx="8378090" cy="1181206"/>
+          </a:xfrm>
+          <a:effectLst/>
+        </p:spPr>
+        <p:txBody>
+          <a:bodyPr vert="horz" lIns="91440" tIns="45720" rIns="91440" bIns="45720" rtlCol="0" anchor="t">
+            <a:normAutofit/>
+          </a:bodyPr>
+          <a:lstStyle/>
+          <a:p>
+            <a:pPr marL="0" indent="0" algn="ctr">
+              <a:buNone/>
+            </a:pPr>
+            <a:r>
+              <a:rPr lang="pl-PL" sz="2000" dirty="0" err="1"/>
+              <a:t>So</a:t>
+            </a:r>
+            <a:r>
+              <a:rPr lang="pl-PL" sz="2000" dirty="0"/>
+              <a:t> </a:t>
+            </a:r>
+            <a:r>
+              <a:rPr lang="pl-PL" sz="2000" dirty="0" err="1"/>
+              <a:t>what</a:t>
+            </a:r>
+            <a:r>
+              <a:rPr lang="pl-PL" sz="2000" dirty="0"/>
+              <a:t> </a:t>
+            </a:r>
+            <a:r>
+              <a:rPr lang="pl-PL" sz="2000" dirty="0" err="1"/>
+              <a:t>exactly</a:t>
+            </a:r>
+            <a:r>
+              <a:rPr lang="pl-PL" sz="2000" dirty="0"/>
+              <a:t> </a:t>
+            </a:r>
+            <a:r>
+              <a:rPr lang="pl-PL" sz="2000" dirty="0" err="1"/>
+              <a:t>our</a:t>
+            </a:r>
+            <a:r>
+              <a:rPr lang="pl-PL" sz="2000" dirty="0"/>
+              <a:t> </a:t>
+            </a:r>
+            <a:r>
+              <a:rPr lang="pl-PL" sz="2000" dirty="0" err="1"/>
+              <a:t>function</a:t>
+            </a:r>
+            <a:r>
+              <a:rPr lang="pl-PL" sz="2000" dirty="0"/>
+              <a:t> </a:t>
+            </a:r>
+            <a:r>
+              <a:rPr lang="pl-PL" sz="2000" dirty="0" err="1"/>
+              <a:t>should</a:t>
+            </a:r>
+            <a:r>
+              <a:rPr lang="pl-PL" sz="2000" dirty="0"/>
+              <a:t> return?</a:t>
+            </a:r>
+            <a:endParaRPr lang="en-US" sz="2000" b="1" dirty="0"/>
+          </a:p>
+        </p:txBody>
+      </p:sp>
+      <p:sp>
+        <p:nvSpPr>
+          <p:cNvPr id="12" name="Freeform: Shape 11">
+            <a:extLst>
+              <a:ext uri="{FF2B5EF4-FFF2-40B4-BE49-F238E27FC236}">
+                <a16:creationId xmlns:a16="http://schemas.microsoft.com/office/drawing/2014/main" id="{D360EBE3-31BB-422F-AA87-FA3873DAE484}"/>
+              </a:ext>
+              <a:ext uri="{C183D7F6-B498-43B3-948B-1728B52AA6E4}">
+                <adec:decorative xmlns:adec="http://schemas.microsoft.com/office/drawing/2017/decorative" val="1"/>
+              </a:ext>
+            </a:extLst>
+          </p:cNvPr>
+          <p:cNvSpPr>
+            <a:spLocks noGrp="1" noRot="1" noChangeAspect="1" noMove="1" noResize="1" noEditPoints="1" noAdjustHandles="1" noChangeArrowheads="1" noChangeShapeType="1" noTextEdit="1"/>
+          </p:cNvSpPr>
+          <p:nvPr>
+            <p:extLst>
+              <p:ext uri="{386F3935-93C4-4BCD-93E2-E3B085C9AB24}">
+                <p16:designElem xmlns:p16="http://schemas.microsoft.com/office/powerpoint/2015/main" val="1"/>
+              </p:ext>
+            </p:extLst>
+          </p:nvPr>
+        </p:nvSpPr>
+        <p:spPr bwMode="auto">
+          <a:xfrm rot="10800000">
+            <a:off x="0" y="5388384"/>
+            <a:ext cx="12192000" cy="1469616"/>
+          </a:xfrm>
+          <a:custGeom>
+            <a:avLst/>
+            <a:gdLst>
+              <a:gd name="connsiteX0" fmla="*/ 6113881 w 12192000"/>
+              <a:gd name="connsiteY0" fmla="*/ 1469616 h 1469616"/>
+              <a:gd name="connsiteX1" fmla="*/ 6101181 w 12192000"/>
+              <a:gd name="connsiteY1" fmla="*/ 1469616 h 1469616"/>
+              <a:gd name="connsiteX2" fmla="*/ 6090598 w 12192000"/>
+              <a:gd name="connsiteY2" fmla="*/ 1469616 h 1469616"/>
+              <a:gd name="connsiteX3" fmla="*/ 6077897 w 12192000"/>
+              <a:gd name="connsiteY3" fmla="*/ 1464854 h 1469616"/>
+              <a:gd name="connsiteX4" fmla="*/ 6065198 w 12192000"/>
+              <a:gd name="connsiteY4" fmla="*/ 1460091 h 1469616"/>
+              <a:gd name="connsiteX5" fmla="*/ 6056731 w 12192000"/>
+              <a:gd name="connsiteY5" fmla="*/ 1456916 h 1469616"/>
+              <a:gd name="connsiteX6" fmla="*/ 5678033 w 12192000"/>
+              <a:gd name="connsiteY6" fmla="*/ 1172892 h 1469616"/>
+              <a:gd name="connsiteX7" fmla="*/ 0 w 12192000"/>
+              <a:gd name="connsiteY7" fmla="*/ 1172892 h 1469616"/>
+              <a:gd name="connsiteX8" fmla="*/ 0 w 12192000"/>
+              <a:gd name="connsiteY8" fmla="*/ 1162370 h 1469616"/>
+              <a:gd name="connsiteX9" fmla="*/ 0 w 12192000"/>
+              <a:gd name="connsiteY9" fmla="*/ 403347 h 1469616"/>
+              <a:gd name="connsiteX10" fmla="*/ 0 w 12192000"/>
+              <a:gd name="connsiteY10" fmla="*/ 0 h 1469616"/>
+              <a:gd name="connsiteX11" fmla="*/ 12192000 w 12192000"/>
+              <a:gd name="connsiteY11" fmla="*/ 0 h 1469616"/>
+              <a:gd name="connsiteX12" fmla="*/ 12192000 w 12192000"/>
+              <a:gd name="connsiteY12" fmla="*/ 403347 h 1469616"/>
+              <a:gd name="connsiteX13" fmla="*/ 12192000 w 12192000"/>
+              <a:gd name="connsiteY13" fmla="*/ 1162370 h 1469616"/>
+              <a:gd name="connsiteX14" fmla="*/ 12192000 w 12192000"/>
+              <a:gd name="connsiteY14" fmla="*/ 1172892 h 1469616"/>
+              <a:gd name="connsiteX15" fmla="*/ 6524330 w 12192000"/>
+              <a:gd name="connsiteY15" fmla="*/ 1172892 h 1469616"/>
+              <a:gd name="connsiteX16" fmla="*/ 6145631 w 12192000"/>
+              <a:gd name="connsiteY16" fmla="*/ 1456916 h 1469616"/>
+              <a:gd name="connsiteX17" fmla="*/ 6137163 w 12192000"/>
+              <a:gd name="connsiteY17" fmla="*/ 1460091 h 1469616"/>
+              <a:gd name="connsiteX18" fmla="*/ 6124463 w 12192000"/>
+              <a:gd name="connsiteY18" fmla="*/ 1464854 h 1469616"/>
+            </a:gdLst>
+            <a:ahLst/>
+            <a:cxnLst>
+              <a:cxn ang="0">
+                <a:pos x="connsiteX0" y="connsiteY0"/>
+              </a:cxn>
+              <a:cxn ang="0">
+                <a:pos x="connsiteX1" y="connsiteY1"/>
+              </a:cxn>
+              <a:cxn ang="0">
+                <a:pos x="connsiteX2" y="connsiteY2"/>
+              </a:cxn>
+              <a:cxn ang="0">
+                <a:pos x="connsiteX3" y="connsiteY3"/>
+              </a:cxn>
+              <a:cxn ang="0">
+                <a:pos x="connsiteX4" y="connsiteY4"/>
+              </a:cxn>
+              <a:cxn ang="0">
+                <a:pos x="connsiteX5" y="connsiteY5"/>
+              </a:cxn>
+              <a:cxn ang="0">
+                <a:pos x="connsiteX6" y="connsiteY6"/>
+              </a:cxn>
+              <a:cxn ang="0">
+                <a:pos x="connsiteX7" y="connsiteY7"/>
+              </a:cxn>
+              <a:cxn ang="0">
+                <a:pos x="connsiteX8" y="connsiteY8"/>
+              </a:cxn>
+              <a:cxn ang="0">
+                <a:pos x="connsiteX9" y="connsiteY9"/>
+              </a:cxn>
+              <a:cxn ang="0">
+                <a:pos x="connsiteX10" y="connsiteY10"/>
+              </a:cxn>
+              <a:cxn ang="0">
+                <a:pos x="connsiteX11" y="connsiteY11"/>
+              </a:cxn>
+              <a:cxn ang="0">
+                <a:pos x="connsiteX12" y="connsiteY12"/>
+              </a:cxn>
+              <a:cxn ang="0">
+                <a:pos x="connsiteX13" y="connsiteY13"/>
+              </a:cxn>
+              <a:cxn ang="0">
+                <a:pos x="connsiteX14" y="connsiteY14"/>
+              </a:cxn>
+              <a:cxn ang="0">
+                <a:pos x="connsiteX15" y="connsiteY15"/>
+              </a:cxn>
+              <a:cxn ang="0">
+                <a:pos x="connsiteX16" y="connsiteY16"/>
+              </a:cxn>
+              <a:cxn ang="0">
+                <a:pos x="connsiteX17" y="connsiteY17"/>
+              </a:cxn>
+              <a:cxn ang="0">
+                <a:pos x="connsiteX18" y="connsiteY18"/>
+              </a:cxn>
+            </a:cxnLst>
+            <a:rect l="l" t="t" r="r" b="b"/>
+            <a:pathLst>
+              <a:path w="12192000" h="1469616">
+                <a:moveTo>
+                  <a:pt x="6113881" y="1469616"/>
+                </a:moveTo>
+                <a:lnTo>
+                  <a:pt x="6101181" y="1469616"/>
+                </a:lnTo>
+                <a:lnTo>
+                  <a:pt x="6090598" y="1469616"/>
+                </a:lnTo>
+                <a:lnTo>
+                  <a:pt x="6077897" y="1464854"/>
+                </a:lnTo>
+                <a:lnTo>
+                  <a:pt x="6065198" y="1460091"/>
+                </a:lnTo>
+                <a:lnTo>
+                  <a:pt x="6056731" y="1456916"/>
+                </a:lnTo>
+                <a:lnTo>
+                  <a:pt x="5678033" y="1172892"/>
+                </a:lnTo>
+                <a:lnTo>
+                  <a:pt x="0" y="1172892"/>
+                </a:lnTo>
+                <a:lnTo>
+                  <a:pt x="0" y="1162370"/>
+                </a:lnTo>
+                <a:lnTo>
+                  <a:pt x="0" y="403347"/>
+                </a:lnTo>
+                <a:lnTo>
+                  <a:pt x="0" y="0"/>
+                </a:lnTo>
+                <a:lnTo>
+                  <a:pt x="12192000" y="0"/>
+                </a:lnTo>
+                <a:lnTo>
+                  <a:pt x="12192000" y="403347"/>
+                </a:lnTo>
+                <a:lnTo>
+                  <a:pt x="12192000" y="1162370"/>
+                </a:lnTo>
+                <a:lnTo>
+                  <a:pt x="12192000" y="1172892"/>
+                </a:lnTo>
+                <a:lnTo>
+                  <a:pt x="6524330" y="1172892"/>
+                </a:lnTo>
+                <a:lnTo>
+                  <a:pt x="6145631" y="1456916"/>
+                </a:lnTo>
+                <a:lnTo>
+                  <a:pt x="6137163" y="1460091"/>
+                </a:lnTo>
+                <a:lnTo>
+                  <a:pt x="6124463" y="1464854"/>
+                </a:lnTo>
+                <a:close/>
+              </a:path>
+            </a:pathLst>
+          </a:custGeom>
+          <a:ln>
+            <a:noFill/>
+          </a:ln>
+          <a:effectLst/>
+          <a:extLst>
+            <a:ext uri="{91240B29-F687-4f45-9708-019B960494DF}">
+              <a14:hiddenLine xmlns="" xmlns:a16="http://schemas.microsoft.com/office/drawing/2014/main" xmlns:p14="http://schemas.microsoft.com/office/powerpoint/2010/main" xmlns:a14="http://schemas.microsoft.com/office/drawing/2010/main" w="9525">
+                <a:solidFill>
+                  <a:srgbClr val="000000"/>
+                </a:solidFill>
+                <a:round/>
+                <a:headEnd/>
+                <a:tailEnd/>
+              </a14:hiddenLine>
+            </a:ext>
+          </a:extLst>
+        </p:spPr>
+        <p:style>
+          <a:lnRef idx="1">
+            <a:schemeClr val="accent1"/>
+          </a:lnRef>
+          <a:fillRef idx="3">
+            <a:schemeClr val="accent1"/>
+          </a:fillRef>
+          <a:effectRef idx="2">
+            <a:schemeClr val="accent1"/>
+          </a:effectRef>
+          <a:fontRef idx="minor">
+            <a:schemeClr val="lt1"/>
+          </a:fontRef>
+        </p:style>
+      </p:sp>
+    </p:spTree>
+    <p:extLst>
+      <p:ext uri="{BB962C8B-B14F-4D97-AF65-F5344CB8AC3E}">
+        <p14:creationId xmlns:p14="http://schemas.microsoft.com/office/powerpoint/2010/main" val="3677261359"/>
+      </p:ext>
+    </p:extLst>
+  </p:cSld>
+  <p:clrMapOvr>
+    <a:overrideClrMapping bg1="lt1" tx1="dk1" bg2="lt2" tx2="dk2" accent1="accent1" accent2="accent2" accent3="accent3" accent4="accent4" accent5="accent5" accent6="accent6" hlink="hlink" folHlink="folHlink"/>
+  </p:clrMapOvr>
+</p:sld>
+</file>
+
+<file path=ppt/slides/slide42.xml><?xml version="1.0" encoding="utf-8"?>
+<p:sld xmlns:a="http://schemas.openxmlformats.org/drawingml/2006/main" xmlns:r="http://schemas.openxmlformats.org/officeDocument/2006/relationships" xmlns:p="http://schemas.openxmlformats.org/presentationml/2006/main">
+  <p:cSld>
+    <p:spTree>
+      <p:nvGrpSpPr>
+        <p:cNvPr id="1" name=""/>
+        <p:cNvGrpSpPr/>
+        <p:nvPr/>
+      </p:nvGrpSpPr>
+      <p:grpSpPr>
+        <a:xfrm>
+          <a:off x="0" y="0"/>
+          <a:ext cx="0" cy="0"/>
+          <a:chOff x="0" y="0"/>
+          <a:chExt cx="0" cy="0"/>
+        </a:xfrm>
+      </p:grpSpPr>
+      <p:sp>
+        <p:nvSpPr>
+          <p:cNvPr id="4" name="Tytuł 3">
+            <a:extLst>
+              <a:ext uri="{FF2B5EF4-FFF2-40B4-BE49-F238E27FC236}">
+                <a16:creationId xmlns:a16="http://schemas.microsoft.com/office/drawing/2014/main" id="{FB6DB2D1-04D0-46FF-AACE-3F6DC0B935EC}"/>
+              </a:ext>
+            </a:extLst>
+          </p:cNvPr>
+          <p:cNvSpPr>
+            <a:spLocks noGrp="1"/>
+          </p:cNvSpPr>
+          <p:nvPr>
+            <p:ph type="title"/>
+          </p:nvPr>
+        </p:nvSpPr>
+        <p:spPr/>
+        <p:txBody>
+          <a:bodyPr/>
+          <a:lstStyle/>
+          <a:p>
+            <a:r>
+              <a:rPr lang="pl-PL" dirty="0"/>
+              <a:t>Unit </a:t>
+            </a:r>
+            <a:r>
+              <a:rPr lang="pl-PL" dirty="0" err="1"/>
+              <a:t>Testing</a:t>
+            </a:r>
+            <a:endParaRPr lang="pl-PL" dirty="0"/>
+          </a:p>
+        </p:txBody>
+      </p:sp>
+      <p:sp>
+        <p:nvSpPr>
+          <p:cNvPr id="5" name="Symbol zastępczy tekstu 4">
+            <a:extLst>
+              <a:ext uri="{FF2B5EF4-FFF2-40B4-BE49-F238E27FC236}">
+                <a16:creationId xmlns:a16="http://schemas.microsoft.com/office/drawing/2014/main" id="{DDECDB50-AE48-4F2C-9949-389F3AACE293}"/>
+              </a:ext>
+            </a:extLst>
+          </p:cNvPr>
+          <p:cNvSpPr>
+            <a:spLocks noGrp="1"/>
+          </p:cNvSpPr>
+          <p:nvPr>
+            <p:ph type="body" idx="1"/>
+          </p:nvPr>
+        </p:nvSpPr>
+        <p:spPr/>
+        <p:txBody>
+          <a:bodyPr/>
+          <a:lstStyle/>
+          <a:p>
+            <a:r>
+              <a:rPr lang="en-US" dirty="0"/>
+              <a:t>Do/Helps with</a:t>
+            </a:r>
+          </a:p>
+        </p:txBody>
+      </p:sp>
+      <p:sp>
+        <p:nvSpPr>
+          <p:cNvPr id="6" name="Symbol zastępczy zawartości 5">
+            <a:extLst>
+              <a:ext uri="{FF2B5EF4-FFF2-40B4-BE49-F238E27FC236}">
+                <a16:creationId xmlns:a16="http://schemas.microsoft.com/office/drawing/2014/main" id="{2B19FDC3-4F08-43D5-A559-B8ECE5E234C4}"/>
+              </a:ext>
+            </a:extLst>
+          </p:cNvPr>
+          <p:cNvSpPr>
+            <a:spLocks noGrp="1"/>
+          </p:cNvSpPr>
+          <p:nvPr>
+            <p:ph sz="half" idx="2"/>
+          </p:nvPr>
+        </p:nvSpPr>
+        <p:spPr/>
+        <p:txBody>
+          <a:bodyPr>
+            <a:normAutofit lnSpcReduction="10000"/>
+          </a:bodyPr>
+          <a:lstStyle/>
+          <a:p>
+            <a:r>
+              <a:rPr lang="en-US" dirty="0"/>
+              <a:t>Tests only single, small possible unit of code – method, action, function</a:t>
+            </a:r>
+          </a:p>
+          <a:p>
+            <a:r>
+              <a:rPr lang="en-US" dirty="0"/>
+              <a:t>Tests only public methods/actions/functions</a:t>
+            </a:r>
+          </a:p>
+          <a:p>
+            <a:r>
+              <a:rPr lang="en-US" dirty="0"/>
+              <a:t>Verifying if what we implemented behave as planned</a:t>
+            </a:r>
+          </a:p>
+          <a:p>
+            <a:r>
+              <a:rPr lang="en-US" dirty="0"/>
+              <a:t>„Protecting” against breaking changes</a:t>
+            </a:r>
+          </a:p>
+          <a:p>
+            <a:r>
+              <a:rPr lang="en-US" dirty="0"/>
+              <a:t>Guiding „implementations”</a:t>
+            </a:r>
+          </a:p>
+          <a:p>
+            <a:r>
+              <a:rPr lang="en-US" dirty="0"/>
+              <a:t>Keeping code „simple”</a:t>
+            </a:r>
+          </a:p>
+        </p:txBody>
+      </p:sp>
+      <p:sp>
+        <p:nvSpPr>
+          <p:cNvPr id="7" name="Symbol zastępczy tekstu 6">
+            <a:extLst>
+              <a:ext uri="{FF2B5EF4-FFF2-40B4-BE49-F238E27FC236}">
+                <a16:creationId xmlns:a16="http://schemas.microsoft.com/office/drawing/2014/main" id="{F9BC82B8-AFF7-47B5-BB53-D14C461F5948}"/>
+              </a:ext>
+            </a:extLst>
+          </p:cNvPr>
+          <p:cNvSpPr>
+            <a:spLocks noGrp="1"/>
+          </p:cNvSpPr>
+          <p:nvPr>
+            <p:ph type="body" sz="quarter" idx="3"/>
+          </p:nvPr>
+        </p:nvSpPr>
+        <p:spPr/>
+        <p:txBody>
+          <a:bodyPr/>
+          <a:lstStyle/>
+          <a:p>
+            <a:r>
+              <a:rPr lang="en-US" dirty="0"/>
+              <a:t>Does not mean</a:t>
+            </a:r>
+          </a:p>
+        </p:txBody>
+      </p:sp>
+      <p:sp>
+        <p:nvSpPr>
+          <p:cNvPr id="8" name="Symbol zastępczy zawartości 7">
+            <a:extLst>
+              <a:ext uri="{FF2B5EF4-FFF2-40B4-BE49-F238E27FC236}">
+                <a16:creationId xmlns:a16="http://schemas.microsoft.com/office/drawing/2014/main" id="{4858852D-6029-4D64-AF77-2564D6288EE6}"/>
+              </a:ext>
+            </a:extLst>
+          </p:cNvPr>
+          <p:cNvSpPr>
+            <a:spLocks noGrp="1"/>
+          </p:cNvSpPr>
+          <p:nvPr>
+            <p:ph sz="quarter" idx="4"/>
+          </p:nvPr>
+        </p:nvSpPr>
+        <p:spPr/>
+        <p:txBody>
+          <a:bodyPr>
+            <a:normAutofit lnSpcReduction="10000"/>
+          </a:bodyPr>
+          <a:lstStyle/>
+          <a:p>
+            <a:r>
+              <a:rPr lang="en-US" dirty="0"/>
+              <a:t>Bug free code</a:t>
+            </a:r>
+          </a:p>
+          <a:p>
+            <a:r>
+              <a:rPr lang="en-US" dirty="0"/>
+              <a:t>That business process had been properly implemented</a:t>
+            </a:r>
+          </a:p>
+          <a:p>
+            <a:r>
+              <a:rPr lang="en-US" dirty="0"/>
+              <a:t>That code should not be tested differently</a:t>
+            </a:r>
+          </a:p>
+        </p:txBody>
+      </p:sp>
+    </p:spTree>
+    <p:extLst>
+      <p:ext uri="{BB962C8B-B14F-4D97-AF65-F5344CB8AC3E}">
+        <p14:creationId xmlns:p14="http://schemas.microsoft.com/office/powerpoint/2010/main" val="2351079076"/>
+      </p:ext>
+    </p:extLst>
+  </p:cSld>
+  <p:clrMapOvr>
+    <a:masterClrMapping/>
+  </p:clrMapOvr>
+</p:sld>
+</file>
+
+<file path=ppt/slides/slide43.xml><?xml version="1.0" encoding="utf-8"?>
+<p:sld xmlns:a="http://schemas.openxmlformats.org/drawingml/2006/main" xmlns:r="http://schemas.openxmlformats.org/officeDocument/2006/relationships" xmlns:p="http://schemas.openxmlformats.org/presentationml/2006/main">
+  <p:cSld>
+    <p:bg>
+      <p:bgPr>
+        <a:solidFill>
+          <a:schemeClr val="bg2"/>
+        </a:solidFill>
+        <a:effectLst/>
+      </p:bgPr>
+    </p:bg>
+    <p:spTree>
+      <p:nvGrpSpPr>
+        <p:cNvPr id="1" name=""/>
+        <p:cNvGrpSpPr/>
+        <p:nvPr/>
+      </p:nvGrpSpPr>
+      <p:grpSpPr>
+        <a:xfrm>
+          <a:off x="0" y="0"/>
+          <a:ext cx="0" cy="0"/>
+          <a:chOff x="0" y="0"/>
+          <a:chExt cx="0" cy="0"/>
+        </a:xfrm>
+      </p:grpSpPr>
+      <p:sp useBgFill="1">
+        <p:nvSpPr>
+          <p:cNvPr id="10" name="Rectangle 9">
+            <a:extLst>
+              <a:ext uri="{FF2B5EF4-FFF2-40B4-BE49-F238E27FC236}">
+                <a16:creationId xmlns:a16="http://schemas.microsoft.com/office/drawing/2014/main" id="{35C44DBB-AD7C-4682-B258-6367305D207B}"/>
+              </a:ext>
+              <a:ext uri="{C183D7F6-B498-43B3-948B-1728B52AA6E4}">
+                <adec:decorative xmlns:adec="http://schemas.microsoft.com/office/drawing/2017/decorative" val="1"/>
+              </a:ext>
+            </a:extLst>
+          </p:cNvPr>
+          <p:cNvSpPr>
+            <a:spLocks noGrp="1" noRot="1" noChangeAspect="1" noMove="1" noResize="1" noEditPoints="1" noAdjustHandles="1" noChangeArrowheads="1" noChangeShapeType="1" noTextEdit="1"/>
+          </p:cNvSpPr>
+          <p:nvPr>
+            <p:extLst>
+              <p:ext uri="{386F3935-93C4-4BCD-93E2-E3B085C9AB24}">
+                <p16:designElem xmlns:p16="http://schemas.microsoft.com/office/powerpoint/2015/main" val="1"/>
+              </p:ext>
+            </p:extLst>
+          </p:nvPr>
+        </p:nvSpPr>
+        <p:spPr>
+          <a:xfrm>
+            <a:off x="0" y="0"/>
+            <a:ext cx="12192000" cy="6858000"/>
+          </a:xfrm>
+          <a:prstGeom prst="rect">
+            <a:avLst/>
+          </a:prstGeom>
+          <a:ln>
+            <a:noFill/>
+          </a:ln>
+        </p:spPr>
+        <p:style>
+          <a:lnRef idx="2">
+            <a:schemeClr val="accent1">
+              <a:shade val="50000"/>
+            </a:schemeClr>
+          </a:lnRef>
+          <a:fillRef idx="1">
+            <a:schemeClr val="accent1"/>
+          </a:fillRef>
+          <a:effectRef idx="0">
+            <a:schemeClr val="accent1"/>
+          </a:effectRef>
+          <a:fontRef idx="minor">
+            <a:schemeClr val="lt1"/>
+          </a:fontRef>
+        </p:style>
+        <p:txBody>
+          <a:bodyPr rtlCol="0" anchor="ctr"/>
+          <a:lstStyle/>
+          <a:p>
+            <a:pPr algn="ctr"/>
+            <a:endParaRPr lang="en-US"/>
+          </a:p>
+        </p:txBody>
+      </p:sp>
+      <p:sp>
+        <p:nvSpPr>
+          <p:cNvPr id="4" name="Tytuł 3">
+            <a:extLst>
+              <a:ext uri="{FF2B5EF4-FFF2-40B4-BE49-F238E27FC236}">
+                <a16:creationId xmlns:a16="http://schemas.microsoft.com/office/drawing/2014/main" id="{957E8338-0628-4317-ABC0-ED77745FD359}"/>
+              </a:ext>
+            </a:extLst>
+          </p:cNvPr>
+          <p:cNvSpPr>
+            <a:spLocks noGrp="1"/>
+          </p:cNvSpPr>
+          <p:nvPr>
+            <p:ph type="title"/>
+          </p:nvPr>
+        </p:nvSpPr>
+        <p:spPr>
+          <a:xfrm>
+            <a:off x="965200" y="1218476"/>
+            <a:ext cx="3187318" cy="4421050"/>
+          </a:xfrm>
+          <a:effectLst/>
+        </p:spPr>
+        <p:txBody>
+          <a:bodyPr anchor="ctr">
+            <a:normAutofit/>
+          </a:bodyPr>
+          <a:lstStyle/>
+          <a:p>
+            <a:pPr algn="r"/>
+            <a:r>
+              <a:rPr lang="pl-PL" sz="3200">
+                <a:solidFill>
+                  <a:schemeClr val="tx1"/>
+                </a:solidFill>
+              </a:rPr>
+              <a:t>Toolset</a:t>
+            </a:r>
+          </a:p>
+        </p:txBody>
+      </p:sp>
+      <p:cxnSp>
+        <p:nvCxnSpPr>
+          <p:cNvPr id="12" name="Straight Connector 11">
+            <a:extLst>
+              <a:ext uri="{FF2B5EF4-FFF2-40B4-BE49-F238E27FC236}">
+                <a16:creationId xmlns:a16="http://schemas.microsoft.com/office/drawing/2014/main" id="{A1CED323-FAF0-4E0B-8717-FC1F468A28FE}"/>
+              </a:ext>
+              <a:ext uri="{C183D7F6-B498-43B3-948B-1728B52AA6E4}">
+                <adec:decorative xmlns:adec="http://schemas.microsoft.com/office/drawing/2017/decorative" val="1"/>
+              </a:ext>
+            </a:extLst>
+          </p:cNvPr>
+          <p:cNvCxnSpPr>
+            <a:cxnSpLocks noGrp="1" noRot="1" noChangeAspect="1" noMove="1" noResize="1" noEditPoints="1" noAdjustHandles="1" noChangeArrowheads="1" noChangeShapeType="1"/>
+          </p:cNvCxnSpPr>
+          <p:nvPr>
+            <p:extLst>
+              <p:ext uri="{386F3935-93C4-4BCD-93E2-E3B085C9AB24}">
+                <p16:designElem xmlns:p16="http://schemas.microsoft.com/office/powerpoint/2015/main" val="1"/>
+              </p:ext>
+            </p:extLst>
+          </p:nvPr>
+        </p:nvCxnSpPr>
+        <p:spPr>
+          <a:xfrm>
+            <a:off x="4649634" y="1696777"/>
+            <a:ext cx="0" cy="3464447"/>
+          </a:xfrm>
+          <a:prstGeom prst="line">
+            <a:avLst/>
+          </a:prstGeom>
+          <a:ln w="22225"/>
+        </p:spPr>
+        <p:style>
+          <a:lnRef idx="1">
+            <a:schemeClr val="accent1"/>
+          </a:lnRef>
+          <a:fillRef idx="0">
+            <a:schemeClr val="accent1"/>
+          </a:fillRef>
+          <a:effectRef idx="0">
+            <a:schemeClr val="accent1"/>
+          </a:effectRef>
+          <a:fontRef idx="minor">
+            <a:schemeClr val="tx1"/>
+          </a:fontRef>
+        </p:style>
+      </p:cxnSp>
+      <p:sp>
+        <p:nvSpPr>
+          <p:cNvPr id="5" name="Symbol zastępczy zawartości 4">
+            <a:extLst>
+              <a:ext uri="{FF2B5EF4-FFF2-40B4-BE49-F238E27FC236}">
+                <a16:creationId xmlns:a16="http://schemas.microsoft.com/office/drawing/2014/main" id="{412BA740-1269-4C45-A0BC-1592C4F77DA6}"/>
+              </a:ext>
+            </a:extLst>
+          </p:cNvPr>
+          <p:cNvSpPr>
+            <a:spLocks noGrp="1"/>
+          </p:cNvSpPr>
+          <p:nvPr>
+            <p:ph idx="1"/>
+          </p:nvPr>
+        </p:nvSpPr>
+        <p:spPr>
+          <a:xfrm>
+            <a:off x="5146751" y="1218475"/>
+            <a:ext cx="6080050" cy="4421051"/>
+          </a:xfrm>
+          <a:effectLst/>
+        </p:spPr>
+        <p:txBody>
+          <a:bodyPr>
+            <a:normAutofit/>
+          </a:bodyPr>
+          <a:lstStyle/>
+          <a:p>
+            <a:r>
+              <a:rPr lang="pl-PL" sz="1600" dirty="0"/>
+              <a:t>Visual Studio </a:t>
+            </a:r>
+            <a:r>
+              <a:rPr lang="pl-PL" sz="1600" dirty="0" err="1"/>
+              <a:t>or</a:t>
+            </a:r>
+            <a:r>
+              <a:rPr lang="pl-PL" sz="1600" dirty="0"/>
+              <a:t> Visual Studio </a:t>
+            </a:r>
+            <a:r>
+              <a:rPr lang="pl-PL" sz="1600" dirty="0" err="1"/>
+              <a:t>Code</a:t>
+            </a:r>
+            <a:endParaRPr lang="pl-PL" sz="1600" dirty="0"/>
+          </a:p>
+          <a:p>
+            <a:r>
+              <a:rPr lang="pl-PL" sz="1600" dirty="0" err="1"/>
+              <a:t>xUnit</a:t>
+            </a:r>
+            <a:endParaRPr lang="pl-PL" sz="1600" dirty="0"/>
+          </a:p>
+        </p:txBody>
+      </p:sp>
+    </p:spTree>
+    <p:extLst>
+      <p:ext uri="{BB962C8B-B14F-4D97-AF65-F5344CB8AC3E}">
+        <p14:creationId xmlns:p14="http://schemas.microsoft.com/office/powerpoint/2010/main" val="2656507997"/>
+      </p:ext>
+    </p:extLst>
+  </p:cSld>
+  <p:clrMapOvr>
+    <a:masterClrMapping/>
+  </p:clrMapOvr>
+</p:sld>
+</file>
+
+<file path=ppt/slides/slide44.xml><?xml version="1.0" encoding="utf-8"?>
+<p:sld xmlns:a="http://schemas.openxmlformats.org/drawingml/2006/main" xmlns:r="http://schemas.openxmlformats.org/officeDocument/2006/relationships" xmlns:p="http://schemas.openxmlformats.org/presentationml/2006/main">
+  <p:cSld>
+    <p:spTree>
+      <p:nvGrpSpPr>
+        <p:cNvPr id="1" name=""/>
+        <p:cNvGrpSpPr/>
+        <p:nvPr/>
+      </p:nvGrpSpPr>
+      <p:grpSpPr>
+        <a:xfrm>
+          <a:off x="0" y="0"/>
+          <a:ext cx="0" cy="0"/>
+          <a:chOff x="0" y="0"/>
+          <a:chExt cx="0" cy="0"/>
+        </a:xfrm>
+      </p:grpSpPr>
+      <p:sp>
+        <p:nvSpPr>
+          <p:cNvPr id="4" name="Tytuł 3">
+            <a:extLst>
+              <a:ext uri="{FF2B5EF4-FFF2-40B4-BE49-F238E27FC236}">
+                <a16:creationId xmlns:a16="http://schemas.microsoft.com/office/drawing/2014/main" id="{FB6DB2D1-04D0-46FF-AACE-3F6DC0B935EC}"/>
+              </a:ext>
+            </a:extLst>
+          </p:cNvPr>
+          <p:cNvSpPr>
+            <a:spLocks noGrp="1"/>
+          </p:cNvSpPr>
+          <p:nvPr>
+            <p:ph type="title"/>
+          </p:nvPr>
+        </p:nvSpPr>
+        <p:spPr/>
+        <p:txBody>
+          <a:bodyPr/>
+          <a:lstStyle/>
+          <a:p>
+            <a:r>
+              <a:rPr lang="pl-PL" dirty="0" err="1"/>
+              <a:t>xUnit</a:t>
+            </a:r>
+            <a:endParaRPr lang="pl-PL" dirty="0"/>
+          </a:p>
+        </p:txBody>
+      </p:sp>
+      <p:sp>
+        <p:nvSpPr>
+          <p:cNvPr id="6" name="Symbol zastępczy zawartości 5">
+            <a:extLst>
+              <a:ext uri="{FF2B5EF4-FFF2-40B4-BE49-F238E27FC236}">
+                <a16:creationId xmlns:a16="http://schemas.microsoft.com/office/drawing/2014/main" id="{2B19FDC3-4F08-43D5-A559-B8ECE5E234C4}"/>
+              </a:ext>
+            </a:extLst>
+          </p:cNvPr>
+          <p:cNvSpPr>
+            <a:spLocks noGrp="1"/>
+          </p:cNvSpPr>
+          <p:nvPr>
+            <p:ph sz="half" idx="2"/>
+          </p:nvPr>
+        </p:nvSpPr>
+        <p:spPr>
+          <a:xfrm>
+            <a:off x="814728" y="2751138"/>
+            <a:ext cx="10200601" cy="3109913"/>
+          </a:xfrm>
+        </p:spPr>
+        <p:txBody>
+          <a:bodyPr>
+            <a:normAutofit/>
+          </a:bodyPr>
+          <a:lstStyle/>
+          <a:p>
+            <a:r>
+              <a:rPr lang="en-US" dirty="0"/>
+              <a:t>Unit Testing framework developed by MS</a:t>
+            </a:r>
+          </a:p>
+          <a:p>
+            <a:r>
+              <a:rPr lang="en-US" dirty="0"/>
+              <a:t>Available on </a:t>
+            </a:r>
+            <a:r>
+              <a:rPr lang="en-US" dirty="0" err="1"/>
+              <a:t>nuget</a:t>
+            </a:r>
+            <a:endParaRPr lang="en-US" dirty="0"/>
+          </a:p>
+          <a:p>
+            <a:r>
+              <a:rPr lang="en-US" dirty="0"/>
+              <a:t>Supported by variety of tools</a:t>
+            </a:r>
+          </a:p>
+          <a:p>
+            <a:r>
+              <a:rPr lang="en-US" dirty="0"/>
+              <a:t>Simple in use</a:t>
+            </a:r>
+          </a:p>
+          <a:p>
+            <a:r>
+              <a:rPr lang="en-US" dirty="0"/>
+              <a:t>Favors code clarity over attributes nightmare</a:t>
+            </a:r>
+          </a:p>
+          <a:p>
+            <a:r>
+              <a:rPr lang="en-US" dirty="0"/>
+              <a:t>”Basically” have only one attribute</a:t>
+            </a:r>
+          </a:p>
+        </p:txBody>
+      </p:sp>
+    </p:spTree>
+    <p:extLst>
+      <p:ext uri="{BB962C8B-B14F-4D97-AF65-F5344CB8AC3E}">
+        <p14:creationId xmlns:p14="http://schemas.microsoft.com/office/powerpoint/2010/main" val="1096268954"/>
+      </p:ext>
+    </p:extLst>
+  </p:cSld>
+  <p:clrMapOvr>
+    <a:masterClrMapping/>
+  </p:clrMapOvr>
+</p:sld>
+</file>
+
+<file path=ppt/slides/slide45.xml><?xml version="1.0" encoding="utf-8"?>
+<p:sld xmlns:a="http://schemas.openxmlformats.org/drawingml/2006/main" xmlns:r="http://schemas.openxmlformats.org/officeDocument/2006/relationships" xmlns:p="http://schemas.openxmlformats.org/presentationml/2006/main">
+  <p:cSld>
+    <p:spTree>
+      <p:nvGrpSpPr>
+        <p:cNvPr id="1" name=""/>
+        <p:cNvGrpSpPr/>
+        <p:nvPr/>
+      </p:nvGrpSpPr>
+      <p:grpSpPr>
+        <a:xfrm>
+          <a:off x="0" y="0"/>
+          <a:ext cx="0" cy="0"/>
+          <a:chOff x="0" y="0"/>
+          <a:chExt cx="0" cy="0"/>
+        </a:xfrm>
+      </p:grpSpPr>
+      <p:sp>
+        <p:nvSpPr>
+          <p:cNvPr id="4" name="Tytuł 3">
+            <a:extLst>
+              <a:ext uri="{FF2B5EF4-FFF2-40B4-BE49-F238E27FC236}">
+                <a16:creationId xmlns:a16="http://schemas.microsoft.com/office/drawing/2014/main" id="{FB6DB2D1-04D0-46FF-AACE-3F6DC0B935EC}"/>
+              </a:ext>
+            </a:extLst>
+          </p:cNvPr>
+          <p:cNvSpPr>
+            <a:spLocks noGrp="1"/>
+          </p:cNvSpPr>
+          <p:nvPr>
+            <p:ph type="title"/>
+          </p:nvPr>
+        </p:nvSpPr>
+        <p:spPr/>
+        <p:txBody>
+          <a:bodyPr/>
+          <a:lstStyle/>
+          <a:p>
+            <a:r>
+              <a:rPr lang="pl-PL" dirty="0" err="1"/>
+              <a:t>xUnit</a:t>
+            </a:r>
+            <a:r>
+              <a:rPr lang="pl-PL" dirty="0"/>
+              <a:t> - Demo</a:t>
+            </a:r>
+          </a:p>
+        </p:txBody>
+      </p:sp>
+      <p:sp>
+        <p:nvSpPr>
+          <p:cNvPr id="6" name="Symbol zastępczy zawartości 5">
+            <a:extLst>
+              <a:ext uri="{FF2B5EF4-FFF2-40B4-BE49-F238E27FC236}">
+                <a16:creationId xmlns:a16="http://schemas.microsoft.com/office/drawing/2014/main" id="{2B19FDC3-4F08-43D5-A559-B8ECE5E234C4}"/>
+              </a:ext>
+            </a:extLst>
+          </p:cNvPr>
+          <p:cNvSpPr>
+            <a:spLocks noGrp="1"/>
+          </p:cNvSpPr>
+          <p:nvPr>
+            <p:ph sz="half" idx="2"/>
+          </p:nvPr>
+        </p:nvSpPr>
+        <p:spPr>
+          <a:xfrm>
+            <a:off x="814728" y="2751138"/>
+            <a:ext cx="10200601" cy="3109913"/>
+          </a:xfrm>
+        </p:spPr>
+        <p:txBody>
+          <a:bodyPr>
+            <a:normAutofit/>
+          </a:bodyPr>
+          <a:lstStyle/>
+          <a:p>
+            <a:r>
+              <a:rPr lang="en-US" dirty="0"/>
+              <a:t>Simple Unit Test in simplest possible form</a:t>
+            </a:r>
+          </a:p>
+          <a:p>
+            <a:r>
+              <a:rPr lang="en-US" dirty="0"/>
+              <a:t>Sample Unit Test of Function</a:t>
+            </a:r>
+          </a:p>
+        </p:txBody>
+      </p:sp>
+    </p:spTree>
+    <p:extLst>
+      <p:ext uri="{BB962C8B-B14F-4D97-AF65-F5344CB8AC3E}">
+        <p14:creationId xmlns:p14="http://schemas.microsoft.com/office/powerpoint/2010/main" val="1664928670"/>
+      </p:ext>
+    </p:extLst>
+  </p:cSld>
+  <p:clrMapOvr>
+    <a:masterClrMapping/>
+  </p:clrMapOvr>
+</p:sld>
+</file>
+
+<file path=ppt/slides/slide46.xml><?xml version="1.0" encoding="utf-8"?>
+<p:sld xmlns:a="http://schemas.openxmlformats.org/drawingml/2006/main" xmlns:r="http://schemas.openxmlformats.org/officeDocument/2006/relationships" xmlns:p="http://schemas.openxmlformats.org/presentationml/2006/main">
+  <p:cSld>
+    <p:spTree>
+      <p:nvGrpSpPr>
+        <p:cNvPr id="1" name=""/>
+        <p:cNvGrpSpPr/>
+        <p:nvPr/>
+      </p:nvGrpSpPr>
+      <p:grpSpPr>
+        <a:xfrm>
+          <a:off x="0" y="0"/>
+          <a:ext cx="0" cy="0"/>
+          <a:chOff x="0" y="0"/>
+          <a:chExt cx="0" cy="0"/>
+        </a:xfrm>
+      </p:grpSpPr>
+      <p:sp>
+        <p:nvSpPr>
+          <p:cNvPr id="4" name="Tytuł 3">
+            <a:extLst>
+              <a:ext uri="{FF2B5EF4-FFF2-40B4-BE49-F238E27FC236}">
+                <a16:creationId xmlns:a16="http://schemas.microsoft.com/office/drawing/2014/main" id="{FB6DB2D1-04D0-46FF-AACE-3F6DC0B935EC}"/>
+              </a:ext>
+            </a:extLst>
+          </p:cNvPr>
+          <p:cNvSpPr>
+            <a:spLocks noGrp="1"/>
+          </p:cNvSpPr>
+          <p:nvPr>
+            <p:ph type="title"/>
+          </p:nvPr>
+        </p:nvSpPr>
+        <p:spPr/>
+        <p:txBody>
+          <a:bodyPr/>
+          <a:lstStyle/>
+          <a:p>
+            <a:r>
+              <a:rPr lang="en-US" dirty="0"/>
+              <a:t>Unit Testing – Exercises (1)</a:t>
+            </a:r>
+          </a:p>
+        </p:txBody>
+      </p:sp>
+      <p:sp>
+        <p:nvSpPr>
+          <p:cNvPr id="6" name="Symbol zastępczy zawartości 5">
+            <a:extLst>
+              <a:ext uri="{FF2B5EF4-FFF2-40B4-BE49-F238E27FC236}">
+                <a16:creationId xmlns:a16="http://schemas.microsoft.com/office/drawing/2014/main" id="{2B19FDC3-4F08-43D5-A559-B8ECE5E234C4}"/>
+              </a:ext>
+            </a:extLst>
+          </p:cNvPr>
+          <p:cNvSpPr>
+            <a:spLocks noGrp="1"/>
+          </p:cNvSpPr>
+          <p:nvPr>
+            <p:ph sz="half" idx="2"/>
+          </p:nvPr>
+        </p:nvSpPr>
+        <p:spPr>
+          <a:xfrm>
+            <a:off x="814728" y="2751138"/>
+            <a:ext cx="10200601" cy="3109913"/>
+          </a:xfrm>
+        </p:spPr>
+        <p:txBody>
+          <a:bodyPr>
+            <a:normAutofit/>
+          </a:bodyPr>
+          <a:lstStyle/>
+          <a:p>
+            <a:pPr>
+              <a:buFont typeface="+mj-lt"/>
+              <a:buAutoNum type="arabicPeriod"/>
+            </a:pPr>
+            <a:r>
+              <a:rPr lang="en-US" dirty="0"/>
+              <a:t>Create two projects</a:t>
+            </a:r>
+          </a:p>
+          <a:p>
+            <a:pPr marL="800100" lvl="1" indent="-342900">
+              <a:buFont typeface="+mj-lt"/>
+              <a:buAutoNum type="arabicPeriod"/>
+            </a:pPr>
+            <a:r>
+              <a:rPr lang="en-US" dirty="0" err="1"/>
+              <a:t>xUnit</a:t>
+            </a:r>
+            <a:r>
+              <a:rPr lang="en-US" dirty="0"/>
+              <a:t> (add reference to Function)</a:t>
+            </a:r>
+          </a:p>
+          <a:p>
+            <a:pPr marL="800100" lvl="1" indent="-342900">
+              <a:buFont typeface="+mj-lt"/>
+              <a:buAutoNum type="arabicPeriod"/>
+            </a:pPr>
+            <a:r>
+              <a:rPr lang="en-US" dirty="0"/>
+              <a:t>Function</a:t>
+            </a:r>
+          </a:p>
+          <a:p>
+            <a:pPr>
+              <a:buFont typeface="+mj-lt"/>
+              <a:buAutoNum type="arabicPeriod"/>
+            </a:pPr>
+            <a:r>
+              <a:rPr lang="en-US" dirty="0"/>
+              <a:t>Create new default </a:t>
+            </a:r>
+            <a:r>
+              <a:rPr lang="en-US" dirty="0" err="1"/>
+              <a:t>HttpTrigger</a:t>
+            </a:r>
+            <a:r>
+              <a:rPr lang="en-US" dirty="0"/>
+              <a:t> Function</a:t>
+            </a:r>
+          </a:p>
+          <a:p>
+            <a:pPr>
+              <a:buFont typeface="+mj-lt"/>
+              <a:buAutoNum type="arabicPeriod"/>
+            </a:pPr>
+            <a:r>
+              <a:rPr lang="en-US" dirty="0"/>
+              <a:t>Test if function work properly with name as:</a:t>
+            </a:r>
+          </a:p>
+          <a:p>
+            <a:pPr marL="800100" lvl="1" indent="-342900">
+              <a:buFont typeface="+mj-lt"/>
+              <a:buAutoNum type="arabicPeriod"/>
+            </a:pPr>
+            <a:r>
+              <a:rPr lang="en-US" dirty="0"/>
+              <a:t>Query string</a:t>
+            </a:r>
+          </a:p>
+          <a:p>
+            <a:pPr marL="800100" lvl="1" indent="-342900">
+              <a:buFont typeface="+mj-lt"/>
+              <a:buAutoNum type="arabicPeriod"/>
+            </a:pPr>
+            <a:r>
+              <a:rPr lang="en-US" dirty="0"/>
+              <a:t>Body</a:t>
+            </a:r>
+          </a:p>
+        </p:txBody>
+      </p:sp>
+    </p:spTree>
+    <p:extLst>
+      <p:ext uri="{BB962C8B-B14F-4D97-AF65-F5344CB8AC3E}">
+        <p14:creationId xmlns:p14="http://schemas.microsoft.com/office/powerpoint/2010/main" val="2459169714"/>
+      </p:ext>
+    </p:extLst>
+  </p:cSld>
+  <p:clrMapOvr>
+    <a:masterClrMapping/>
+  </p:clrMapOvr>
+</p:sld>
+</file>
+
+<file path=ppt/slides/slide47.xml><?xml version="1.0" encoding="utf-8"?>
+<p:sld xmlns:a="http://schemas.openxmlformats.org/drawingml/2006/main" xmlns:r="http://schemas.openxmlformats.org/officeDocument/2006/relationships" xmlns:p="http://schemas.openxmlformats.org/presentationml/2006/main">
+  <p:cSld>
+    <p:spTree>
+      <p:nvGrpSpPr>
+        <p:cNvPr id="1" name=""/>
+        <p:cNvGrpSpPr/>
+        <p:nvPr/>
+      </p:nvGrpSpPr>
+      <p:grpSpPr>
+        <a:xfrm>
+          <a:off x="0" y="0"/>
+          <a:ext cx="0" cy="0"/>
+          <a:chOff x="0" y="0"/>
+          <a:chExt cx="0" cy="0"/>
+        </a:xfrm>
+      </p:grpSpPr>
+      <p:sp>
+        <p:nvSpPr>
+          <p:cNvPr id="4" name="Tytuł 3">
+            <a:extLst>
+              <a:ext uri="{FF2B5EF4-FFF2-40B4-BE49-F238E27FC236}">
+                <a16:creationId xmlns:a16="http://schemas.microsoft.com/office/drawing/2014/main" id="{FB6DB2D1-04D0-46FF-AACE-3F6DC0B935EC}"/>
+              </a:ext>
+            </a:extLst>
+          </p:cNvPr>
+          <p:cNvSpPr>
+            <a:spLocks noGrp="1"/>
+          </p:cNvSpPr>
+          <p:nvPr>
+            <p:ph type="title"/>
+          </p:nvPr>
+        </p:nvSpPr>
+        <p:spPr/>
+        <p:txBody>
+          <a:bodyPr/>
+          <a:lstStyle/>
+          <a:p>
+            <a:r>
+              <a:rPr lang="en-US" dirty="0"/>
+              <a:t>Unit Testing – Exercises (2)</a:t>
+            </a:r>
+          </a:p>
+        </p:txBody>
+      </p:sp>
+      <p:sp>
+        <p:nvSpPr>
+          <p:cNvPr id="6" name="Symbol zastępczy zawartości 5">
+            <a:extLst>
+              <a:ext uri="{FF2B5EF4-FFF2-40B4-BE49-F238E27FC236}">
+                <a16:creationId xmlns:a16="http://schemas.microsoft.com/office/drawing/2014/main" id="{2B19FDC3-4F08-43D5-A559-B8ECE5E234C4}"/>
+              </a:ext>
+            </a:extLst>
+          </p:cNvPr>
+          <p:cNvSpPr>
+            <a:spLocks noGrp="1"/>
+          </p:cNvSpPr>
+          <p:nvPr>
+            <p:ph sz="half" idx="2"/>
+          </p:nvPr>
+        </p:nvSpPr>
+        <p:spPr>
+          <a:xfrm>
+            <a:off x="814728" y="2751138"/>
+            <a:ext cx="10200601" cy="3109913"/>
+          </a:xfrm>
+        </p:spPr>
+        <p:txBody>
+          <a:bodyPr>
+            <a:normAutofit/>
+          </a:bodyPr>
+          <a:lstStyle/>
+          <a:p>
+            <a:pPr>
+              <a:buFont typeface="+mj-lt"/>
+              <a:buAutoNum type="arabicPeriod"/>
+            </a:pPr>
+            <a:r>
+              <a:rPr lang="en-US" dirty="0"/>
+              <a:t>Unit test created Custom Binding</a:t>
+            </a:r>
+          </a:p>
+          <a:p>
+            <a:pPr>
+              <a:buFont typeface="+mj-lt"/>
+              <a:buAutoNum type="arabicPeriod"/>
+            </a:pPr>
+            <a:r>
+              <a:rPr lang="en-US" dirty="0"/>
+              <a:t>Unit test created Custom Trigger</a:t>
+            </a:r>
+          </a:p>
+        </p:txBody>
+      </p:sp>
+    </p:spTree>
+    <p:extLst>
+      <p:ext uri="{BB962C8B-B14F-4D97-AF65-F5344CB8AC3E}">
+        <p14:creationId xmlns:p14="http://schemas.microsoft.com/office/powerpoint/2010/main" val="1004685599"/>
+      </p:ext>
+    </p:extLst>
+  </p:cSld>
+  <p:clrMapOvr>
+    <a:masterClrMapping/>
+  </p:clrMapOvr>
+</p:sld>
+</file>
+
+<file path=ppt/slides/slide48.xml><?xml version="1.0" encoding="utf-8"?>
+<p:sld xmlns:a="http://schemas.openxmlformats.org/drawingml/2006/main" xmlns:r="http://schemas.openxmlformats.org/officeDocument/2006/relationships" xmlns:p="http://schemas.openxmlformats.org/presentationml/2006/main">
+  <p:cSld>
+    <p:spTree>
+      <p:nvGrpSpPr>
+        <p:cNvPr id="1" name=""/>
+        <p:cNvGrpSpPr/>
+        <p:nvPr/>
+      </p:nvGrpSpPr>
+      <p:grpSpPr>
+        <a:xfrm>
+          <a:off x="0" y="0"/>
+          <a:ext cx="0" cy="0"/>
+          <a:chOff x="0" y="0"/>
+          <a:chExt cx="0" cy="0"/>
+        </a:xfrm>
+      </p:grpSpPr>
+      <p:sp>
+        <p:nvSpPr>
+          <p:cNvPr id="2" name="Tytuł 1">
+            <a:extLst>
+              <a:ext uri="{FF2B5EF4-FFF2-40B4-BE49-F238E27FC236}">
+                <a16:creationId xmlns:a16="http://schemas.microsoft.com/office/drawing/2014/main" id="{E2706499-BF81-4E20-8EAB-2E0B2DE9D6C4}"/>
+              </a:ext>
+            </a:extLst>
+          </p:cNvPr>
+          <p:cNvSpPr>
+            <a:spLocks noGrp="1"/>
+          </p:cNvSpPr>
+          <p:nvPr>
+            <p:ph type="title"/>
+          </p:nvPr>
+        </p:nvSpPr>
+        <p:spPr/>
+        <p:txBody>
+          <a:bodyPr/>
+          <a:lstStyle/>
+          <a:p>
+            <a:r>
+              <a:rPr lang="pl-PL" dirty="0" err="1"/>
+              <a:t>Things</a:t>
+            </a:r>
+            <a:r>
+              <a:rPr lang="pl-PL" dirty="0"/>
+              <a:t> to </a:t>
+            </a:r>
+            <a:r>
+              <a:rPr lang="pl-PL" dirty="0" err="1"/>
+              <a:t>note</a:t>
+            </a:r>
+            <a:endParaRPr lang="pl-PL" dirty="0"/>
+          </a:p>
+        </p:txBody>
+      </p:sp>
+      <p:sp>
+        <p:nvSpPr>
+          <p:cNvPr id="3" name="Symbol zastępczy zawartości 2">
+            <a:extLst>
+              <a:ext uri="{FF2B5EF4-FFF2-40B4-BE49-F238E27FC236}">
+                <a16:creationId xmlns:a16="http://schemas.microsoft.com/office/drawing/2014/main" id="{C5FE8820-2ACD-4C35-B717-5E2B8F5E2412}"/>
+              </a:ext>
+            </a:extLst>
+          </p:cNvPr>
+          <p:cNvSpPr>
+            <a:spLocks noGrp="1"/>
+          </p:cNvSpPr>
+          <p:nvPr>
+            <p:ph idx="1"/>
+          </p:nvPr>
+        </p:nvSpPr>
+        <p:spPr/>
+        <p:txBody>
+          <a:bodyPr/>
+          <a:lstStyle/>
+          <a:p>
+            <a:r>
+              <a:rPr lang="en-US" dirty="0"/>
+              <a:t>Unit Testing function is almost as simple as unit testing normal code</a:t>
+            </a:r>
+          </a:p>
+          <a:p>
+            <a:r>
+              <a:rPr lang="en-US" dirty="0"/>
+              <a:t>Functions are testable by default</a:t>
+            </a:r>
+          </a:p>
+          <a:p>
+            <a:r>
+              <a:rPr lang="en-US" dirty="0"/>
+              <a:t>Testing is not always “simple”</a:t>
+            </a:r>
+          </a:p>
+        </p:txBody>
+      </p:sp>
+    </p:spTree>
+    <p:extLst>
+      <p:ext uri="{BB962C8B-B14F-4D97-AF65-F5344CB8AC3E}">
+        <p14:creationId xmlns:p14="http://schemas.microsoft.com/office/powerpoint/2010/main" val="2889480683"/>
+      </p:ext>
+    </p:extLst>
+  </p:cSld>
+  <p:clrMapOvr>
+    <a:masterClrMapping/>
+  </p:clrMapOvr>
+</p:sld>
+</file>
+
+<file path=ppt/slides/slide49.xml><?xml version="1.0" encoding="utf-8"?>
+<p:sld xmlns:a="http://schemas.openxmlformats.org/drawingml/2006/main" xmlns:r="http://schemas.openxmlformats.org/officeDocument/2006/relationships" xmlns:p="http://schemas.openxmlformats.org/presentationml/2006/main">
+  <p:cSld>
+    <p:spTree>
+      <p:nvGrpSpPr>
+        <p:cNvPr id="1" name=""/>
+        <p:cNvGrpSpPr/>
+        <p:nvPr/>
+      </p:nvGrpSpPr>
+      <p:grpSpPr>
+        <a:xfrm>
+          <a:off x="0" y="0"/>
+          <a:ext cx="0" cy="0"/>
+          <a:chOff x="0" y="0"/>
+          <a:chExt cx="0" cy="0"/>
+        </a:xfrm>
+      </p:grpSpPr>
+      <p:sp>
+        <p:nvSpPr>
+          <p:cNvPr id="4" name="Tytuł 3">
+            <a:extLst>
+              <a:ext uri="{FF2B5EF4-FFF2-40B4-BE49-F238E27FC236}">
+                <a16:creationId xmlns:a16="http://schemas.microsoft.com/office/drawing/2014/main" id="{940AAD03-8286-4236-9EE3-B78F24BCA549}"/>
+              </a:ext>
+            </a:extLst>
+          </p:cNvPr>
+          <p:cNvSpPr>
+            <a:spLocks noGrp="1"/>
+          </p:cNvSpPr>
+          <p:nvPr>
+            <p:ph type="title"/>
+          </p:nvPr>
+        </p:nvSpPr>
+        <p:spPr/>
+        <p:txBody>
+          <a:bodyPr/>
+          <a:lstStyle/>
+          <a:p>
+            <a:r>
+              <a:rPr lang="en-US" dirty="0"/>
+              <a:t>Azure Event Grid</a:t>
+            </a:r>
+          </a:p>
+        </p:txBody>
+      </p:sp>
+      <p:sp>
+        <p:nvSpPr>
+          <p:cNvPr id="5" name="Symbol zastępczy tekstu 4">
+            <a:extLst>
+              <a:ext uri="{FF2B5EF4-FFF2-40B4-BE49-F238E27FC236}">
+                <a16:creationId xmlns:a16="http://schemas.microsoft.com/office/drawing/2014/main" id="{311A8156-965D-471E-B80E-1B55ED7AFEFE}"/>
+              </a:ext>
+            </a:extLst>
+          </p:cNvPr>
+          <p:cNvSpPr>
+            <a:spLocks noGrp="1"/>
+          </p:cNvSpPr>
+          <p:nvPr>
+            <p:ph type="body" idx="1"/>
+          </p:nvPr>
+        </p:nvSpPr>
+        <p:spPr/>
+        <p:txBody>
+          <a:bodyPr/>
+          <a:lstStyle/>
+          <a:p>
+            <a:r>
+              <a:rPr lang="en-US" dirty="0"/>
+              <a:t>Serverless Events</a:t>
+            </a:r>
+          </a:p>
+        </p:txBody>
+      </p:sp>
+    </p:spTree>
+    <p:extLst>
+      <p:ext uri="{BB962C8B-B14F-4D97-AF65-F5344CB8AC3E}">
+        <p14:creationId xmlns:p14="http://schemas.microsoft.com/office/powerpoint/2010/main" val="1391527591"/>
       </p:ext>
     </p:extLst>
   </p:cSld>
@@ -15740,6 +17622,2030 @@
     <p:extLst>
       <p:ext uri="{BB962C8B-B14F-4D97-AF65-F5344CB8AC3E}">
         <p14:creationId xmlns:p14="http://schemas.microsoft.com/office/powerpoint/2010/main" val="7835718"/>
+      </p:ext>
+    </p:extLst>
+  </p:cSld>
+  <p:clrMapOvr>
+    <a:masterClrMapping/>
+  </p:clrMapOvr>
+</p:sld>
+</file>
+
+<file path=ppt/slides/slide50.xml><?xml version="1.0" encoding="utf-8"?>
+<p:sld xmlns:a="http://schemas.openxmlformats.org/drawingml/2006/main" xmlns:r="http://schemas.openxmlformats.org/officeDocument/2006/relationships" xmlns:p="http://schemas.openxmlformats.org/presentationml/2006/main">
+  <p:cSld>
+    <p:spTree>
+      <p:nvGrpSpPr>
+        <p:cNvPr id="1" name=""/>
+        <p:cNvGrpSpPr/>
+        <p:nvPr/>
+      </p:nvGrpSpPr>
+      <p:grpSpPr>
+        <a:xfrm>
+          <a:off x="0" y="0"/>
+          <a:ext cx="0" cy="0"/>
+          <a:chOff x="0" y="0"/>
+          <a:chExt cx="0" cy="0"/>
+        </a:xfrm>
+      </p:grpSpPr>
+      <p:sp>
+        <p:nvSpPr>
+          <p:cNvPr id="4" name="Tytuł 3">
+            <a:extLst>
+              <a:ext uri="{FF2B5EF4-FFF2-40B4-BE49-F238E27FC236}">
+                <a16:creationId xmlns:a16="http://schemas.microsoft.com/office/drawing/2014/main" id="{FB6DB2D1-04D0-46FF-AACE-3F6DC0B935EC}"/>
+              </a:ext>
+            </a:extLst>
+          </p:cNvPr>
+          <p:cNvSpPr>
+            <a:spLocks noGrp="1"/>
+          </p:cNvSpPr>
+          <p:nvPr>
+            <p:ph type="title"/>
+          </p:nvPr>
+        </p:nvSpPr>
+        <p:spPr/>
+        <p:txBody>
+          <a:bodyPr/>
+          <a:lstStyle/>
+          <a:p>
+            <a:r>
+              <a:rPr lang="pl-PL" dirty="0"/>
+              <a:t>Event </a:t>
+            </a:r>
+            <a:r>
+              <a:rPr lang="pl-PL" dirty="0" err="1"/>
+              <a:t>Grid</a:t>
+            </a:r>
+            <a:endParaRPr lang="pl-PL" dirty="0"/>
+          </a:p>
+        </p:txBody>
+      </p:sp>
+      <p:sp>
+        <p:nvSpPr>
+          <p:cNvPr id="6" name="Symbol zastępczy zawartości 5">
+            <a:extLst>
+              <a:ext uri="{FF2B5EF4-FFF2-40B4-BE49-F238E27FC236}">
+                <a16:creationId xmlns:a16="http://schemas.microsoft.com/office/drawing/2014/main" id="{2B19FDC3-4F08-43D5-A559-B8ECE5E234C4}"/>
+              </a:ext>
+            </a:extLst>
+          </p:cNvPr>
+          <p:cNvSpPr>
+            <a:spLocks noGrp="1"/>
+          </p:cNvSpPr>
+          <p:nvPr>
+            <p:ph sz="half" idx="2"/>
+          </p:nvPr>
+        </p:nvSpPr>
+        <p:spPr>
+          <a:xfrm>
+            <a:off x="814728" y="2751138"/>
+            <a:ext cx="10200601" cy="3109913"/>
+          </a:xfrm>
+        </p:spPr>
+        <p:txBody>
+          <a:bodyPr>
+            <a:normAutofit/>
+          </a:bodyPr>
+          <a:lstStyle/>
+          <a:p>
+            <a:r>
+              <a:rPr lang="en-US" dirty="0"/>
+              <a:t>Provides a way to connect multiple Azure services in </a:t>
+            </a:r>
+            <a:r>
+              <a:rPr lang="en-US" i="1" dirty="0"/>
+              <a:t>event driven</a:t>
+            </a:r>
+            <a:r>
+              <a:rPr lang="en-US" dirty="0"/>
+              <a:t> way</a:t>
+            </a:r>
+          </a:p>
+          <a:p>
+            <a:r>
+              <a:rPr lang="en-US" dirty="0"/>
+              <a:t>Made for performance and scalability</a:t>
+            </a:r>
+          </a:p>
+          <a:p>
+            <a:r>
+              <a:rPr lang="en-US" dirty="0"/>
+              <a:t>Allows filtering of events</a:t>
+            </a:r>
+          </a:p>
+          <a:p>
+            <a:r>
+              <a:rPr lang="en-US" dirty="0"/>
+              <a:t>A “missing” connecter between thing that had happened, and listener how is interested in what had happened</a:t>
+            </a:r>
+          </a:p>
+          <a:p>
+            <a:r>
+              <a:rPr lang="en-US" dirty="0"/>
+              <a:t>Works perfectly in “serverless” idea as reactive solution instead of proactive (pulling)</a:t>
+            </a:r>
+          </a:p>
+          <a:p>
+            <a:r>
+              <a:rPr lang="en-US" dirty="0"/>
+              <a:t>100 000 operation* per moth are free</a:t>
+            </a:r>
+          </a:p>
+        </p:txBody>
+      </p:sp>
+    </p:spTree>
+    <p:extLst>
+      <p:ext uri="{BB962C8B-B14F-4D97-AF65-F5344CB8AC3E}">
+        <p14:creationId xmlns:p14="http://schemas.microsoft.com/office/powerpoint/2010/main" val="3502236449"/>
+      </p:ext>
+    </p:extLst>
+  </p:cSld>
+  <p:clrMapOvr>
+    <a:masterClrMapping/>
+  </p:clrMapOvr>
+</p:sld>
+</file>
+
+<file path=ppt/slides/slide51.xml><?xml version="1.0" encoding="utf-8"?>
+<p:sld xmlns:a="http://schemas.openxmlformats.org/drawingml/2006/main" xmlns:r="http://schemas.openxmlformats.org/officeDocument/2006/relationships" xmlns:p="http://schemas.openxmlformats.org/presentationml/2006/main">
+  <p:cSld>
+    <p:spTree>
+      <p:nvGrpSpPr>
+        <p:cNvPr id="1" name=""/>
+        <p:cNvGrpSpPr/>
+        <p:nvPr/>
+      </p:nvGrpSpPr>
+      <p:grpSpPr>
+        <a:xfrm>
+          <a:off x="0" y="0"/>
+          <a:ext cx="0" cy="0"/>
+          <a:chOff x="0" y="0"/>
+          <a:chExt cx="0" cy="0"/>
+        </a:xfrm>
+      </p:grpSpPr>
+      <p:sp>
+        <p:nvSpPr>
+          <p:cNvPr id="4" name="Tytuł 3">
+            <a:extLst>
+              <a:ext uri="{FF2B5EF4-FFF2-40B4-BE49-F238E27FC236}">
+                <a16:creationId xmlns:a16="http://schemas.microsoft.com/office/drawing/2014/main" id="{FB6DB2D1-04D0-46FF-AACE-3F6DC0B935EC}"/>
+              </a:ext>
+            </a:extLst>
+          </p:cNvPr>
+          <p:cNvSpPr>
+            <a:spLocks noGrp="1"/>
+          </p:cNvSpPr>
+          <p:nvPr>
+            <p:ph type="title"/>
+          </p:nvPr>
+        </p:nvSpPr>
+        <p:spPr/>
+        <p:txBody>
+          <a:bodyPr/>
+          <a:lstStyle/>
+          <a:p>
+            <a:r>
+              <a:rPr lang="pl-PL" dirty="0"/>
+              <a:t>Event </a:t>
+            </a:r>
+            <a:r>
+              <a:rPr lang="pl-PL" dirty="0" err="1"/>
+              <a:t>Grid</a:t>
+            </a:r>
+            <a:r>
+              <a:rPr lang="pl-PL" dirty="0"/>
+              <a:t> vs Event </a:t>
+            </a:r>
+            <a:r>
+              <a:rPr lang="pl-PL" dirty="0" err="1"/>
+              <a:t>Hubs</a:t>
+            </a:r>
+            <a:r>
+              <a:rPr lang="pl-PL" dirty="0"/>
+              <a:t> vs Service Bus</a:t>
+            </a:r>
+          </a:p>
+        </p:txBody>
+      </p:sp>
+      <p:sp>
+        <p:nvSpPr>
+          <p:cNvPr id="6" name="Symbol zastępczy zawartości 5">
+            <a:extLst>
+              <a:ext uri="{FF2B5EF4-FFF2-40B4-BE49-F238E27FC236}">
+                <a16:creationId xmlns:a16="http://schemas.microsoft.com/office/drawing/2014/main" id="{2B19FDC3-4F08-43D5-A559-B8ECE5E234C4}"/>
+              </a:ext>
+            </a:extLst>
+          </p:cNvPr>
+          <p:cNvSpPr>
+            <a:spLocks noGrp="1"/>
+          </p:cNvSpPr>
+          <p:nvPr>
+            <p:ph sz="half" idx="2"/>
+          </p:nvPr>
+        </p:nvSpPr>
+        <p:spPr>
+          <a:xfrm>
+            <a:off x="814729" y="2751138"/>
+            <a:ext cx="3342934" cy="3109913"/>
+          </a:xfrm>
+        </p:spPr>
+        <p:txBody>
+          <a:bodyPr>
+            <a:normAutofit/>
+          </a:bodyPr>
+          <a:lstStyle/>
+          <a:p>
+            <a:r>
+              <a:rPr lang="en-US" dirty="0"/>
+              <a:t>React to status change</a:t>
+            </a:r>
+          </a:p>
+          <a:p>
+            <a:r>
+              <a:rPr lang="en-US" dirty="0"/>
+              <a:t>Serverless</a:t>
+            </a:r>
+          </a:p>
+          <a:p>
+            <a:r>
+              <a:rPr lang="en-US" dirty="0"/>
+              <a:t>At least one delivery</a:t>
+            </a:r>
+          </a:p>
+          <a:p>
+            <a:r>
+              <a:rPr lang="en-US" dirty="0"/>
+              <a:t>Dynamically scalable</a:t>
+            </a:r>
+          </a:p>
+          <a:p>
+            <a:r>
+              <a:rPr lang="en-US" dirty="0"/>
+              <a:t>Event base</a:t>
+            </a:r>
+          </a:p>
+        </p:txBody>
+      </p:sp>
+      <p:sp>
+        <p:nvSpPr>
+          <p:cNvPr id="5" name="Symbol zastępczy zawartości 5">
+            <a:extLst>
+              <a:ext uri="{FF2B5EF4-FFF2-40B4-BE49-F238E27FC236}">
+                <a16:creationId xmlns:a16="http://schemas.microsoft.com/office/drawing/2014/main" id="{7F50896E-9722-524A-8FE3-E5E185927610}"/>
+              </a:ext>
+            </a:extLst>
+          </p:cNvPr>
+          <p:cNvSpPr txBox="1">
+            <a:spLocks/>
+          </p:cNvSpPr>
+          <p:nvPr/>
+        </p:nvSpPr>
+        <p:spPr>
+          <a:xfrm>
+            <a:off x="4157663" y="2751138"/>
+            <a:ext cx="3342934" cy="3109913"/>
+          </a:xfrm>
+          <a:prstGeom prst="rect">
+            <a:avLst/>
+          </a:prstGeom>
+          <a:effectLst>
+            <a:outerShdw blurRad="50800" dir="14400000">
+              <a:srgbClr val="000000">
+                <a:alpha val="40000"/>
+              </a:srgbClr>
+            </a:outerShdw>
+          </a:effectLst>
+        </p:spPr>
+        <p:txBody>
+          <a:bodyPr vert="horz" lIns="91440" tIns="45720" rIns="91440" bIns="45720" rtlCol="0" anchor="t">
+            <a:normAutofit/>
+          </a:bodyPr>
+          <a:lstStyle>
+            <a:lvl1pPr marL="342900" indent="-342900" algn="l" defTabSz="457200" rtl="0" eaLnBrk="1" latinLnBrk="0" hangingPunct="1">
+              <a:spcBef>
+                <a:spcPct val="20000"/>
+              </a:spcBef>
+              <a:spcAft>
+                <a:spcPts val="600"/>
+              </a:spcAft>
+              <a:buClr>
+                <a:schemeClr val="accent1"/>
+              </a:buClr>
+              <a:buFont typeface="Wingdings 2" charset="2"/>
+              <a:buChar char=""/>
+              <a:defRPr sz="1800" kern="1200">
+                <a:solidFill>
+                  <a:schemeClr val="tx1"/>
+                </a:solidFill>
+                <a:latin typeface="+mn-lt"/>
+                <a:ea typeface="+mn-ea"/>
+                <a:cs typeface="+mn-cs"/>
+              </a:defRPr>
+            </a:lvl1pPr>
+            <a:lvl2pPr marL="742950" indent="-285750" algn="l" defTabSz="457200" rtl="0" eaLnBrk="1" latinLnBrk="0" hangingPunct="1">
+              <a:spcBef>
+                <a:spcPct val="20000"/>
+              </a:spcBef>
+              <a:spcAft>
+                <a:spcPts val="600"/>
+              </a:spcAft>
+              <a:buClr>
+                <a:schemeClr val="accent1"/>
+              </a:buClr>
+              <a:buFont typeface="Wingdings 2" charset="2"/>
+              <a:buChar char=""/>
+              <a:defRPr sz="1600" kern="1200">
+                <a:solidFill>
+                  <a:schemeClr val="tx1"/>
+                </a:solidFill>
+                <a:latin typeface="+mn-lt"/>
+                <a:ea typeface="+mn-ea"/>
+                <a:cs typeface="+mn-cs"/>
+              </a:defRPr>
+            </a:lvl2pPr>
+            <a:lvl3pPr marL="1143000" indent="-228600" algn="l" defTabSz="457200" rtl="0" eaLnBrk="1" latinLnBrk="0" hangingPunct="1">
+              <a:spcBef>
+                <a:spcPct val="20000"/>
+              </a:spcBef>
+              <a:spcAft>
+                <a:spcPts val="600"/>
+              </a:spcAft>
+              <a:buClr>
+                <a:schemeClr val="accent1"/>
+              </a:buClr>
+              <a:buFont typeface="Wingdings 2" charset="2"/>
+              <a:buChar char=""/>
+              <a:defRPr sz="1400" kern="1200">
+                <a:solidFill>
+                  <a:schemeClr val="tx1"/>
+                </a:solidFill>
+                <a:latin typeface="+mn-lt"/>
+                <a:ea typeface="+mn-ea"/>
+                <a:cs typeface="+mn-cs"/>
+              </a:defRPr>
+            </a:lvl3pPr>
+            <a:lvl4pPr marL="1600200" indent="-228600" algn="l" defTabSz="457200" rtl="0" eaLnBrk="1" latinLnBrk="0" hangingPunct="1">
+              <a:spcBef>
+                <a:spcPct val="20000"/>
+              </a:spcBef>
+              <a:spcAft>
+                <a:spcPts val="600"/>
+              </a:spcAft>
+              <a:buClr>
+                <a:schemeClr val="accent1"/>
+              </a:buClr>
+              <a:buFont typeface="Wingdings 2" charset="2"/>
+              <a:buChar char=""/>
+              <a:defRPr sz="1200" kern="1200">
+                <a:solidFill>
+                  <a:schemeClr val="tx1"/>
+                </a:solidFill>
+                <a:latin typeface="+mn-lt"/>
+                <a:ea typeface="+mn-ea"/>
+                <a:cs typeface="+mn-cs"/>
+              </a:defRPr>
+            </a:lvl4pPr>
+            <a:lvl5pPr marL="2057400" indent="-228600" algn="l" defTabSz="457200" rtl="0" eaLnBrk="1" latinLnBrk="0" hangingPunct="1">
+              <a:spcBef>
+                <a:spcPct val="20000"/>
+              </a:spcBef>
+              <a:spcAft>
+                <a:spcPts val="600"/>
+              </a:spcAft>
+              <a:buClr>
+                <a:schemeClr val="accent1"/>
+              </a:buClr>
+              <a:buFont typeface="Wingdings 2" charset="2"/>
+              <a:buChar char=""/>
+              <a:defRPr sz="1200" kern="1200">
+                <a:solidFill>
+                  <a:schemeClr val="tx1"/>
+                </a:solidFill>
+                <a:latin typeface="+mn-lt"/>
+                <a:ea typeface="+mn-ea"/>
+                <a:cs typeface="+mn-cs"/>
+              </a:defRPr>
+            </a:lvl5pPr>
+            <a:lvl6pPr marL="2400000" indent="-228600" algn="l" defTabSz="457200" rtl="0" eaLnBrk="1" latinLnBrk="0" hangingPunct="1">
+              <a:spcBef>
+                <a:spcPct val="20000"/>
+              </a:spcBef>
+              <a:spcAft>
+                <a:spcPts val="600"/>
+              </a:spcAft>
+              <a:buClr>
+                <a:schemeClr val="accent1"/>
+              </a:buClr>
+              <a:buFont typeface="Wingdings 2" charset="2"/>
+              <a:buChar char=""/>
+              <a:defRPr sz="1200" kern="1200">
+                <a:solidFill>
+                  <a:schemeClr val="tx1"/>
+                </a:solidFill>
+                <a:latin typeface="+mn-lt"/>
+                <a:ea typeface="+mn-ea"/>
+                <a:cs typeface="+mn-cs"/>
+              </a:defRPr>
+            </a:lvl6pPr>
+            <a:lvl7pPr marL="2800000" indent="-228600" algn="l" defTabSz="457200" rtl="0" eaLnBrk="1" latinLnBrk="0" hangingPunct="1">
+              <a:spcBef>
+                <a:spcPct val="20000"/>
+              </a:spcBef>
+              <a:spcAft>
+                <a:spcPts val="600"/>
+              </a:spcAft>
+              <a:buClr>
+                <a:schemeClr val="accent1"/>
+              </a:buClr>
+              <a:buFont typeface="Wingdings 2" charset="2"/>
+              <a:buChar char=""/>
+              <a:defRPr sz="1200" kern="1200">
+                <a:solidFill>
+                  <a:schemeClr val="tx1"/>
+                </a:solidFill>
+                <a:latin typeface="+mn-lt"/>
+                <a:ea typeface="+mn-ea"/>
+                <a:cs typeface="+mn-cs"/>
+              </a:defRPr>
+            </a:lvl7pPr>
+            <a:lvl8pPr marL="3200000" indent="-228600" algn="l" defTabSz="457200" rtl="0" eaLnBrk="1" latinLnBrk="0" hangingPunct="1">
+              <a:spcBef>
+                <a:spcPct val="20000"/>
+              </a:spcBef>
+              <a:spcAft>
+                <a:spcPts val="600"/>
+              </a:spcAft>
+              <a:buClr>
+                <a:schemeClr val="accent1"/>
+              </a:buClr>
+              <a:buFont typeface="Wingdings 2" charset="2"/>
+              <a:buChar char=""/>
+              <a:defRPr sz="1200" kern="1200">
+                <a:solidFill>
+                  <a:schemeClr val="tx1"/>
+                </a:solidFill>
+                <a:latin typeface="+mn-lt"/>
+                <a:ea typeface="+mn-ea"/>
+                <a:cs typeface="+mn-cs"/>
+              </a:defRPr>
+            </a:lvl8pPr>
+            <a:lvl9pPr marL="3600000" indent="-228600" algn="l" defTabSz="457200" rtl="0" eaLnBrk="1" latinLnBrk="0" hangingPunct="1">
+              <a:spcBef>
+                <a:spcPct val="20000"/>
+              </a:spcBef>
+              <a:spcAft>
+                <a:spcPts val="600"/>
+              </a:spcAft>
+              <a:buClr>
+                <a:schemeClr val="accent1"/>
+              </a:buClr>
+              <a:buFont typeface="Wingdings 2" charset="2"/>
+              <a:buChar char=""/>
+              <a:defRPr sz="1200" kern="1200">
+                <a:solidFill>
+                  <a:schemeClr val="tx1"/>
+                </a:solidFill>
+                <a:latin typeface="+mn-lt"/>
+                <a:ea typeface="+mn-ea"/>
+                <a:cs typeface="+mn-cs"/>
+              </a:defRPr>
+            </a:lvl9pPr>
+          </a:lstStyle>
+          <a:p>
+            <a:r>
+              <a:rPr lang="en-US" dirty="0"/>
+              <a:t>Distributed data streaming</a:t>
+            </a:r>
+          </a:p>
+          <a:p>
+            <a:r>
+              <a:rPr lang="en-US" dirty="0"/>
+              <a:t>Low latency</a:t>
+            </a:r>
+          </a:p>
+          <a:p>
+            <a:r>
+              <a:rPr lang="en-US" dirty="0"/>
+              <a:t>Millions of events per second</a:t>
+            </a:r>
+          </a:p>
+          <a:p>
+            <a:r>
+              <a:rPr lang="en-US" dirty="0"/>
+              <a:t>At least one delivery</a:t>
+            </a:r>
+          </a:p>
+          <a:p>
+            <a:r>
+              <a:rPr lang="en-US" dirty="0"/>
+              <a:t>Event base</a:t>
+            </a:r>
+          </a:p>
+        </p:txBody>
+      </p:sp>
+      <p:sp>
+        <p:nvSpPr>
+          <p:cNvPr id="7" name="Symbol zastępczy zawartości 5">
+            <a:extLst>
+              <a:ext uri="{FF2B5EF4-FFF2-40B4-BE49-F238E27FC236}">
+                <a16:creationId xmlns:a16="http://schemas.microsoft.com/office/drawing/2014/main" id="{1BDEF9DE-053B-C548-9D08-6264D0E63185}"/>
+              </a:ext>
+            </a:extLst>
+          </p:cNvPr>
+          <p:cNvSpPr txBox="1">
+            <a:spLocks/>
+          </p:cNvSpPr>
+          <p:nvPr/>
+        </p:nvSpPr>
+        <p:spPr>
+          <a:xfrm>
+            <a:off x="7500597" y="2751137"/>
+            <a:ext cx="3342934" cy="3109913"/>
+          </a:xfrm>
+          <a:prstGeom prst="rect">
+            <a:avLst/>
+          </a:prstGeom>
+          <a:effectLst>
+            <a:outerShdw blurRad="50800" dir="14400000">
+              <a:srgbClr val="000000">
+                <a:alpha val="40000"/>
+              </a:srgbClr>
+            </a:outerShdw>
+          </a:effectLst>
+        </p:spPr>
+        <p:txBody>
+          <a:bodyPr vert="horz" lIns="91440" tIns="45720" rIns="91440" bIns="45720" rtlCol="0" anchor="t">
+            <a:normAutofit/>
+          </a:bodyPr>
+          <a:lstStyle>
+            <a:lvl1pPr marL="342900" indent="-342900" algn="l" defTabSz="457200" rtl="0" eaLnBrk="1" latinLnBrk="0" hangingPunct="1">
+              <a:spcBef>
+                <a:spcPct val="20000"/>
+              </a:spcBef>
+              <a:spcAft>
+                <a:spcPts val="600"/>
+              </a:spcAft>
+              <a:buClr>
+                <a:schemeClr val="accent1"/>
+              </a:buClr>
+              <a:buFont typeface="Wingdings 2" charset="2"/>
+              <a:buChar char=""/>
+              <a:defRPr sz="1800" kern="1200">
+                <a:solidFill>
+                  <a:schemeClr val="tx1"/>
+                </a:solidFill>
+                <a:latin typeface="+mn-lt"/>
+                <a:ea typeface="+mn-ea"/>
+                <a:cs typeface="+mn-cs"/>
+              </a:defRPr>
+            </a:lvl1pPr>
+            <a:lvl2pPr marL="742950" indent="-285750" algn="l" defTabSz="457200" rtl="0" eaLnBrk="1" latinLnBrk="0" hangingPunct="1">
+              <a:spcBef>
+                <a:spcPct val="20000"/>
+              </a:spcBef>
+              <a:spcAft>
+                <a:spcPts val="600"/>
+              </a:spcAft>
+              <a:buClr>
+                <a:schemeClr val="accent1"/>
+              </a:buClr>
+              <a:buFont typeface="Wingdings 2" charset="2"/>
+              <a:buChar char=""/>
+              <a:defRPr sz="1600" kern="1200">
+                <a:solidFill>
+                  <a:schemeClr val="tx1"/>
+                </a:solidFill>
+                <a:latin typeface="+mn-lt"/>
+                <a:ea typeface="+mn-ea"/>
+                <a:cs typeface="+mn-cs"/>
+              </a:defRPr>
+            </a:lvl2pPr>
+            <a:lvl3pPr marL="1143000" indent="-228600" algn="l" defTabSz="457200" rtl="0" eaLnBrk="1" latinLnBrk="0" hangingPunct="1">
+              <a:spcBef>
+                <a:spcPct val="20000"/>
+              </a:spcBef>
+              <a:spcAft>
+                <a:spcPts val="600"/>
+              </a:spcAft>
+              <a:buClr>
+                <a:schemeClr val="accent1"/>
+              </a:buClr>
+              <a:buFont typeface="Wingdings 2" charset="2"/>
+              <a:buChar char=""/>
+              <a:defRPr sz="1400" kern="1200">
+                <a:solidFill>
+                  <a:schemeClr val="tx1"/>
+                </a:solidFill>
+                <a:latin typeface="+mn-lt"/>
+                <a:ea typeface="+mn-ea"/>
+                <a:cs typeface="+mn-cs"/>
+              </a:defRPr>
+            </a:lvl3pPr>
+            <a:lvl4pPr marL="1600200" indent="-228600" algn="l" defTabSz="457200" rtl="0" eaLnBrk="1" latinLnBrk="0" hangingPunct="1">
+              <a:spcBef>
+                <a:spcPct val="20000"/>
+              </a:spcBef>
+              <a:spcAft>
+                <a:spcPts val="600"/>
+              </a:spcAft>
+              <a:buClr>
+                <a:schemeClr val="accent1"/>
+              </a:buClr>
+              <a:buFont typeface="Wingdings 2" charset="2"/>
+              <a:buChar char=""/>
+              <a:defRPr sz="1200" kern="1200">
+                <a:solidFill>
+                  <a:schemeClr val="tx1"/>
+                </a:solidFill>
+                <a:latin typeface="+mn-lt"/>
+                <a:ea typeface="+mn-ea"/>
+                <a:cs typeface="+mn-cs"/>
+              </a:defRPr>
+            </a:lvl4pPr>
+            <a:lvl5pPr marL="2057400" indent="-228600" algn="l" defTabSz="457200" rtl="0" eaLnBrk="1" latinLnBrk="0" hangingPunct="1">
+              <a:spcBef>
+                <a:spcPct val="20000"/>
+              </a:spcBef>
+              <a:spcAft>
+                <a:spcPts val="600"/>
+              </a:spcAft>
+              <a:buClr>
+                <a:schemeClr val="accent1"/>
+              </a:buClr>
+              <a:buFont typeface="Wingdings 2" charset="2"/>
+              <a:buChar char=""/>
+              <a:defRPr sz="1200" kern="1200">
+                <a:solidFill>
+                  <a:schemeClr val="tx1"/>
+                </a:solidFill>
+                <a:latin typeface="+mn-lt"/>
+                <a:ea typeface="+mn-ea"/>
+                <a:cs typeface="+mn-cs"/>
+              </a:defRPr>
+            </a:lvl5pPr>
+            <a:lvl6pPr marL="2400000" indent="-228600" algn="l" defTabSz="457200" rtl="0" eaLnBrk="1" latinLnBrk="0" hangingPunct="1">
+              <a:spcBef>
+                <a:spcPct val="20000"/>
+              </a:spcBef>
+              <a:spcAft>
+                <a:spcPts val="600"/>
+              </a:spcAft>
+              <a:buClr>
+                <a:schemeClr val="accent1"/>
+              </a:buClr>
+              <a:buFont typeface="Wingdings 2" charset="2"/>
+              <a:buChar char=""/>
+              <a:defRPr sz="1200" kern="1200">
+                <a:solidFill>
+                  <a:schemeClr val="tx1"/>
+                </a:solidFill>
+                <a:latin typeface="+mn-lt"/>
+                <a:ea typeface="+mn-ea"/>
+                <a:cs typeface="+mn-cs"/>
+              </a:defRPr>
+            </a:lvl6pPr>
+            <a:lvl7pPr marL="2800000" indent="-228600" algn="l" defTabSz="457200" rtl="0" eaLnBrk="1" latinLnBrk="0" hangingPunct="1">
+              <a:spcBef>
+                <a:spcPct val="20000"/>
+              </a:spcBef>
+              <a:spcAft>
+                <a:spcPts val="600"/>
+              </a:spcAft>
+              <a:buClr>
+                <a:schemeClr val="accent1"/>
+              </a:buClr>
+              <a:buFont typeface="Wingdings 2" charset="2"/>
+              <a:buChar char=""/>
+              <a:defRPr sz="1200" kern="1200">
+                <a:solidFill>
+                  <a:schemeClr val="tx1"/>
+                </a:solidFill>
+                <a:latin typeface="+mn-lt"/>
+                <a:ea typeface="+mn-ea"/>
+                <a:cs typeface="+mn-cs"/>
+              </a:defRPr>
+            </a:lvl7pPr>
+            <a:lvl8pPr marL="3200000" indent="-228600" algn="l" defTabSz="457200" rtl="0" eaLnBrk="1" latinLnBrk="0" hangingPunct="1">
+              <a:spcBef>
+                <a:spcPct val="20000"/>
+              </a:spcBef>
+              <a:spcAft>
+                <a:spcPts val="600"/>
+              </a:spcAft>
+              <a:buClr>
+                <a:schemeClr val="accent1"/>
+              </a:buClr>
+              <a:buFont typeface="Wingdings 2" charset="2"/>
+              <a:buChar char=""/>
+              <a:defRPr sz="1200" kern="1200">
+                <a:solidFill>
+                  <a:schemeClr val="tx1"/>
+                </a:solidFill>
+                <a:latin typeface="+mn-lt"/>
+                <a:ea typeface="+mn-ea"/>
+                <a:cs typeface="+mn-cs"/>
+              </a:defRPr>
+            </a:lvl8pPr>
+            <a:lvl9pPr marL="3600000" indent="-228600" algn="l" defTabSz="457200" rtl="0" eaLnBrk="1" latinLnBrk="0" hangingPunct="1">
+              <a:spcBef>
+                <a:spcPct val="20000"/>
+              </a:spcBef>
+              <a:spcAft>
+                <a:spcPts val="600"/>
+              </a:spcAft>
+              <a:buClr>
+                <a:schemeClr val="accent1"/>
+              </a:buClr>
+              <a:buFont typeface="Wingdings 2" charset="2"/>
+              <a:buChar char=""/>
+              <a:defRPr sz="1200" kern="1200">
+                <a:solidFill>
+                  <a:schemeClr val="tx1"/>
+                </a:solidFill>
+                <a:latin typeface="+mn-lt"/>
+                <a:ea typeface="+mn-ea"/>
+                <a:cs typeface="+mn-cs"/>
+              </a:defRPr>
+            </a:lvl9pPr>
+          </a:lstStyle>
+          <a:p>
+            <a:r>
+              <a:rPr lang="en-US" dirty="0"/>
+              <a:t>Order processing</a:t>
+            </a:r>
+          </a:p>
+          <a:p>
+            <a:r>
+              <a:rPr lang="en-US" dirty="0"/>
+              <a:t>Financial transactions</a:t>
+            </a:r>
+          </a:p>
+          <a:p>
+            <a:r>
+              <a:rPr lang="en-US" dirty="0"/>
+              <a:t>Reliable delivery that needs polling</a:t>
+            </a:r>
+          </a:p>
+          <a:p>
+            <a:r>
+              <a:rPr lang="en-US" dirty="0"/>
+              <a:t>Advanced messaging features</a:t>
+            </a:r>
+          </a:p>
+          <a:p>
+            <a:r>
+              <a:rPr lang="en-US" dirty="0"/>
+              <a:t>In-order delivery</a:t>
+            </a:r>
+          </a:p>
+          <a:p>
+            <a:r>
+              <a:rPr lang="en-US" dirty="0"/>
+              <a:t>At least one delivery</a:t>
+            </a:r>
+          </a:p>
+        </p:txBody>
+      </p:sp>
+    </p:spTree>
+    <p:extLst>
+      <p:ext uri="{BB962C8B-B14F-4D97-AF65-F5344CB8AC3E}">
+        <p14:creationId xmlns:p14="http://schemas.microsoft.com/office/powerpoint/2010/main" val="3400455402"/>
+      </p:ext>
+    </p:extLst>
+  </p:cSld>
+  <p:clrMapOvr>
+    <a:masterClrMapping/>
+  </p:clrMapOvr>
+</p:sld>
+</file>
+
+<file path=ppt/slides/slide52.xml><?xml version="1.0" encoding="utf-8"?>
+<p:sld xmlns:a="http://schemas.openxmlformats.org/drawingml/2006/main" xmlns:r="http://schemas.openxmlformats.org/officeDocument/2006/relationships" xmlns:p="http://schemas.openxmlformats.org/presentationml/2006/main">
+  <p:cSld>
+    <p:spTree>
+      <p:nvGrpSpPr>
+        <p:cNvPr id="1" name=""/>
+        <p:cNvGrpSpPr/>
+        <p:nvPr/>
+      </p:nvGrpSpPr>
+      <p:grpSpPr>
+        <a:xfrm>
+          <a:off x="0" y="0"/>
+          <a:ext cx="0" cy="0"/>
+          <a:chOff x="0" y="0"/>
+          <a:chExt cx="0" cy="0"/>
+        </a:xfrm>
+      </p:grpSpPr>
+      <p:sp>
+        <p:nvSpPr>
+          <p:cNvPr id="4" name="Tytuł 3">
+            <a:extLst>
+              <a:ext uri="{FF2B5EF4-FFF2-40B4-BE49-F238E27FC236}">
+                <a16:creationId xmlns:a16="http://schemas.microsoft.com/office/drawing/2014/main" id="{FB6DB2D1-04D0-46FF-AACE-3F6DC0B935EC}"/>
+              </a:ext>
+            </a:extLst>
+          </p:cNvPr>
+          <p:cNvSpPr>
+            <a:spLocks noGrp="1"/>
+          </p:cNvSpPr>
+          <p:nvPr>
+            <p:ph type="title"/>
+          </p:nvPr>
+        </p:nvSpPr>
+        <p:spPr/>
+        <p:txBody>
+          <a:bodyPr/>
+          <a:lstStyle/>
+          <a:p>
+            <a:r>
+              <a:rPr lang="pl-PL" dirty="0"/>
+              <a:t>Event </a:t>
+            </a:r>
+            <a:r>
+              <a:rPr lang="pl-PL" dirty="0" err="1"/>
+              <a:t>Grid</a:t>
+            </a:r>
+            <a:r>
+              <a:rPr lang="pl-PL" dirty="0"/>
+              <a:t> – </a:t>
+            </a:r>
+            <a:r>
+              <a:rPr lang="pl-PL" dirty="0" err="1"/>
+              <a:t>change</a:t>
+            </a:r>
+            <a:r>
+              <a:rPr lang="pl-PL" dirty="0"/>
+              <a:t> </a:t>
+            </a:r>
+            <a:r>
+              <a:rPr lang="pl-PL" dirty="0" err="1"/>
+              <a:t>this</a:t>
+            </a:r>
+            <a:endParaRPr lang="pl-PL" dirty="0"/>
+          </a:p>
+        </p:txBody>
+      </p:sp>
+      <p:pic>
+        <p:nvPicPr>
+          <p:cNvPr id="7" name="Content Placeholder 6">
+            <a:extLst>
+              <a:ext uri="{FF2B5EF4-FFF2-40B4-BE49-F238E27FC236}">
+                <a16:creationId xmlns:a16="http://schemas.microsoft.com/office/drawing/2014/main" id="{E50C7DB3-67EC-4743-961C-0C6EF81972F9}"/>
+              </a:ext>
+            </a:extLst>
+          </p:cNvPr>
+          <p:cNvPicPr>
+            <a:picLocks noGrp="1" noChangeAspect="1"/>
+          </p:cNvPicPr>
+          <p:nvPr>
+            <p:ph sz="half" idx="2"/>
+          </p:nvPr>
+        </p:nvPicPr>
+        <p:blipFill>
+          <a:blip r:embed="rId2"/>
+          <a:stretch>
+            <a:fillRect/>
+          </a:stretch>
+        </p:blipFill>
+        <p:spPr>
+          <a:xfrm>
+            <a:off x="576102" y="2700338"/>
+            <a:ext cx="11085444" cy="3200400"/>
+          </a:xfrm>
+        </p:spPr>
+      </p:pic>
+    </p:spTree>
+    <p:extLst>
+      <p:ext uri="{BB962C8B-B14F-4D97-AF65-F5344CB8AC3E}">
+        <p14:creationId xmlns:p14="http://schemas.microsoft.com/office/powerpoint/2010/main" val="3999151949"/>
+      </p:ext>
+    </p:extLst>
+  </p:cSld>
+  <p:clrMapOvr>
+    <a:masterClrMapping/>
+  </p:clrMapOvr>
+</p:sld>
+</file>
+
+<file path=ppt/slides/slide53.xml><?xml version="1.0" encoding="utf-8"?>
+<p:sld xmlns:a="http://schemas.openxmlformats.org/drawingml/2006/main" xmlns:r="http://schemas.openxmlformats.org/officeDocument/2006/relationships" xmlns:p="http://schemas.openxmlformats.org/presentationml/2006/main">
+  <p:cSld>
+    <p:spTree>
+      <p:nvGrpSpPr>
+        <p:cNvPr id="1" name=""/>
+        <p:cNvGrpSpPr/>
+        <p:nvPr/>
+      </p:nvGrpSpPr>
+      <p:grpSpPr>
+        <a:xfrm>
+          <a:off x="0" y="0"/>
+          <a:ext cx="0" cy="0"/>
+          <a:chOff x="0" y="0"/>
+          <a:chExt cx="0" cy="0"/>
+        </a:xfrm>
+      </p:grpSpPr>
+      <p:sp>
+        <p:nvSpPr>
+          <p:cNvPr id="4" name="Tytuł 3">
+            <a:extLst>
+              <a:ext uri="{FF2B5EF4-FFF2-40B4-BE49-F238E27FC236}">
+                <a16:creationId xmlns:a16="http://schemas.microsoft.com/office/drawing/2014/main" id="{FB6DB2D1-04D0-46FF-AACE-3F6DC0B935EC}"/>
+              </a:ext>
+            </a:extLst>
+          </p:cNvPr>
+          <p:cNvSpPr>
+            <a:spLocks noGrp="1"/>
+          </p:cNvSpPr>
+          <p:nvPr>
+            <p:ph type="title"/>
+          </p:nvPr>
+        </p:nvSpPr>
+        <p:spPr/>
+        <p:txBody>
+          <a:bodyPr/>
+          <a:lstStyle/>
+          <a:p>
+            <a:r>
+              <a:rPr lang="pl-PL" dirty="0"/>
+              <a:t>Event </a:t>
+            </a:r>
+            <a:r>
+              <a:rPr lang="pl-PL" dirty="0" err="1"/>
+              <a:t>Grid</a:t>
+            </a:r>
+            <a:r>
+              <a:rPr lang="pl-PL" dirty="0"/>
+              <a:t> – </a:t>
+            </a:r>
+            <a:r>
+              <a:rPr lang="pl-PL" dirty="0" err="1"/>
+              <a:t>into</a:t>
+            </a:r>
+            <a:r>
+              <a:rPr lang="pl-PL" dirty="0"/>
+              <a:t> </a:t>
+            </a:r>
+            <a:r>
+              <a:rPr lang="pl-PL" dirty="0" err="1"/>
+              <a:t>this</a:t>
+            </a:r>
+            <a:endParaRPr lang="pl-PL" dirty="0"/>
+          </a:p>
+        </p:txBody>
+      </p:sp>
+      <p:pic>
+        <p:nvPicPr>
+          <p:cNvPr id="6" name="Content Placeholder 5">
+            <a:extLst>
+              <a:ext uri="{FF2B5EF4-FFF2-40B4-BE49-F238E27FC236}">
+                <a16:creationId xmlns:a16="http://schemas.microsoft.com/office/drawing/2014/main" id="{E0CCFA56-5DFD-7D40-A96B-3D456318B4E9}"/>
+              </a:ext>
+            </a:extLst>
+          </p:cNvPr>
+          <p:cNvPicPr>
+            <a:picLocks noGrp="1" noChangeAspect="1"/>
+          </p:cNvPicPr>
+          <p:nvPr>
+            <p:ph sz="half" idx="2"/>
+          </p:nvPr>
+        </p:nvPicPr>
+        <p:blipFill>
+          <a:blip r:embed="rId2"/>
+          <a:stretch>
+            <a:fillRect/>
+          </a:stretch>
+        </p:blipFill>
+        <p:spPr>
+          <a:xfrm>
+            <a:off x="810000" y="2351957"/>
+            <a:ext cx="10205663" cy="3771145"/>
+          </a:xfrm>
+        </p:spPr>
+      </p:pic>
+    </p:spTree>
+    <p:extLst>
+      <p:ext uri="{BB962C8B-B14F-4D97-AF65-F5344CB8AC3E}">
+        <p14:creationId xmlns:p14="http://schemas.microsoft.com/office/powerpoint/2010/main" val="1898753230"/>
+      </p:ext>
+    </p:extLst>
+  </p:cSld>
+  <p:clrMapOvr>
+    <a:masterClrMapping/>
+  </p:clrMapOvr>
+</p:sld>
+</file>
+
+<file path=ppt/slides/slide54.xml><?xml version="1.0" encoding="utf-8"?>
+<p:sld xmlns:a="http://schemas.openxmlformats.org/drawingml/2006/main" xmlns:r="http://schemas.openxmlformats.org/officeDocument/2006/relationships" xmlns:p="http://schemas.openxmlformats.org/presentationml/2006/main">
+  <p:cSld>
+    <p:spTree>
+      <p:nvGrpSpPr>
+        <p:cNvPr id="1" name=""/>
+        <p:cNvGrpSpPr/>
+        <p:nvPr/>
+      </p:nvGrpSpPr>
+      <p:grpSpPr>
+        <a:xfrm>
+          <a:off x="0" y="0"/>
+          <a:ext cx="0" cy="0"/>
+          <a:chOff x="0" y="0"/>
+          <a:chExt cx="0" cy="0"/>
+        </a:xfrm>
+      </p:grpSpPr>
+      <p:sp>
+        <p:nvSpPr>
+          <p:cNvPr id="4" name="Tytuł 3">
+            <a:extLst>
+              <a:ext uri="{FF2B5EF4-FFF2-40B4-BE49-F238E27FC236}">
+                <a16:creationId xmlns:a16="http://schemas.microsoft.com/office/drawing/2014/main" id="{FB6DB2D1-04D0-46FF-AACE-3F6DC0B935EC}"/>
+              </a:ext>
+            </a:extLst>
+          </p:cNvPr>
+          <p:cNvSpPr>
+            <a:spLocks noGrp="1"/>
+          </p:cNvSpPr>
+          <p:nvPr>
+            <p:ph type="title"/>
+          </p:nvPr>
+        </p:nvSpPr>
+        <p:spPr/>
+        <p:txBody>
+          <a:bodyPr/>
+          <a:lstStyle/>
+          <a:p>
+            <a:r>
+              <a:rPr lang="pl-PL" dirty="0"/>
+              <a:t>Event </a:t>
+            </a:r>
+            <a:r>
+              <a:rPr lang="pl-PL" dirty="0" err="1"/>
+              <a:t>Grid</a:t>
+            </a:r>
+            <a:r>
+              <a:rPr lang="pl-PL" dirty="0"/>
+              <a:t> </a:t>
+            </a:r>
+            <a:r>
+              <a:rPr lang="pl-PL" dirty="0" err="1"/>
+              <a:t>Publishers</a:t>
+            </a:r>
+            <a:endParaRPr lang="pl-PL" dirty="0"/>
+          </a:p>
+        </p:txBody>
+      </p:sp>
+      <p:sp>
+        <p:nvSpPr>
+          <p:cNvPr id="5" name="Symbol zastępczy tekstu 4">
+            <a:extLst>
+              <a:ext uri="{FF2B5EF4-FFF2-40B4-BE49-F238E27FC236}">
+                <a16:creationId xmlns:a16="http://schemas.microsoft.com/office/drawing/2014/main" id="{DDECDB50-AE48-4F2C-9949-389F3AACE293}"/>
+              </a:ext>
+            </a:extLst>
+          </p:cNvPr>
+          <p:cNvSpPr>
+            <a:spLocks noGrp="1"/>
+          </p:cNvSpPr>
+          <p:nvPr>
+            <p:ph type="body" idx="1"/>
+          </p:nvPr>
+        </p:nvSpPr>
+        <p:spPr/>
+        <p:txBody>
+          <a:bodyPr/>
+          <a:lstStyle/>
+          <a:p>
+            <a:r>
+              <a:rPr lang="en-US" dirty="0"/>
+              <a:t>Built in</a:t>
+            </a:r>
+          </a:p>
+        </p:txBody>
+      </p:sp>
+      <p:sp>
+        <p:nvSpPr>
+          <p:cNvPr id="6" name="Symbol zastępczy zawartości 5">
+            <a:extLst>
+              <a:ext uri="{FF2B5EF4-FFF2-40B4-BE49-F238E27FC236}">
+                <a16:creationId xmlns:a16="http://schemas.microsoft.com/office/drawing/2014/main" id="{2B19FDC3-4F08-43D5-A559-B8ECE5E234C4}"/>
+              </a:ext>
+            </a:extLst>
+          </p:cNvPr>
+          <p:cNvSpPr>
+            <a:spLocks noGrp="1"/>
+          </p:cNvSpPr>
+          <p:nvPr>
+            <p:ph sz="half" idx="2"/>
+          </p:nvPr>
+        </p:nvSpPr>
+        <p:spPr/>
+        <p:txBody>
+          <a:bodyPr>
+            <a:normAutofit fontScale="85000" lnSpcReduction="20000"/>
+          </a:bodyPr>
+          <a:lstStyle/>
+          <a:p>
+            <a:r>
+              <a:rPr lang="pl-PL" dirty="0" err="1"/>
+              <a:t>Azure</a:t>
+            </a:r>
+            <a:r>
+              <a:rPr lang="pl-PL" dirty="0"/>
+              <a:t> </a:t>
+            </a:r>
+            <a:r>
+              <a:rPr lang="pl-PL" dirty="0" err="1"/>
+              <a:t>Subscriptions</a:t>
+            </a:r>
+            <a:r>
+              <a:rPr lang="pl-PL" dirty="0"/>
+              <a:t> </a:t>
+            </a:r>
+          </a:p>
+          <a:p>
+            <a:r>
+              <a:rPr lang="pl-PL" dirty="0" err="1"/>
+              <a:t>Container</a:t>
+            </a:r>
+            <a:r>
+              <a:rPr lang="pl-PL" dirty="0"/>
+              <a:t> Registry</a:t>
+            </a:r>
+          </a:p>
+          <a:p>
+            <a:r>
+              <a:rPr lang="pl-PL" dirty="0"/>
+              <a:t>Event </a:t>
+            </a:r>
+            <a:r>
+              <a:rPr lang="pl-PL" dirty="0" err="1"/>
+              <a:t>Hubs</a:t>
+            </a:r>
+            <a:endParaRPr lang="pl-PL" dirty="0"/>
+          </a:p>
+          <a:p>
+            <a:r>
+              <a:rPr lang="pl-PL" dirty="0" err="1"/>
+              <a:t>IoT</a:t>
+            </a:r>
+            <a:r>
+              <a:rPr lang="pl-PL" dirty="0"/>
+              <a:t> Hub</a:t>
+            </a:r>
+          </a:p>
+          <a:p>
+            <a:r>
+              <a:rPr lang="pl-PL" dirty="0"/>
+              <a:t>Media Services</a:t>
+            </a:r>
+          </a:p>
+          <a:p>
+            <a:r>
+              <a:rPr lang="pl-PL" dirty="0"/>
+              <a:t>Resource </a:t>
+            </a:r>
+            <a:r>
+              <a:rPr lang="pl-PL" dirty="0" err="1"/>
+              <a:t>Groups</a:t>
+            </a:r>
+            <a:endParaRPr lang="pl-PL" dirty="0"/>
+          </a:p>
+          <a:p>
+            <a:r>
+              <a:rPr lang="pl-PL" dirty="0"/>
+              <a:t>Service Bus</a:t>
+            </a:r>
+          </a:p>
+          <a:p>
+            <a:r>
+              <a:rPr lang="pl-PL" dirty="0"/>
+              <a:t>Storage </a:t>
+            </a:r>
+            <a:r>
+              <a:rPr lang="pl-PL" dirty="0" err="1"/>
+              <a:t>Blob</a:t>
+            </a:r>
+            <a:endParaRPr lang="pl-PL" dirty="0"/>
+          </a:p>
+          <a:p>
+            <a:r>
+              <a:rPr lang="pl-PL" dirty="0"/>
+              <a:t>Storage General-</a:t>
+            </a:r>
+            <a:r>
+              <a:rPr lang="pl-PL" dirty="0" err="1"/>
+              <a:t>purpose</a:t>
+            </a:r>
+            <a:endParaRPr lang="pl-PL" dirty="0"/>
+          </a:p>
+          <a:p>
+            <a:r>
+              <a:rPr lang="pl-PL" dirty="0" err="1"/>
+              <a:t>Azure</a:t>
+            </a:r>
+            <a:r>
+              <a:rPr lang="pl-PL" dirty="0"/>
+              <a:t> </a:t>
+            </a:r>
+            <a:r>
+              <a:rPr lang="pl-PL" dirty="0" err="1"/>
+              <a:t>Maps</a:t>
+            </a:r>
+            <a:endParaRPr lang="pl-PL" dirty="0"/>
+          </a:p>
+        </p:txBody>
+      </p:sp>
+      <p:sp>
+        <p:nvSpPr>
+          <p:cNvPr id="7" name="Symbol zastępczy tekstu 6">
+            <a:extLst>
+              <a:ext uri="{FF2B5EF4-FFF2-40B4-BE49-F238E27FC236}">
+                <a16:creationId xmlns:a16="http://schemas.microsoft.com/office/drawing/2014/main" id="{F9BC82B8-AFF7-47B5-BB53-D14C461F5948}"/>
+              </a:ext>
+            </a:extLst>
+          </p:cNvPr>
+          <p:cNvSpPr>
+            <a:spLocks noGrp="1"/>
+          </p:cNvSpPr>
+          <p:nvPr>
+            <p:ph type="body" sz="quarter" idx="3"/>
+          </p:nvPr>
+        </p:nvSpPr>
+        <p:spPr/>
+        <p:txBody>
+          <a:bodyPr/>
+          <a:lstStyle/>
+          <a:p>
+            <a:r>
+              <a:rPr lang="en-US" dirty="0"/>
+              <a:t>Custom</a:t>
+            </a:r>
+          </a:p>
+        </p:txBody>
+      </p:sp>
+      <p:sp>
+        <p:nvSpPr>
+          <p:cNvPr id="8" name="Symbol zastępczy zawartości 7">
+            <a:extLst>
+              <a:ext uri="{FF2B5EF4-FFF2-40B4-BE49-F238E27FC236}">
+                <a16:creationId xmlns:a16="http://schemas.microsoft.com/office/drawing/2014/main" id="{4858852D-6029-4D64-AF77-2564D6288EE6}"/>
+              </a:ext>
+            </a:extLst>
+          </p:cNvPr>
+          <p:cNvSpPr>
+            <a:spLocks noGrp="1"/>
+          </p:cNvSpPr>
+          <p:nvPr>
+            <p:ph sz="quarter" idx="4"/>
+          </p:nvPr>
+        </p:nvSpPr>
+        <p:spPr/>
+        <p:txBody>
+          <a:bodyPr>
+            <a:normAutofit fontScale="85000" lnSpcReduction="20000"/>
+          </a:bodyPr>
+          <a:lstStyle/>
+          <a:p>
+            <a:r>
+              <a:rPr lang="en-US" dirty="0"/>
+              <a:t>Whatever custom Topic you want and need</a:t>
+            </a:r>
+          </a:p>
+        </p:txBody>
+      </p:sp>
+    </p:spTree>
+    <p:extLst>
+      <p:ext uri="{BB962C8B-B14F-4D97-AF65-F5344CB8AC3E}">
+        <p14:creationId xmlns:p14="http://schemas.microsoft.com/office/powerpoint/2010/main" val="3981712074"/>
+      </p:ext>
+    </p:extLst>
+  </p:cSld>
+  <p:clrMapOvr>
+    <a:masterClrMapping/>
+  </p:clrMapOvr>
+</p:sld>
+</file>
+
+<file path=ppt/slides/slide55.xml><?xml version="1.0" encoding="utf-8"?>
+<p:sld xmlns:a="http://schemas.openxmlformats.org/drawingml/2006/main" xmlns:r="http://schemas.openxmlformats.org/officeDocument/2006/relationships" xmlns:p="http://schemas.openxmlformats.org/presentationml/2006/main">
+  <p:cSld>
+    <p:spTree>
+      <p:nvGrpSpPr>
+        <p:cNvPr id="1" name=""/>
+        <p:cNvGrpSpPr/>
+        <p:nvPr/>
+      </p:nvGrpSpPr>
+      <p:grpSpPr>
+        <a:xfrm>
+          <a:off x="0" y="0"/>
+          <a:ext cx="0" cy="0"/>
+          <a:chOff x="0" y="0"/>
+          <a:chExt cx="0" cy="0"/>
+        </a:xfrm>
+      </p:grpSpPr>
+      <p:sp>
+        <p:nvSpPr>
+          <p:cNvPr id="4" name="Tytuł 3">
+            <a:extLst>
+              <a:ext uri="{FF2B5EF4-FFF2-40B4-BE49-F238E27FC236}">
+                <a16:creationId xmlns:a16="http://schemas.microsoft.com/office/drawing/2014/main" id="{FB6DB2D1-04D0-46FF-AACE-3F6DC0B935EC}"/>
+              </a:ext>
+            </a:extLst>
+          </p:cNvPr>
+          <p:cNvSpPr>
+            <a:spLocks noGrp="1"/>
+          </p:cNvSpPr>
+          <p:nvPr>
+            <p:ph type="title"/>
+          </p:nvPr>
+        </p:nvSpPr>
+        <p:spPr/>
+        <p:txBody>
+          <a:bodyPr/>
+          <a:lstStyle/>
+          <a:p>
+            <a:r>
+              <a:rPr lang="pl-PL" dirty="0"/>
+              <a:t>Event </a:t>
+            </a:r>
+            <a:r>
+              <a:rPr lang="pl-PL" dirty="0" err="1"/>
+              <a:t>Grid</a:t>
+            </a:r>
+            <a:r>
+              <a:rPr lang="pl-PL" dirty="0"/>
+              <a:t> </a:t>
+            </a:r>
+            <a:r>
+              <a:rPr lang="pl-PL" dirty="0" err="1"/>
+              <a:t>Handlers</a:t>
+            </a:r>
+            <a:endParaRPr lang="pl-PL" dirty="0"/>
+          </a:p>
+        </p:txBody>
+      </p:sp>
+      <p:sp>
+        <p:nvSpPr>
+          <p:cNvPr id="5" name="Symbol zastępczy tekstu 4">
+            <a:extLst>
+              <a:ext uri="{FF2B5EF4-FFF2-40B4-BE49-F238E27FC236}">
+                <a16:creationId xmlns:a16="http://schemas.microsoft.com/office/drawing/2014/main" id="{DDECDB50-AE48-4F2C-9949-389F3AACE293}"/>
+              </a:ext>
+            </a:extLst>
+          </p:cNvPr>
+          <p:cNvSpPr>
+            <a:spLocks noGrp="1"/>
+          </p:cNvSpPr>
+          <p:nvPr>
+            <p:ph type="body" idx="1"/>
+          </p:nvPr>
+        </p:nvSpPr>
+        <p:spPr/>
+        <p:txBody>
+          <a:bodyPr/>
+          <a:lstStyle/>
+          <a:p>
+            <a:r>
+              <a:rPr lang="en-US" dirty="0"/>
+              <a:t>Built in</a:t>
+            </a:r>
+          </a:p>
+        </p:txBody>
+      </p:sp>
+      <p:sp>
+        <p:nvSpPr>
+          <p:cNvPr id="6" name="Symbol zastępczy zawartości 5">
+            <a:extLst>
+              <a:ext uri="{FF2B5EF4-FFF2-40B4-BE49-F238E27FC236}">
+                <a16:creationId xmlns:a16="http://schemas.microsoft.com/office/drawing/2014/main" id="{2B19FDC3-4F08-43D5-A559-B8ECE5E234C4}"/>
+              </a:ext>
+            </a:extLst>
+          </p:cNvPr>
+          <p:cNvSpPr>
+            <a:spLocks noGrp="1"/>
+          </p:cNvSpPr>
+          <p:nvPr>
+            <p:ph sz="half" idx="2"/>
+          </p:nvPr>
+        </p:nvSpPr>
+        <p:spPr/>
+        <p:txBody>
+          <a:bodyPr>
+            <a:normAutofit lnSpcReduction="10000"/>
+          </a:bodyPr>
+          <a:lstStyle/>
+          <a:p>
+            <a:r>
+              <a:rPr lang="pl-PL" dirty="0" err="1"/>
+              <a:t>Azure</a:t>
+            </a:r>
+            <a:r>
+              <a:rPr lang="pl-PL" dirty="0"/>
+              <a:t> Automation</a:t>
+            </a:r>
+          </a:p>
+          <a:p>
+            <a:r>
+              <a:rPr lang="pl-PL" dirty="0" err="1"/>
+              <a:t>Azure</a:t>
+            </a:r>
+            <a:r>
+              <a:rPr lang="pl-PL" dirty="0"/>
+              <a:t> </a:t>
+            </a:r>
+            <a:r>
+              <a:rPr lang="pl-PL" dirty="0" err="1"/>
+              <a:t>Functions</a:t>
+            </a:r>
+            <a:endParaRPr lang="pl-PL" dirty="0"/>
+          </a:p>
+          <a:p>
+            <a:r>
+              <a:rPr lang="pl-PL" dirty="0"/>
+              <a:t>Event </a:t>
+            </a:r>
+            <a:r>
+              <a:rPr lang="pl-PL" dirty="0" err="1"/>
+              <a:t>Hubs</a:t>
+            </a:r>
+            <a:endParaRPr lang="pl-PL" dirty="0"/>
+          </a:p>
+          <a:p>
+            <a:r>
+              <a:rPr lang="pl-PL" dirty="0" err="1"/>
+              <a:t>Hybrid</a:t>
+            </a:r>
+            <a:r>
+              <a:rPr lang="pl-PL" dirty="0"/>
+              <a:t> </a:t>
+            </a:r>
+            <a:r>
+              <a:rPr lang="pl-PL" dirty="0" err="1"/>
+              <a:t>Connections</a:t>
+            </a:r>
+            <a:endParaRPr lang="pl-PL" dirty="0"/>
+          </a:p>
+          <a:p>
+            <a:r>
+              <a:rPr lang="pl-PL" dirty="0" err="1"/>
+              <a:t>Logic</a:t>
+            </a:r>
+            <a:r>
+              <a:rPr lang="pl-PL" dirty="0"/>
+              <a:t> </a:t>
+            </a:r>
+            <a:r>
+              <a:rPr lang="pl-PL" dirty="0" err="1"/>
+              <a:t>Apps</a:t>
+            </a:r>
+            <a:endParaRPr lang="pl-PL" dirty="0"/>
+          </a:p>
+          <a:p>
+            <a:r>
+              <a:rPr lang="pl-PL" dirty="0"/>
+              <a:t>Microsoft </a:t>
+            </a:r>
+            <a:r>
+              <a:rPr lang="pl-PL" dirty="0" err="1"/>
+              <a:t>Flow</a:t>
+            </a:r>
+            <a:endParaRPr lang="pl-PL" dirty="0"/>
+          </a:p>
+          <a:p>
+            <a:r>
+              <a:rPr lang="pl-PL" dirty="0"/>
+              <a:t>Queue Storage</a:t>
+            </a:r>
+          </a:p>
+          <a:p>
+            <a:r>
+              <a:rPr lang="pl-PL" dirty="0" err="1"/>
+              <a:t>WebHooks</a:t>
+            </a:r>
+            <a:endParaRPr lang="pl-PL" dirty="0"/>
+          </a:p>
+          <a:p>
+            <a:pPr marL="0" indent="0">
+              <a:buNone/>
+            </a:pPr>
+            <a:endParaRPr lang="en-US" dirty="0"/>
+          </a:p>
+        </p:txBody>
+      </p:sp>
+      <p:sp>
+        <p:nvSpPr>
+          <p:cNvPr id="7" name="Symbol zastępczy tekstu 6">
+            <a:extLst>
+              <a:ext uri="{FF2B5EF4-FFF2-40B4-BE49-F238E27FC236}">
+                <a16:creationId xmlns:a16="http://schemas.microsoft.com/office/drawing/2014/main" id="{F9BC82B8-AFF7-47B5-BB53-D14C461F5948}"/>
+              </a:ext>
+            </a:extLst>
+          </p:cNvPr>
+          <p:cNvSpPr>
+            <a:spLocks noGrp="1"/>
+          </p:cNvSpPr>
+          <p:nvPr>
+            <p:ph type="body" sz="quarter" idx="3"/>
+          </p:nvPr>
+        </p:nvSpPr>
+        <p:spPr/>
+        <p:txBody>
+          <a:bodyPr/>
+          <a:lstStyle/>
+          <a:p>
+            <a:r>
+              <a:rPr lang="en-US" dirty="0"/>
+              <a:t>Custom</a:t>
+            </a:r>
+          </a:p>
+        </p:txBody>
+      </p:sp>
+      <p:sp>
+        <p:nvSpPr>
+          <p:cNvPr id="8" name="Symbol zastępczy zawartości 7">
+            <a:extLst>
+              <a:ext uri="{FF2B5EF4-FFF2-40B4-BE49-F238E27FC236}">
+                <a16:creationId xmlns:a16="http://schemas.microsoft.com/office/drawing/2014/main" id="{4858852D-6029-4D64-AF77-2564D6288EE6}"/>
+              </a:ext>
+            </a:extLst>
+          </p:cNvPr>
+          <p:cNvSpPr>
+            <a:spLocks noGrp="1"/>
+          </p:cNvSpPr>
+          <p:nvPr>
+            <p:ph sz="quarter" idx="4"/>
+          </p:nvPr>
+        </p:nvSpPr>
+        <p:spPr/>
+        <p:txBody>
+          <a:bodyPr>
+            <a:normAutofit lnSpcReduction="10000"/>
+          </a:bodyPr>
+          <a:lstStyle/>
+          <a:p>
+            <a:r>
+              <a:rPr lang="en-US" dirty="0"/>
+              <a:t>As custom http endpoint</a:t>
+            </a:r>
+          </a:p>
+          <a:p>
+            <a:r>
+              <a:rPr lang="en-US" dirty="0"/>
+              <a:t>As custom Webhook endpoint</a:t>
+            </a:r>
+          </a:p>
+        </p:txBody>
+      </p:sp>
+    </p:spTree>
+    <p:extLst>
+      <p:ext uri="{BB962C8B-B14F-4D97-AF65-F5344CB8AC3E}">
+        <p14:creationId xmlns:p14="http://schemas.microsoft.com/office/powerpoint/2010/main" val="2669858438"/>
+      </p:ext>
+    </p:extLst>
+  </p:cSld>
+  <p:clrMapOvr>
+    <a:masterClrMapping/>
+  </p:clrMapOvr>
+</p:sld>
+</file>
+
+<file path=ppt/slides/slide56.xml><?xml version="1.0" encoding="utf-8"?>
+<p:sld xmlns:a="http://schemas.openxmlformats.org/drawingml/2006/main" xmlns:r="http://schemas.openxmlformats.org/officeDocument/2006/relationships" xmlns:p="http://schemas.openxmlformats.org/presentationml/2006/main">
+  <p:cSld>
+    <p:spTree>
+      <p:nvGrpSpPr>
+        <p:cNvPr id="1" name=""/>
+        <p:cNvGrpSpPr/>
+        <p:nvPr/>
+      </p:nvGrpSpPr>
+      <p:grpSpPr>
+        <a:xfrm>
+          <a:off x="0" y="0"/>
+          <a:ext cx="0" cy="0"/>
+          <a:chOff x="0" y="0"/>
+          <a:chExt cx="0" cy="0"/>
+        </a:xfrm>
+      </p:grpSpPr>
+      <p:sp>
+        <p:nvSpPr>
+          <p:cNvPr id="4" name="Tytuł 3">
+            <a:extLst>
+              <a:ext uri="{FF2B5EF4-FFF2-40B4-BE49-F238E27FC236}">
+                <a16:creationId xmlns:a16="http://schemas.microsoft.com/office/drawing/2014/main" id="{FB6DB2D1-04D0-46FF-AACE-3F6DC0B935EC}"/>
+              </a:ext>
+            </a:extLst>
+          </p:cNvPr>
+          <p:cNvSpPr>
+            <a:spLocks noGrp="1"/>
+          </p:cNvSpPr>
+          <p:nvPr>
+            <p:ph type="title"/>
+          </p:nvPr>
+        </p:nvSpPr>
+        <p:spPr/>
+        <p:txBody>
+          <a:bodyPr/>
+          <a:lstStyle/>
+          <a:p>
+            <a:r>
+              <a:rPr lang="pl-PL" dirty="0"/>
+              <a:t>Event </a:t>
+            </a:r>
+            <a:r>
+              <a:rPr lang="pl-PL" dirty="0" err="1"/>
+              <a:t>Grid</a:t>
+            </a:r>
+            <a:r>
+              <a:rPr lang="pl-PL" dirty="0"/>
+              <a:t> - Demo</a:t>
+            </a:r>
+          </a:p>
+        </p:txBody>
+      </p:sp>
+      <p:sp>
+        <p:nvSpPr>
+          <p:cNvPr id="6" name="Symbol zastępczy zawartości 5">
+            <a:extLst>
+              <a:ext uri="{FF2B5EF4-FFF2-40B4-BE49-F238E27FC236}">
+                <a16:creationId xmlns:a16="http://schemas.microsoft.com/office/drawing/2014/main" id="{2B19FDC3-4F08-43D5-A559-B8ECE5E234C4}"/>
+              </a:ext>
+            </a:extLst>
+          </p:cNvPr>
+          <p:cNvSpPr>
+            <a:spLocks noGrp="1"/>
+          </p:cNvSpPr>
+          <p:nvPr>
+            <p:ph sz="half" idx="2"/>
+          </p:nvPr>
+        </p:nvSpPr>
+        <p:spPr>
+          <a:xfrm>
+            <a:off x="814728" y="2751138"/>
+            <a:ext cx="10200601" cy="3109913"/>
+          </a:xfrm>
+        </p:spPr>
+        <p:txBody>
+          <a:bodyPr>
+            <a:normAutofit/>
+          </a:bodyPr>
+          <a:lstStyle/>
+          <a:p>
+            <a:r>
+              <a:rPr lang="en-US" dirty="0"/>
+              <a:t>Creating Event Grid</a:t>
+            </a:r>
+          </a:p>
+          <a:p>
+            <a:r>
+              <a:rPr lang="en-US" dirty="0"/>
+              <a:t>Creating Custom Topic</a:t>
+            </a:r>
+          </a:p>
+          <a:p>
+            <a:r>
+              <a:rPr lang="en-US" dirty="0"/>
+              <a:t>Publishing to Custom Topic</a:t>
+            </a:r>
+          </a:p>
+        </p:txBody>
+      </p:sp>
+    </p:spTree>
+    <p:extLst>
+      <p:ext uri="{BB962C8B-B14F-4D97-AF65-F5344CB8AC3E}">
+        <p14:creationId xmlns:p14="http://schemas.microsoft.com/office/powerpoint/2010/main" val="1614553516"/>
+      </p:ext>
+    </p:extLst>
+  </p:cSld>
+  <p:clrMapOvr>
+    <a:masterClrMapping/>
+  </p:clrMapOvr>
+</p:sld>
+</file>
+
+<file path=ppt/slides/slide57.xml><?xml version="1.0" encoding="utf-8"?>
+<p:sld xmlns:a="http://schemas.openxmlformats.org/drawingml/2006/main" xmlns:r="http://schemas.openxmlformats.org/officeDocument/2006/relationships" xmlns:p="http://schemas.openxmlformats.org/presentationml/2006/main">
+  <p:cSld>
+    <p:spTree>
+      <p:nvGrpSpPr>
+        <p:cNvPr id="1" name=""/>
+        <p:cNvGrpSpPr/>
+        <p:nvPr/>
+      </p:nvGrpSpPr>
+      <p:grpSpPr>
+        <a:xfrm>
+          <a:off x="0" y="0"/>
+          <a:ext cx="0" cy="0"/>
+          <a:chOff x="0" y="0"/>
+          <a:chExt cx="0" cy="0"/>
+        </a:xfrm>
+      </p:grpSpPr>
+      <p:sp>
+        <p:nvSpPr>
+          <p:cNvPr id="4" name="Tytuł 3">
+            <a:extLst>
+              <a:ext uri="{FF2B5EF4-FFF2-40B4-BE49-F238E27FC236}">
+                <a16:creationId xmlns:a16="http://schemas.microsoft.com/office/drawing/2014/main" id="{FB6DB2D1-04D0-46FF-AACE-3F6DC0B935EC}"/>
+              </a:ext>
+            </a:extLst>
+          </p:cNvPr>
+          <p:cNvSpPr>
+            <a:spLocks noGrp="1"/>
+          </p:cNvSpPr>
+          <p:nvPr>
+            <p:ph type="title"/>
+          </p:nvPr>
+        </p:nvSpPr>
+        <p:spPr/>
+        <p:txBody>
+          <a:bodyPr/>
+          <a:lstStyle/>
+          <a:p>
+            <a:r>
+              <a:rPr lang="en-US" dirty="0"/>
+              <a:t>Event Grid – Exercises</a:t>
+            </a:r>
+          </a:p>
+        </p:txBody>
+      </p:sp>
+      <p:sp>
+        <p:nvSpPr>
+          <p:cNvPr id="6" name="Symbol zastępczy zawartości 5">
+            <a:extLst>
+              <a:ext uri="{FF2B5EF4-FFF2-40B4-BE49-F238E27FC236}">
+                <a16:creationId xmlns:a16="http://schemas.microsoft.com/office/drawing/2014/main" id="{2B19FDC3-4F08-43D5-A559-B8ECE5E234C4}"/>
+              </a:ext>
+            </a:extLst>
+          </p:cNvPr>
+          <p:cNvSpPr>
+            <a:spLocks noGrp="1"/>
+          </p:cNvSpPr>
+          <p:nvPr>
+            <p:ph sz="half" idx="2"/>
+          </p:nvPr>
+        </p:nvSpPr>
+        <p:spPr>
+          <a:xfrm>
+            <a:off x="814728" y="2751138"/>
+            <a:ext cx="10200601" cy="3109913"/>
+          </a:xfrm>
+        </p:spPr>
+        <p:txBody>
+          <a:bodyPr>
+            <a:normAutofit/>
+          </a:bodyPr>
+          <a:lstStyle/>
+          <a:p>
+            <a:pPr>
+              <a:buFont typeface="+mj-lt"/>
+              <a:buAutoNum type="arabicPeriod"/>
+            </a:pPr>
+            <a:r>
+              <a:rPr lang="en-US" dirty="0"/>
+              <a:t>Create function (</a:t>
+            </a:r>
+            <a:r>
+              <a:rPr lang="en-US" dirty="0" err="1"/>
+              <a:t>HttpTrigger</a:t>
+            </a:r>
+            <a:r>
+              <a:rPr lang="en-US" dirty="0"/>
+              <a:t>)</a:t>
+            </a:r>
+          </a:p>
+          <a:p>
+            <a:pPr>
+              <a:buFont typeface="+mj-lt"/>
+              <a:buAutoNum type="arabicPeriod"/>
+            </a:pPr>
+            <a:r>
+              <a:rPr lang="en-US" dirty="0"/>
+              <a:t>Function should receive information about user (Name, email, Age, Fav animal: cat | dog)</a:t>
+            </a:r>
+          </a:p>
+          <a:p>
+            <a:pPr>
+              <a:buFont typeface="+mj-lt"/>
+              <a:buAutoNum type="arabicPeriod"/>
+            </a:pPr>
+            <a:r>
+              <a:rPr lang="en-US" dirty="0"/>
+              <a:t>Once proper information is received it should be published to custom topic: </a:t>
+            </a:r>
+            <a:r>
+              <a:rPr lang="en-US" dirty="0" err="1"/>
+              <a:t>PersonHired</a:t>
+            </a:r>
+            <a:endParaRPr lang="en-US" dirty="0"/>
+          </a:p>
+          <a:p>
+            <a:pPr>
+              <a:buFont typeface="+mj-lt"/>
+              <a:buAutoNum type="arabicPeriod"/>
+            </a:pPr>
+            <a:r>
+              <a:rPr lang="en-US" dirty="0"/>
+              <a:t>Make sure that event have been executed</a:t>
+            </a:r>
+          </a:p>
+        </p:txBody>
+      </p:sp>
+    </p:spTree>
+    <p:extLst>
+      <p:ext uri="{BB962C8B-B14F-4D97-AF65-F5344CB8AC3E}">
+        <p14:creationId xmlns:p14="http://schemas.microsoft.com/office/powerpoint/2010/main" val="1752779467"/>
+      </p:ext>
+    </p:extLst>
+  </p:cSld>
+  <p:clrMapOvr>
+    <a:masterClrMapping/>
+  </p:clrMapOvr>
+</p:sld>
+</file>
+
+<file path=ppt/slides/slide58.xml><?xml version="1.0" encoding="utf-8"?>
+<p:sld xmlns:a="http://schemas.openxmlformats.org/drawingml/2006/main" xmlns:r="http://schemas.openxmlformats.org/officeDocument/2006/relationships" xmlns:p="http://schemas.openxmlformats.org/presentationml/2006/main">
+  <p:cSld>
+    <p:spTree>
+      <p:nvGrpSpPr>
+        <p:cNvPr id="1" name=""/>
+        <p:cNvGrpSpPr/>
+        <p:nvPr/>
+      </p:nvGrpSpPr>
+      <p:grpSpPr>
+        <a:xfrm>
+          <a:off x="0" y="0"/>
+          <a:ext cx="0" cy="0"/>
+          <a:chOff x="0" y="0"/>
+          <a:chExt cx="0" cy="0"/>
+        </a:xfrm>
+      </p:grpSpPr>
+      <p:sp>
+        <p:nvSpPr>
+          <p:cNvPr id="2" name="Tytuł 1">
+            <a:extLst>
+              <a:ext uri="{FF2B5EF4-FFF2-40B4-BE49-F238E27FC236}">
+                <a16:creationId xmlns:a16="http://schemas.microsoft.com/office/drawing/2014/main" id="{E2706499-BF81-4E20-8EAB-2E0B2DE9D6C4}"/>
+              </a:ext>
+            </a:extLst>
+          </p:cNvPr>
+          <p:cNvSpPr>
+            <a:spLocks noGrp="1"/>
+          </p:cNvSpPr>
+          <p:nvPr>
+            <p:ph type="title"/>
+          </p:nvPr>
+        </p:nvSpPr>
+        <p:spPr/>
+        <p:txBody>
+          <a:bodyPr/>
+          <a:lstStyle/>
+          <a:p>
+            <a:r>
+              <a:rPr lang="pl-PL" dirty="0" err="1"/>
+              <a:t>Things</a:t>
+            </a:r>
+            <a:r>
+              <a:rPr lang="pl-PL" dirty="0"/>
+              <a:t> to </a:t>
+            </a:r>
+            <a:r>
+              <a:rPr lang="pl-PL" dirty="0" err="1"/>
+              <a:t>note</a:t>
+            </a:r>
+            <a:endParaRPr lang="pl-PL" dirty="0"/>
+          </a:p>
+        </p:txBody>
+      </p:sp>
+      <p:sp>
+        <p:nvSpPr>
+          <p:cNvPr id="3" name="Symbol zastępczy zawartości 2">
+            <a:extLst>
+              <a:ext uri="{FF2B5EF4-FFF2-40B4-BE49-F238E27FC236}">
+                <a16:creationId xmlns:a16="http://schemas.microsoft.com/office/drawing/2014/main" id="{C5FE8820-2ACD-4C35-B717-5E2B8F5E2412}"/>
+              </a:ext>
+            </a:extLst>
+          </p:cNvPr>
+          <p:cNvSpPr>
+            <a:spLocks noGrp="1"/>
+          </p:cNvSpPr>
+          <p:nvPr>
+            <p:ph idx="1"/>
+          </p:nvPr>
+        </p:nvSpPr>
+        <p:spPr/>
+        <p:txBody>
+          <a:bodyPr/>
+          <a:lstStyle/>
+          <a:p>
+            <a:r>
+              <a:rPr lang="en-US" dirty="0"/>
+              <a:t>Pay as you go</a:t>
+            </a:r>
+          </a:p>
+          <a:p>
+            <a:r>
+              <a:rPr lang="en-US" dirty="0"/>
+              <a:t>Scalable solution with 99,99 SLA</a:t>
+            </a:r>
+          </a:p>
+          <a:p>
+            <a:r>
+              <a:rPr lang="en-US" dirty="0"/>
+              <a:t>Easy to start using it with our own code</a:t>
+            </a:r>
+          </a:p>
+        </p:txBody>
+      </p:sp>
+    </p:spTree>
+    <p:extLst>
+      <p:ext uri="{BB962C8B-B14F-4D97-AF65-F5344CB8AC3E}">
+        <p14:creationId xmlns:p14="http://schemas.microsoft.com/office/powerpoint/2010/main" val="2126295080"/>
+      </p:ext>
+    </p:extLst>
+  </p:cSld>
+  <p:clrMapOvr>
+    <a:masterClrMapping/>
+  </p:clrMapOvr>
+</p:sld>
+</file>
+
+<file path=ppt/slides/slide59.xml><?xml version="1.0" encoding="utf-8"?>
+<p:sld xmlns:a="http://schemas.openxmlformats.org/drawingml/2006/main" xmlns:r="http://schemas.openxmlformats.org/officeDocument/2006/relationships" xmlns:p="http://schemas.openxmlformats.org/presentationml/2006/main">
+  <p:cSld>
+    <p:spTree>
+      <p:nvGrpSpPr>
+        <p:cNvPr id="1" name=""/>
+        <p:cNvGrpSpPr/>
+        <p:nvPr/>
+      </p:nvGrpSpPr>
+      <p:grpSpPr>
+        <a:xfrm>
+          <a:off x="0" y="0"/>
+          <a:ext cx="0" cy="0"/>
+          <a:chOff x="0" y="0"/>
+          <a:chExt cx="0" cy="0"/>
+        </a:xfrm>
+      </p:grpSpPr>
+      <p:sp>
+        <p:nvSpPr>
+          <p:cNvPr id="4" name="Tytuł 3">
+            <a:extLst>
+              <a:ext uri="{FF2B5EF4-FFF2-40B4-BE49-F238E27FC236}">
+                <a16:creationId xmlns:a16="http://schemas.microsoft.com/office/drawing/2014/main" id="{940AAD03-8286-4236-9EE3-B78F24BCA549}"/>
+              </a:ext>
+            </a:extLst>
+          </p:cNvPr>
+          <p:cNvSpPr>
+            <a:spLocks noGrp="1"/>
+          </p:cNvSpPr>
+          <p:nvPr>
+            <p:ph type="title"/>
+          </p:nvPr>
+        </p:nvSpPr>
+        <p:spPr/>
+        <p:txBody>
+          <a:bodyPr/>
+          <a:lstStyle/>
+          <a:p>
+            <a:r>
+              <a:rPr lang="en-US" dirty="0"/>
+              <a:t>Azure Logic App</a:t>
+            </a:r>
+          </a:p>
+        </p:txBody>
+      </p:sp>
+      <p:sp>
+        <p:nvSpPr>
+          <p:cNvPr id="5" name="Symbol zastępczy tekstu 4">
+            <a:extLst>
+              <a:ext uri="{FF2B5EF4-FFF2-40B4-BE49-F238E27FC236}">
+                <a16:creationId xmlns:a16="http://schemas.microsoft.com/office/drawing/2014/main" id="{311A8156-965D-471E-B80E-1B55ED7AFEFE}"/>
+              </a:ext>
+            </a:extLst>
+          </p:cNvPr>
+          <p:cNvSpPr>
+            <a:spLocks noGrp="1"/>
+          </p:cNvSpPr>
+          <p:nvPr>
+            <p:ph type="body" idx="1"/>
+          </p:nvPr>
+        </p:nvSpPr>
+        <p:spPr/>
+        <p:txBody>
+          <a:bodyPr/>
+          <a:lstStyle/>
+          <a:p>
+            <a:r>
+              <a:rPr lang="en-US" dirty="0"/>
+              <a:t>Serverless Workflow</a:t>
+            </a:r>
+          </a:p>
+        </p:txBody>
+      </p:sp>
+    </p:spTree>
+    <p:extLst>
+      <p:ext uri="{BB962C8B-B14F-4D97-AF65-F5344CB8AC3E}">
+        <p14:creationId xmlns:p14="http://schemas.microsoft.com/office/powerpoint/2010/main" val="15009661"/>
       </p:ext>
     </p:extLst>
   </p:cSld>
@@ -15868,7 +19774,7 @@
           <a:ln/>
           <a:extLst>
             <a:ext uri="{91240B29-F687-4f45-9708-019B960494DF}">
-              <a14:hiddenLine xmlns:a14="http://schemas.microsoft.com/office/drawing/2010/main" xmlns:p14="http://schemas.microsoft.com/office/powerpoint/2010/main" xmlns:a16="http://schemas.microsoft.com/office/drawing/2014/main" xmlns="" w="9525">
+              <a14:hiddenLine xmlns="" xmlns:a16="http://schemas.microsoft.com/office/drawing/2014/main" xmlns:p14="http://schemas.microsoft.com/office/powerpoint/2010/main" xmlns:a14="http://schemas.microsoft.com/office/drawing/2010/main" w="9525">
                 <a:solidFill>
                   <a:srgbClr val="000000"/>
                 </a:solidFill>
@@ -16450,6 +20356,540 @@
 </p:sld>
 </file>
 
+<file path=ppt/slides/slide60.xml><?xml version="1.0" encoding="utf-8"?>
+<p:sld xmlns:a="http://schemas.openxmlformats.org/drawingml/2006/main" xmlns:r="http://schemas.openxmlformats.org/officeDocument/2006/relationships" xmlns:p="http://schemas.openxmlformats.org/presentationml/2006/main">
+  <p:cSld>
+    <p:spTree>
+      <p:nvGrpSpPr>
+        <p:cNvPr id="1" name=""/>
+        <p:cNvGrpSpPr/>
+        <p:nvPr/>
+      </p:nvGrpSpPr>
+      <p:grpSpPr>
+        <a:xfrm>
+          <a:off x="0" y="0"/>
+          <a:ext cx="0" cy="0"/>
+          <a:chOff x="0" y="0"/>
+          <a:chExt cx="0" cy="0"/>
+        </a:xfrm>
+      </p:grpSpPr>
+      <p:sp>
+        <p:nvSpPr>
+          <p:cNvPr id="4" name="Tytuł 3">
+            <a:extLst>
+              <a:ext uri="{FF2B5EF4-FFF2-40B4-BE49-F238E27FC236}">
+                <a16:creationId xmlns:a16="http://schemas.microsoft.com/office/drawing/2014/main" id="{FB6DB2D1-04D0-46FF-AACE-3F6DC0B935EC}"/>
+              </a:ext>
+            </a:extLst>
+          </p:cNvPr>
+          <p:cNvSpPr>
+            <a:spLocks noGrp="1"/>
+          </p:cNvSpPr>
+          <p:nvPr>
+            <p:ph type="title"/>
+          </p:nvPr>
+        </p:nvSpPr>
+        <p:spPr/>
+        <p:txBody>
+          <a:bodyPr/>
+          <a:lstStyle/>
+          <a:p>
+            <a:r>
+              <a:rPr lang="pl-PL" dirty="0" err="1"/>
+              <a:t>Logic</a:t>
+            </a:r>
+            <a:r>
+              <a:rPr lang="pl-PL" dirty="0"/>
+              <a:t> </a:t>
+            </a:r>
+            <a:r>
+              <a:rPr lang="pl-PL" dirty="0" err="1"/>
+              <a:t>App</a:t>
+            </a:r>
+            <a:endParaRPr lang="pl-PL" dirty="0"/>
+          </a:p>
+        </p:txBody>
+      </p:sp>
+      <p:sp>
+        <p:nvSpPr>
+          <p:cNvPr id="6" name="Symbol zastępczy zawartości 5">
+            <a:extLst>
+              <a:ext uri="{FF2B5EF4-FFF2-40B4-BE49-F238E27FC236}">
+                <a16:creationId xmlns:a16="http://schemas.microsoft.com/office/drawing/2014/main" id="{2B19FDC3-4F08-43D5-A559-B8ECE5E234C4}"/>
+              </a:ext>
+            </a:extLst>
+          </p:cNvPr>
+          <p:cNvSpPr>
+            <a:spLocks noGrp="1"/>
+          </p:cNvSpPr>
+          <p:nvPr>
+            <p:ph sz="half" idx="2"/>
+          </p:nvPr>
+        </p:nvSpPr>
+        <p:spPr>
+          <a:xfrm>
+            <a:off x="814728" y="2751138"/>
+            <a:ext cx="10200601" cy="3109913"/>
+          </a:xfrm>
+        </p:spPr>
+        <p:txBody>
+          <a:bodyPr>
+            <a:normAutofit/>
+          </a:bodyPr>
+          <a:lstStyle/>
+          <a:p>
+            <a:r>
+              <a:rPr lang="en-US" dirty="0"/>
+              <a:t>A way to structure flow of serverless application</a:t>
+            </a:r>
+          </a:p>
+          <a:p>
+            <a:r>
+              <a:rPr lang="en-US" dirty="0"/>
+              <a:t>Allow integration between multiple parts</a:t>
+            </a:r>
+          </a:p>
+          <a:p>
+            <a:r>
+              <a:rPr lang="en-US" dirty="0"/>
+              <a:t>Business friendly – UI available</a:t>
+            </a:r>
+          </a:p>
+          <a:p>
+            <a:r>
+              <a:rPr lang="en-US" dirty="0"/>
+              <a:t>Dev friendly – All workflow as </a:t>
+            </a:r>
+            <a:r>
+              <a:rPr lang="en-US" dirty="0" err="1"/>
+              <a:t>json</a:t>
+            </a:r>
+            <a:r>
+              <a:rPr lang="en-US" dirty="0"/>
+              <a:t> file</a:t>
+            </a:r>
+          </a:p>
+          <a:p>
+            <a:r>
+              <a:rPr lang="en-US" dirty="0"/>
+              <a:t>Microsoft dev friendly – yep, Visual Studio UI available… </a:t>
+            </a:r>
+          </a:p>
+        </p:txBody>
+      </p:sp>
+    </p:spTree>
+    <p:extLst>
+      <p:ext uri="{BB962C8B-B14F-4D97-AF65-F5344CB8AC3E}">
+        <p14:creationId xmlns:p14="http://schemas.microsoft.com/office/powerpoint/2010/main" val="925862103"/>
+      </p:ext>
+    </p:extLst>
+  </p:cSld>
+  <p:clrMapOvr>
+    <a:masterClrMapping/>
+  </p:clrMapOvr>
+</p:sld>
+</file>
+
+<file path=ppt/slides/slide61.xml><?xml version="1.0" encoding="utf-8"?>
+<p:sld xmlns:a="http://schemas.openxmlformats.org/drawingml/2006/main" xmlns:r="http://schemas.openxmlformats.org/officeDocument/2006/relationships" xmlns:p="http://schemas.openxmlformats.org/presentationml/2006/main">
+  <p:cSld>
+    <p:spTree>
+      <p:nvGrpSpPr>
+        <p:cNvPr id="1" name=""/>
+        <p:cNvGrpSpPr/>
+        <p:nvPr/>
+      </p:nvGrpSpPr>
+      <p:grpSpPr>
+        <a:xfrm>
+          <a:off x="0" y="0"/>
+          <a:ext cx="0" cy="0"/>
+          <a:chOff x="0" y="0"/>
+          <a:chExt cx="0" cy="0"/>
+        </a:xfrm>
+      </p:grpSpPr>
+      <p:sp>
+        <p:nvSpPr>
+          <p:cNvPr id="4" name="Tytuł 3">
+            <a:extLst>
+              <a:ext uri="{FF2B5EF4-FFF2-40B4-BE49-F238E27FC236}">
+                <a16:creationId xmlns:a16="http://schemas.microsoft.com/office/drawing/2014/main" id="{FB6DB2D1-04D0-46FF-AACE-3F6DC0B935EC}"/>
+              </a:ext>
+            </a:extLst>
+          </p:cNvPr>
+          <p:cNvSpPr>
+            <a:spLocks noGrp="1"/>
+          </p:cNvSpPr>
+          <p:nvPr>
+            <p:ph type="title"/>
+          </p:nvPr>
+        </p:nvSpPr>
+        <p:spPr/>
+        <p:txBody>
+          <a:bodyPr/>
+          <a:lstStyle/>
+          <a:p>
+            <a:r>
+              <a:rPr lang="pl-PL" dirty="0" err="1"/>
+              <a:t>Logic</a:t>
+            </a:r>
+            <a:r>
+              <a:rPr lang="pl-PL" dirty="0"/>
+              <a:t> </a:t>
+            </a:r>
+            <a:r>
+              <a:rPr lang="pl-PL" dirty="0" err="1"/>
+              <a:t>App</a:t>
+            </a:r>
+            <a:r>
+              <a:rPr lang="pl-PL" dirty="0"/>
+              <a:t> - Demo</a:t>
+            </a:r>
+          </a:p>
+        </p:txBody>
+      </p:sp>
+      <p:sp>
+        <p:nvSpPr>
+          <p:cNvPr id="6" name="Symbol zastępczy zawartości 5">
+            <a:extLst>
+              <a:ext uri="{FF2B5EF4-FFF2-40B4-BE49-F238E27FC236}">
+                <a16:creationId xmlns:a16="http://schemas.microsoft.com/office/drawing/2014/main" id="{2B19FDC3-4F08-43D5-A559-B8ECE5E234C4}"/>
+              </a:ext>
+            </a:extLst>
+          </p:cNvPr>
+          <p:cNvSpPr>
+            <a:spLocks noGrp="1"/>
+          </p:cNvSpPr>
+          <p:nvPr>
+            <p:ph sz="half" idx="2"/>
+          </p:nvPr>
+        </p:nvSpPr>
+        <p:spPr>
+          <a:xfrm>
+            <a:off x="814728" y="2751138"/>
+            <a:ext cx="10200601" cy="3109913"/>
+          </a:xfrm>
+        </p:spPr>
+        <p:txBody>
+          <a:bodyPr>
+            <a:normAutofit/>
+          </a:bodyPr>
+          <a:lstStyle/>
+          <a:p>
+            <a:r>
+              <a:rPr lang="en-US" dirty="0"/>
+              <a:t>Create Logic App</a:t>
+            </a:r>
+          </a:p>
+          <a:p>
+            <a:r>
+              <a:rPr lang="en-US" dirty="0"/>
+              <a:t>Show Possible options</a:t>
+            </a:r>
+          </a:p>
+          <a:p>
+            <a:r>
+              <a:rPr lang="en-US" dirty="0"/>
+              <a:t>Show how to run simple flow</a:t>
+            </a:r>
+          </a:p>
+        </p:txBody>
+      </p:sp>
+    </p:spTree>
+    <p:extLst>
+      <p:ext uri="{BB962C8B-B14F-4D97-AF65-F5344CB8AC3E}">
+        <p14:creationId xmlns:p14="http://schemas.microsoft.com/office/powerpoint/2010/main" val="2125732064"/>
+      </p:ext>
+    </p:extLst>
+  </p:cSld>
+  <p:clrMapOvr>
+    <a:masterClrMapping/>
+  </p:clrMapOvr>
+</p:sld>
+</file>
+
+<file path=ppt/slides/slide62.xml><?xml version="1.0" encoding="utf-8"?>
+<p:sld xmlns:a="http://schemas.openxmlformats.org/drawingml/2006/main" xmlns:r="http://schemas.openxmlformats.org/officeDocument/2006/relationships" xmlns:p="http://schemas.openxmlformats.org/presentationml/2006/main">
+  <p:cSld>
+    <p:spTree>
+      <p:nvGrpSpPr>
+        <p:cNvPr id="1" name=""/>
+        <p:cNvGrpSpPr/>
+        <p:nvPr/>
+      </p:nvGrpSpPr>
+      <p:grpSpPr>
+        <a:xfrm>
+          <a:off x="0" y="0"/>
+          <a:ext cx="0" cy="0"/>
+          <a:chOff x="0" y="0"/>
+          <a:chExt cx="0" cy="0"/>
+        </a:xfrm>
+      </p:grpSpPr>
+      <p:sp>
+        <p:nvSpPr>
+          <p:cNvPr id="4" name="Tytuł 3">
+            <a:extLst>
+              <a:ext uri="{FF2B5EF4-FFF2-40B4-BE49-F238E27FC236}">
+                <a16:creationId xmlns:a16="http://schemas.microsoft.com/office/drawing/2014/main" id="{FB6DB2D1-04D0-46FF-AACE-3F6DC0B935EC}"/>
+              </a:ext>
+            </a:extLst>
+          </p:cNvPr>
+          <p:cNvSpPr>
+            <a:spLocks noGrp="1"/>
+          </p:cNvSpPr>
+          <p:nvPr>
+            <p:ph type="title"/>
+          </p:nvPr>
+        </p:nvSpPr>
+        <p:spPr/>
+        <p:txBody>
+          <a:bodyPr/>
+          <a:lstStyle/>
+          <a:p>
+            <a:r>
+              <a:rPr lang="en-US" dirty="0"/>
+              <a:t>Logic App – Exercises</a:t>
+            </a:r>
+          </a:p>
+        </p:txBody>
+      </p:sp>
+      <p:sp>
+        <p:nvSpPr>
+          <p:cNvPr id="6" name="Symbol zastępczy zawartości 5">
+            <a:extLst>
+              <a:ext uri="{FF2B5EF4-FFF2-40B4-BE49-F238E27FC236}">
+                <a16:creationId xmlns:a16="http://schemas.microsoft.com/office/drawing/2014/main" id="{2B19FDC3-4F08-43D5-A559-B8ECE5E234C4}"/>
+              </a:ext>
+            </a:extLst>
+          </p:cNvPr>
+          <p:cNvSpPr>
+            <a:spLocks noGrp="1"/>
+          </p:cNvSpPr>
+          <p:nvPr>
+            <p:ph sz="half" idx="2"/>
+          </p:nvPr>
+        </p:nvSpPr>
+        <p:spPr>
+          <a:xfrm>
+            <a:off x="814728" y="2751138"/>
+            <a:ext cx="10200601" cy="3109913"/>
+          </a:xfrm>
+        </p:spPr>
+        <p:txBody>
+          <a:bodyPr>
+            <a:normAutofit/>
+          </a:bodyPr>
+          <a:lstStyle/>
+          <a:p>
+            <a:pPr>
+              <a:buFont typeface="+mj-lt"/>
+              <a:buAutoNum type="arabicPeriod"/>
+            </a:pPr>
+            <a:r>
+              <a:rPr lang="en-US" dirty="0"/>
+              <a:t>Create Logic App</a:t>
+            </a:r>
+          </a:p>
+          <a:p>
+            <a:pPr>
+              <a:buFont typeface="+mj-lt"/>
+              <a:buAutoNum type="arabicPeriod"/>
+            </a:pPr>
+            <a:r>
+              <a:rPr lang="en-US" dirty="0"/>
+              <a:t>As entry point create Event Grid trigger</a:t>
+            </a:r>
+          </a:p>
+          <a:p>
+            <a:pPr>
+              <a:buFont typeface="+mj-lt"/>
+              <a:buAutoNum type="arabicPeriod"/>
+            </a:pPr>
+            <a:r>
+              <a:rPr lang="en-US" dirty="0"/>
+              <a:t>Events from </a:t>
+            </a:r>
+            <a:r>
+              <a:rPr lang="en-US" dirty="0" err="1"/>
+              <a:t>PersonHired</a:t>
+            </a:r>
+            <a:r>
+              <a:rPr lang="en-US" dirty="0"/>
+              <a:t> custom topic should cause Logic App to run</a:t>
+            </a:r>
+          </a:p>
+          <a:p>
+            <a:pPr>
+              <a:buFont typeface="+mj-lt"/>
+              <a:buAutoNum type="arabicPeriod"/>
+            </a:pPr>
+            <a:r>
+              <a:rPr lang="en-US" dirty="0"/>
+              <a:t>We should extract information from the event</a:t>
+            </a:r>
+          </a:p>
+          <a:p>
+            <a:pPr>
+              <a:buFont typeface="+mj-lt"/>
+              <a:buAutoNum type="arabicPeriod"/>
+            </a:pPr>
+            <a:r>
+              <a:rPr lang="en-US" dirty="0"/>
+              <a:t>Use it to send email saying Hello to newly hired person</a:t>
+            </a:r>
+          </a:p>
+          <a:p>
+            <a:pPr>
+              <a:buFont typeface="+mj-lt"/>
+              <a:buAutoNum type="arabicPeriod"/>
+            </a:pPr>
+            <a:r>
+              <a:rPr lang="en-US" dirty="0"/>
+              <a:t>Add newly hired person to Excel/Google Sheet</a:t>
+            </a:r>
+          </a:p>
+          <a:p>
+            <a:pPr>
+              <a:buFont typeface="+mj-lt"/>
+              <a:buAutoNum type="arabicPeriod"/>
+            </a:pPr>
+            <a:r>
+              <a:rPr lang="en-US" dirty="0"/>
+              <a:t>Generate new Event: </a:t>
+            </a:r>
+            <a:r>
+              <a:rPr lang="en-US" dirty="0" err="1"/>
+              <a:t>PersonNotified</a:t>
+            </a:r>
+            <a:endParaRPr lang="en-US" dirty="0"/>
+          </a:p>
+        </p:txBody>
+      </p:sp>
+    </p:spTree>
+    <p:extLst>
+      <p:ext uri="{BB962C8B-B14F-4D97-AF65-F5344CB8AC3E}">
+        <p14:creationId xmlns:p14="http://schemas.microsoft.com/office/powerpoint/2010/main" val="570681031"/>
+      </p:ext>
+    </p:extLst>
+  </p:cSld>
+  <p:clrMapOvr>
+    <a:masterClrMapping/>
+  </p:clrMapOvr>
+</p:sld>
+</file>
+
+<file path=ppt/slides/slide63.xml><?xml version="1.0" encoding="utf-8"?>
+<p:sld xmlns:a="http://schemas.openxmlformats.org/drawingml/2006/main" xmlns:r="http://schemas.openxmlformats.org/officeDocument/2006/relationships" xmlns:p="http://schemas.openxmlformats.org/presentationml/2006/main">
+  <p:cSld>
+    <p:spTree>
+      <p:nvGrpSpPr>
+        <p:cNvPr id="1" name=""/>
+        <p:cNvGrpSpPr/>
+        <p:nvPr/>
+      </p:nvGrpSpPr>
+      <p:grpSpPr>
+        <a:xfrm>
+          <a:off x="0" y="0"/>
+          <a:ext cx="0" cy="0"/>
+          <a:chOff x="0" y="0"/>
+          <a:chExt cx="0" cy="0"/>
+        </a:xfrm>
+      </p:grpSpPr>
+      <p:sp>
+        <p:nvSpPr>
+          <p:cNvPr id="2" name="Tytuł 1">
+            <a:extLst>
+              <a:ext uri="{FF2B5EF4-FFF2-40B4-BE49-F238E27FC236}">
+                <a16:creationId xmlns:a16="http://schemas.microsoft.com/office/drawing/2014/main" id="{E2706499-BF81-4E20-8EAB-2E0B2DE9D6C4}"/>
+              </a:ext>
+            </a:extLst>
+          </p:cNvPr>
+          <p:cNvSpPr>
+            <a:spLocks noGrp="1"/>
+          </p:cNvSpPr>
+          <p:nvPr>
+            <p:ph type="title"/>
+          </p:nvPr>
+        </p:nvSpPr>
+        <p:spPr/>
+        <p:txBody>
+          <a:bodyPr/>
+          <a:lstStyle/>
+          <a:p>
+            <a:r>
+              <a:rPr lang="pl-PL" dirty="0" err="1"/>
+              <a:t>Things</a:t>
+            </a:r>
+            <a:r>
+              <a:rPr lang="pl-PL" dirty="0"/>
+              <a:t> to </a:t>
+            </a:r>
+            <a:r>
+              <a:rPr lang="pl-PL" dirty="0" err="1"/>
+              <a:t>note</a:t>
+            </a:r>
+            <a:endParaRPr lang="pl-PL" dirty="0"/>
+          </a:p>
+        </p:txBody>
+      </p:sp>
+      <p:sp>
+        <p:nvSpPr>
+          <p:cNvPr id="3" name="Symbol zastępczy zawartości 2">
+            <a:extLst>
+              <a:ext uri="{FF2B5EF4-FFF2-40B4-BE49-F238E27FC236}">
+                <a16:creationId xmlns:a16="http://schemas.microsoft.com/office/drawing/2014/main" id="{C5FE8820-2ACD-4C35-B717-5E2B8F5E2412}"/>
+              </a:ext>
+            </a:extLst>
+          </p:cNvPr>
+          <p:cNvSpPr>
+            <a:spLocks noGrp="1"/>
+          </p:cNvSpPr>
+          <p:nvPr>
+            <p:ph idx="1"/>
+          </p:nvPr>
+        </p:nvSpPr>
+        <p:spPr/>
+        <p:txBody>
+          <a:bodyPr/>
+          <a:lstStyle/>
+          <a:p>
+            <a:r>
+              <a:rPr lang="en-US" dirty="0"/>
+              <a:t>Its not all about UI</a:t>
+            </a:r>
+          </a:p>
+          <a:p>
+            <a:r>
+              <a:rPr lang="en-US" dirty="0"/>
+              <a:t>But UI helps</a:t>
+            </a:r>
+          </a:p>
+          <a:p>
+            <a:r>
+              <a:rPr lang="en-US" dirty="0"/>
+              <a:t>Pay as you go</a:t>
+            </a:r>
+          </a:p>
+          <a:p>
+            <a:r>
+              <a:rPr lang="en-US" dirty="0"/>
+              <a:t>Serverless workflow manager</a:t>
+            </a:r>
+          </a:p>
+        </p:txBody>
+      </p:sp>
+    </p:spTree>
+    <p:extLst>
+      <p:ext uri="{BB962C8B-B14F-4D97-AF65-F5344CB8AC3E}">
+        <p14:creationId xmlns:p14="http://schemas.microsoft.com/office/powerpoint/2010/main" val="3761645696"/>
+      </p:ext>
+    </p:extLst>
+  </p:cSld>
+  <p:clrMapOvr>
+    <a:masterClrMapping/>
+  </p:clrMapOvr>
+</p:sld>
+</file>
+
 <file path=ppt/slides/slide7.xml><?xml version="1.0" encoding="utf-8"?>
 <p:sld xmlns:a="http://schemas.openxmlformats.org/drawingml/2006/main" xmlns:r="http://schemas.openxmlformats.org/officeDocument/2006/relationships" xmlns:p="http://schemas.openxmlformats.org/presentationml/2006/main">
   <p:cSld>
@@ -16569,7 +21009,7 @@
           <a:ln/>
           <a:extLst>
             <a:ext uri="{91240B29-F687-4f45-9708-019B960494DF}">
-              <a14:hiddenLine xmlns:a14="http://schemas.microsoft.com/office/drawing/2010/main" xmlns:p14="http://schemas.microsoft.com/office/powerpoint/2010/main" xmlns:a16="http://schemas.microsoft.com/office/drawing/2014/main" xmlns="" w="9525">
+              <a14:hiddenLine xmlns="" xmlns:a16="http://schemas.microsoft.com/office/drawing/2014/main" xmlns:p14="http://schemas.microsoft.com/office/powerpoint/2010/main" xmlns:a14="http://schemas.microsoft.com/office/drawing/2010/main" w="9525">
                 <a:solidFill>
                   <a:srgbClr val="000000"/>
                 </a:solidFill>

</xml_diff>

<commit_message>
adding sample files and demos
</commit_message>
<xml_diff>
--- a/AzureDay2019/Developing services with Azure Functions.pptx
+++ b/AzureDay2019/Developing services with Azure Functions.pptx
@@ -55,19 +55,23 @@
     <p:sldId id="302" r:id="rId49"/>
     <p:sldId id="304" r:id="rId50"/>
     <p:sldId id="308" r:id="rId51"/>
-    <p:sldId id="315" r:id="rId52"/>
-    <p:sldId id="311" r:id="rId53"/>
-    <p:sldId id="312" r:id="rId54"/>
-    <p:sldId id="309" r:id="rId55"/>
-    <p:sldId id="310" r:id="rId56"/>
-    <p:sldId id="314" r:id="rId57"/>
-    <p:sldId id="313" r:id="rId58"/>
-    <p:sldId id="306" r:id="rId59"/>
-    <p:sldId id="305" r:id="rId60"/>
-    <p:sldId id="316" r:id="rId61"/>
-    <p:sldId id="317" r:id="rId62"/>
-    <p:sldId id="318" r:id="rId63"/>
-    <p:sldId id="307" r:id="rId64"/>
+    <p:sldId id="322" r:id="rId52"/>
+    <p:sldId id="315" r:id="rId53"/>
+    <p:sldId id="311" r:id="rId54"/>
+    <p:sldId id="312" r:id="rId55"/>
+    <p:sldId id="309" r:id="rId56"/>
+    <p:sldId id="310" r:id="rId57"/>
+    <p:sldId id="321" r:id="rId58"/>
+    <p:sldId id="314" r:id="rId59"/>
+    <p:sldId id="313" r:id="rId60"/>
+    <p:sldId id="319" r:id="rId61"/>
+    <p:sldId id="306" r:id="rId62"/>
+    <p:sldId id="305" r:id="rId63"/>
+    <p:sldId id="316" r:id="rId64"/>
+    <p:sldId id="320" r:id="rId65"/>
+    <p:sldId id="317" r:id="rId66"/>
+    <p:sldId id="318" r:id="rId67"/>
+    <p:sldId id="307" r:id="rId68"/>
   </p:sldIdLst>
   <p:sldSz cx="12192000" cy="6858000"/>
   <p:notesSz cx="6858000" cy="9144000"/>
@@ -269,7 +273,7 @@
           <a:effectLst/>
           <a:extLst>
             <a:ext uri="{91240B29-F687-4f45-9708-019B960494DF}">
-              <a14:hiddenLine xmlns:a14="http://schemas.microsoft.com/office/drawing/2010/main" xmlns="" w="9525">
+              <a14:hiddenLine xmlns="" xmlns:a14="http://schemas.microsoft.com/office/drawing/2010/main" w="9525">
                 <a:solidFill>
                   <a:srgbClr val="000000"/>
                 </a:solidFill>
@@ -462,7 +466,7 @@
             <a:fld id="{08B9EBBA-996F-894A-B54A-D6246ED52CEA}" type="datetimeFigureOut">
               <a:rPr lang="en-US" dirty="0"/>
               <a:pPr/>
-              <a:t>3/26/19</a:t>
+              <a:t>3/27/19</a:t>
             </a:fld>
             <a:endParaRPr lang="en-US" dirty="0"/>
           </a:p>
@@ -777,7 +781,7 @@
             <a:fld id="{18C79C5D-2A6F-F04D-97DA-BEF2467B64E4}" type="datetimeFigureOut">
               <a:rPr lang="en-US" dirty="0"/>
               <a:pPr/>
-              <a:t>3/26/19</a:t>
+              <a:t>3/27/19</a:t>
             </a:fld>
             <a:endParaRPr lang="en-US" dirty="0"/>
           </a:p>
@@ -1262,7 +1266,7 @@
             <a:fld id="{8DFA1846-DA80-1C48-A609-854EA85C59AD}" type="datetimeFigureOut">
               <a:rPr lang="en-US" dirty="0"/>
               <a:pPr/>
-              <a:t>3/26/19</a:t>
+              <a:t>3/27/19</a:t>
             </a:fld>
             <a:endParaRPr lang="en-US" dirty="0"/>
           </a:p>
@@ -1628,7 +1632,7 @@
             <a:fld id="{FBF54567-0DE4-3F47-BF90-CB84690072F9}" type="datetimeFigureOut">
               <a:rPr lang="en-US" dirty="0"/>
               <a:pPr/>
-              <a:t>3/26/19</a:t>
+              <a:t>3/27/19</a:t>
             </a:fld>
             <a:endParaRPr lang="en-US" dirty="0"/>
           </a:p>
@@ -1779,7 +1783,7 @@
           <a:ln/>
           <a:extLst>
             <a:ext uri="{91240B29-F687-4f45-9708-019B960494DF}">
-              <a14:hiddenLine xmlns:a14="http://schemas.microsoft.com/office/drawing/2010/main" xmlns="" w="9525">
+              <a14:hiddenLine xmlns="" xmlns:a14="http://schemas.microsoft.com/office/drawing/2010/main" w="9525">
                 <a:solidFill>
                   <a:srgbClr val="000000"/>
                 </a:solidFill>
@@ -1898,7 +1902,7 @@
             <a:fld id="{C6C52C72-DE31-F449-A4ED-4C594FD91407}" type="datetimeFigureOut">
               <a:rPr lang="en-US" dirty="0"/>
               <a:pPr/>
-              <a:t>3/26/19</a:t>
+              <a:t>3/27/19</a:t>
             </a:fld>
             <a:endParaRPr lang="en-US" dirty="0"/>
           </a:p>
@@ -2051,7 +2055,7 @@
           <a:ln/>
           <a:extLst>
             <a:ext uri="{91240B29-F687-4f45-9708-019B960494DF}">
-              <a14:hiddenLine xmlns:a14="http://schemas.microsoft.com/office/drawing/2010/main" xmlns="" w="9525">
+              <a14:hiddenLine xmlns="" xmlns:a14="http://schemas.microsoft.com/office/drawing/2010/main" w="9525">
                 <a:solidFill>
                   <a:srgbClr val="000000"/>
                 </a:solidFill>
@@ -2180,7 +2184,7 @@
             <a:fld id="{ED62726E-379B-B349-9EED-81ED093FA806}" type="datetimeFigureOut">
               <a:rPr lang="en-US" dirty="0"/>
               <a:pPr/>
-              <a:t>3/26/19</a:t>
+              <a:t>3/27/19</a:t>
             </a:fld>
             <a:endParaRPr lang="en-US" dirty="0"/>
           </a:p>
@@ -2331,7 +2335,7 @@
           <a:ln/>
           <a:extLst>
             <a:ext uri="{91240B29-F687-4f45-9708-019B960494DF}">
-              <a14:hiddenLine xmlns:a14="http://schemas.microsoft.com/office/drawing/2010/main" xmlns="" w="9525">
+              <a14:hiddenLine xmlns="" xmlns:a14="http://schemas.microsoft.com/office/drawing/2010/main" w="9525">
                 <a:solidFill>
                   <a:srgbClr val="000000"/>
                 </a:solidFill>
@@ -2460,7 +2464,7 @@
             <a:fld id="{9B3A1323-8D79-1946-B0D7-40001CF92E9D}" type="datetimeFigureOut">
               <a:rPr lang="en-US" dirty="0"/>
               <a:pPr/>
-              <a:t>3/26/19</a:t>
+              <a:t>3/27/19</a:t>
             </a:fld>
             <a:endParaRPr lang="en-US" dirty="0"/>
           </a:p>
@@ -2800,7 +2804,7 @@
             <a:fld id="{8DFA1846-DA80-1C48-A609-854EA85C59AD}" type="datetimeFigureOut">
               <a:rPr lang="en-US" dirty="0"/>
               <a:pPr/>
-              <a:t>3/26/19</a:t>
+              <a:t>3/27/19</a:t>
             </a:fld>
             <a:endParaRPr lang="en-US" dirty="0"/>
           </a:p>
@@ -2951,7 +2955,7 @@
           <a:ln/>
           <a:extLst>
             <a:ext uri="{91240B29-F687-4f45-9708-019B960494DF}">
-              <a14:hiddenLine xmlns:a14="http://schemas.microsoft.com/office/drawing/2010/main" xmlns="" w="9525">
+              <a14:hiddenLine xmlns="" xmlns:a14="http://schemas.microsoft.com/office/drawing/2010/main" w="9525">
                 <a:solidFill>
                   <a:srgbClr val="000000"/>
                 </a:solidFill>
@@ -3136,7 +3140,7 @@
             <a:fld id="{57302355-E14B-8545-A8F8-0FE83CC9D524}" type="datetimeFigureOut">
               <a:rPr lang="en-US" dirty="0"/>
               <a:pPr/>
-              <a:t>3/26/19</a:t>
+              <a:t>3/27/19</a:t>
             </a:fld>
             <a:endParaRPr lang="en-US" dirty="0"/>
           </a:p>
@@ -3287,7 +3291,7 @@
           <a:ln/>
           <a:extLst>
             <a:ext uri="{91240B29-F687-4f45-9708-019B960494DF}">
-              <a14:hiddenLine xmlns:a14="http://schemas.microsoft.com/office/drawing/2010/main" xmlns="" w="9525">
+              <a14:hiddenLine xmlns="" xmlns:a14="http://schemas.microsoft.com/office/drawing/2010/main" w="9525">
                 <a:solidFill>
                   <a:srgbClr val="000000"/>
                 </a:solidFill>
@@ -3610,7 +3614,7 @@
             <a:fld id="{02640F58-564D-2B4F-AE67-E407BA4FCF45}" type="datetimeFigureOut">
               <a:rPr lang="en-US" dirty="0"/>
               <a:pPr/>
-              <a:t>3/26/19</a:t>
+              <a:t>3/27/19</a:t>
             </a:fld>
             <a:endParaRPr lang="en-US" dirty="0"/>
           </a:p>
@@ -3761,7 +3765,7 @@
           <a:ln/>
           <a:extLst>
             <a:ext uri="{91240B29-F687-4f45-9708-019B960494DF}">
-              <a14:hiddenLine xmlns:a14="http://schemas.microsoft.com/office/drawing/2010/main" xmlns="" w="9525">
+              <a14:hiddenLine xmlns="" xmlns:a14="http://schemas.microsoft.com/office/drawing/2010/main" w="9525">
                 <a:solidFill>
                   <a:srgbClr val="000000"/>
                 </a:solidFill>
@@ -3828,7 +3832,7 @@
             <a:fld id="{F13A34C8-038E-2045-AF43-DF7DBB8E0E9E}" type="datetimeFigureOut">
               <a:rPr lang="en-US" dirty="0"/>
               <a:pPr/>
-              <a:t>3/26/19</a:t>
+              <a:t>3/27/19</a:t>
             </a:fld>
             <a:endParaRPr lang="en-US" dirty="0"/>
           </a:p>
@@ -3920,7 +3924,7 @@
             <a:fld id="{8818C68F-D26B-8F47-958C-23B49CF8A634}" type="datetimeFigureOut">
               <a:rPr lang="en-US" dirty="0"/>
               <a:pPr/>
-              <a:t>3/26/19</a:t>
+              <a:t>3/27/19</a:t>
             </a:fld>
             <a:endParaRPr lang="en-US" dirty="0"/>
           </a:p>
@@ -4184,7 +4188,7 @@
           <a:ln/>
           <a:extLst>
             <a:ext uri="{91240B29-F687-4f45-9708-019B960494DF}">
-              <a14:hiddenLine xmlns:a14="http://schemas.microsoft.com/office/drawing/2010/main" xmlns="" w="9525">
+              <a14:hiddenLine xmlns="" xmlns:a14="http://schemas.microsoft.com/office/drawing/2010/main" w="9525">
                 <a:solidFill>
                   <a:srgbClr val="000000"/>
                 </a:solidFill>
@@ -4384,7 +4388,7 @@
             <a:fld id="{D0DF5E60-9974-AC48-9591-99C2BB44B7CF}" type="datetimeFigureOut">
               <a:rPr lang="en-US" dirty="0"/>
               <a:pPr/>
-              <a:t>3/26/19</a:t>
+              <a:t>3/27/19</a:t>
             </a:fld>
             <a:endParaRPr lang="en-US" dirty="0"/>
           </a:p>
@@ -4694,7 +4698,7 @@
             <a:fld id="{18C79C5D-2A6F-F04D-97DA-BEF2467B64E4}" type="datetimeFigureOut">
               <a:rPr lang="en-US" dirty="0"/>
               <a:pPr/>
-              <a:t>3/26/19</a:t>
+              <a:t>3/27/19</a:t>
             </a:fld>
             <a:endParaRPr lang="en-US" dirty="0"/>
           </a:p>
@@ -4961,7 +4965,7 @@
             <a:fld id="{09B482E8-6E0E-1B4F-B1FD-C69DB9E858D9}" type="datetimeFigureOut">
               <a:rPr lang="en-US" dirty="0"/>
               <a:pPr/>
-              <a:t>3/26/19</a:t>
+              <a:t>3/27/19</a:t>
             </a:fld>
             <a:endParaRPr lang="en-US" dirty="0"/>
           </a:p>
@@ -5846,7 +5850,7 @@
           <a:effectLst/>
           <a:extLst>
             <a:ext uri="{91240B29-F687-4f45-9708-019B960494DF}">
-              <a14:hiddenLine xmlns="" xmlns:a14="http://schemas.microsoft.com/office/drawing/2010/main" xmlns:a16="http://schemas.microsoft.com/office/drawing/2014/main" w="9525">
+              <a14:hiddenLine xmlns:a16="http://schemas.microsoft.com/office/drawing/2014/main" xmlns:a14="http://schemas.microsoft.com/office/drawing/2010/main" xmlns="" w="9525">
                 <a:solidFill>
                   <a:srgbClr val="000000"/>
                 </a:solidFill>
@@ -6221,7 +6225,7 @@
           <a:effectLst/>
           <a:extLst>
             <a:ext uri="{91240B29-F687-4f45-9708-019B960494DF}">
-              <a14:hiddenLine xmlns="" xmlns:a16="http://schemas.microsoft.com/office/drawing/2014/main" xmlns:p14="http://schemas.microsoft.com/office/powerpoint/2010/main" xmlns:a14="http://schemas.microsoft.com/office/drawing/2010/main" w="9525">
+              <a14:hiddenLine xmlns:a14="http://schemas.microsoft.com/office/drawing/2010/main" xmlns:p14="http://schemas.microsoft.com/office/powerpoint/2010/main" xmlns:a16="http://schemas.microsoft.com/office/drawing/2014/main" xmlns="" w="9525">
                 <a:solidFill>
                   <a:srgbClr val="000000"/>
                 </a:solidFill>
@@ -6381,7 +6385,7 @@
           </a:ln>
           <a:extLst>
             <a:ext uri="{91240B29-F687-4f45-9708-019B960494DF}">
-              <a14:hiddenLine xmlns="" xmlns:a16="http://schemas.microsoft.com/office/drawing/2014/main" xmlns:p14="http://schemas.microsoft.com/office/powerpoint/2010/main" xmlns:a14="http://schemas.microsoft.com/office/drawing/2010/main" w="9525">
+              <a14:hiddenLine xmlns:a14="http://schemas.microsoft.com/office/drawing/2010/main" xmlns:p14="http://schemas.microsoft.com/office/powerpoint/2010/main" xmlns:a16="http://schemas.microsoft.com/office/drawing/2014/main" xmlns="" w="9525">
                 <a:solidFill>
                   <a:srgbClr val="000000"/>
                 </a:solidFill>
@@ -6642,7 +6646,7 @@
           <a:effectLst/>
           <a:extLst>
             <a:ext uri="{91240B29-F687-4f45-9708-019B960494DF}">
-              <a14:hiddenLine xmlns="" xmlns:a14="http://schemas.microsoft.com/office/drawing/2010/main" xmlns:a16="http://schemas.microsoft.com/office/drawing/2014/main" w="9525">
+              <a14:hiddenLine xmlns:a16="http://schemas.microsoft.com/office/drawing/2014/main" xmlns:a14="http://schemas.microsoft.com/office/drawing/2010/main" xmlns="" w="9525">
                 <a:solidFill>
                   <a:srgbClr val="000000"/>
                 </a:solidFill>
@@ -7118,7 +7122,7 @@
           <a:effectLst/>
           <a:extLst>
             <a:ext uri="{91240B29-F687-4f45-9708-019B960494DF}">
-              <a14:hiddenLine xmlns="" xmlns:a16="http://schemas.microsoft.com/office/drawing/2014/main" xmlns:p14="http://schemas.microsoft.com/office/powerpoint/2010/main" xmlns:a14="http://schemas.microsoft.com/office/drawing/2010/main" w="9525">
+              <a14:hiddenLine xmlns:a14="http://schemas.microsoft.com/office/drawing/2010/main" xmlns:p14="http://schemas.microsoft.com/office/powerpoint/2010/main" xmlns:a16="http://schemas.microsoft.com/office/drawing/2014/main" xmlns="" w="9525">
                 <a:solidFill>
                   <a:srgbClr val="000000"/>
                 </a:solidFill>
@@ -7278,7 +7282,7 @@
           </a:ln>
           <a:extLst>
             <a:ext uri="{91240B29-F687-4f45-9708-019B960494DF}">
-              <a14:hiddenLine xmlns="" xmlns:a16="http://schemas.microsoft.com/office/drawing/2014/main" xmlns:p14="http://schemas.microsoft.com/office/powerpoint/2010/main" xmlns:a14="http://schemas.microsoft.com/office/drawing/2010/main" w="9525">
+              <a14:hiddenLine xmlns:a14="http://schemas.microsoft.com/office/drawing/2010/main" xmlns:p14="http://schemas.microsoft.com/office/powerpoint/2010/main" xmlns:a16="http://schemas.microsoft.com/office/drawing/2014/main" xmlns="" w="9525">
                 <a:solidFill>
                   <a:srgbClr val="000000"/>
                 </a:solidFill>
@@ -7541,7 +7545,7 @@
           <a:effectLst/>
           <a:extLst>
             <a:ext uri="{91240B29-F687-4f45-9708-019B960494DF}">
-              <a14:hiddenLine xmlns="" xmlns:a14="http://schemas.microsoft.com/office/drawing/2010/main" xmlns:a16="http://schemas.microsoft.com/office/drawing/2014/main" w="9525">
+              <a14:hiddenLine xmlns:a16="http://schemas.microsoft.com/office/drawing/2014/main" xmlns:a14="http://schemas.microsoft.com/office/drawing/2010/main" xmlns="" w="9525">
                 <a:solidFill>
                   <a:srgbClr val="000000"/>
                 </a:solidFill>
@@ -7937,7 +7941,7 @@
           <a:effectLst/>
           <a:extLst>
             <a:ext uri="{91240B29-F687-4f45-9708-019B960494DF}">
-              <a14:hiddenLine xmlns="" xmlns:a16="http://schemas.microsoft.com/office/drawing/2014/main" xmlns:p14="http://schemas.microsoft.com/office/powerpoint/2010/main" xmlns:a14="http://schemas.microsoft.com/office/drawing/2010/main" w="9525">
+              <a14:hiddenLine xmlns:a14="http://schemas.microsoft.com/office/drawing/2010/main" xmlns:p14="http://schemas.microsoft.com/office/powerpoint/2010/main" xmlns:a16="http://schemas.microsoft.com/office/drawing/2014/main" xmlns="" w="9525">
                 <a:solidFill>
                   <a:srgbClr val="000000"/>
                 </a:solidFill>
@@ -9153,7 +9157,7 @@
           <a:effectLst/>
           <a:extLst>
             <a:ext uri="{91240B29-F687-4f45-9708-019B960494DF}">
-              <a14:hiddenLine xmlns="" xmlns:a14="http://schemas.microsoft.com/office/drawing/2010/main" xmlns:a16="http://schemas.microsoft.com/office/drawing/2014/main" w="9525">
+              <a14:hiddenLine xmlns:a16="http://schemas.microsoft.com/office/drawing/2014/main" xmlns:a14="http://schemas.microsoft.com/office/drawing/2010/main" xmlns="" w="9525">
                 <a:solidFill>
                   <a:srgbClr val="000000"/>
                 </a:solidFill>
@@ -9601,7 +9605,7 @@
           <a:effectLst/>
           <a:extLst>
             <a:ext uri="{91240B29-F687-4f45-9708-019B960494DF}">
-              <a14:hiddenLine xmlns="" xmlns:a16="http://schemas.microsoft.com/office/drawing/2014/main" xmlns:p14="http://schemas.microsoft.com/office/powerpoint/2010/main" xmlns:a14="http://schemas.microsoft.com/office/drawing/2010/main" w="9525">
+              <a14:hiddenLine xmlns:a14="http://schemas.microsoft.com/office/drawing/2010/main" xmlns:p14="http://schemas.microsoft.com/office/powerpoint/2010/main" xmlns:a16="http://schemas.microsoft.com/office/drawing/2014/main" xmlns="" w="9525">
                 <a:solidFill>
                   <a:srgbClr val="000000"/>
                 </a:solidFill>
@@ -9938,7 +9942,7 @@
           <a:effectLst/>
           <a:extLst>
             <a:ext uri="{91240B29-F687-4f45-9708-019B960494DF}">
-              <a14:hiddenLine xmlns="" xmlns:a14="http://schemas.microsoft.com/office/drawing/2010/main" xmlns:p14="http://schemas.microsoft.com/office/powerpoint/2010/main" xmlns:a16="http://schemas.microsoft.com/office/drawing/2014/main" w="9525">
+              <a14:hiddenLine xmlns:a16="http://schemas.microsoft.com/office/drawing/2014/main" xmlns:p14="http://schemas.microsoft.com/office/powerpoint/2010/main" xmlns:a14="http://schemas.microsoft.com/office/drawing/2010/main" xmlns="" w="9525">
                 <a:solidFill>
                   <a:srgbClr val="000000"/>
                 </a:solidFill>
@@ -10263,7 +10267,7 @@
           </a:ln>
           <a:extLst>
             <a:ext uri="{91240B29-F687-4f45-9708-019B960494DF}">
-              <a14:hiddenLine xmlns="" xmlns:a16="http://schemas.microsoft.com/office/drawing/2014/main" xmlns:p14="http://schemas.microsoft.com/office/powerpoint/2010/main" xmlns:a14="http://schemas.microsoft.com/office/drawing/2010/main" w="9525">
+              <a14:hiddenLine xmlns:a14="http://schemas.microsoft.com/office/drawing/2010/main" xmlns:p14="http://schemas.microsoft.com/office/powerpoint/2010/main" xmlns:a16="http://schemas.microsoft.com/office/drawing/2014/main" xmlns="" w="9525">
                 <a:solidFill>
                   <a:srgbClr val="000000"/>
                 </a:solidFill>
@@ -11020,7 +11024,7 @@
           <a:effectLst/>
           <a:extLst>
             <a:ext uri="{91240B29-F687-4f45-9708-019B960494DF}">
-              <a14:hiddenLine xmlns="" xmlns:a14="http://schemas.microsoft.com/office/drawing/2010/main" xmlns:a16="http://schemas.microsoft.com/office/drawing/2014/main" w="9525">
+              <a14:hiddenLine xmlns:a16="http://schemas.microsoft.com/office/drawing/2014/main" xmlns:a14="http://schemas.microsoft.com/office/drawing/2010/main" xmlns="" w="9525">
                 <a:solidFill>
                   <a:srgbClr val="000000"/>
                 </a:solidFill>
@@ -11464,7 +11468,7 @@
           <a:effectLst/>
           <a:extLst>
             <a:ext uri="{91240B29-F687-4f45-9708-019B960494DF}">
-              <a14:hiddenLine xmlns="" xmlns:a16="http://schemas.microsoft.com/office/drawing/2014/main" xmlns:p14="http://schemas.microsoft.com/office/powerpoint/2010/main" xmlns:a14="http://schemas.microsoft.com/office/drawing/2010/main" w="9525">
+              <a14:hiddenLine xmlns:a14="http://schemas.microsoft.com/office/drawing/2010/main" xmlns:p14="http://schemas.microsoft.com/office/powerpoint/2010/main" xmlns:a16="http://schemas.microsoft.com/office/drawing/2014/main" xmlns="" w="9525">
                 <a:solidFill>
                   <a:srgbClr val="000000"/>
                 </a:solidFill>
@@ -12001,7 +12005,7 @@
           <a:effectLst/>
           <a:extLst>
             <a:ext uri="{91240B29-F687-4f45-9708-019B960494DF}">
-              <a14:hiddenLine xmlns="" xmlns:a14="http://schemas.microsoft.com/office/drawing/2010/main" xmlns:a16="http://schemas.microsoft.com/office/drawing/2014/main" w="9525">
+              <a14:hiddenLine xmlns:a16="http://schemas.microsoft.com/office/drawing/2014/main" xmlns:a14="http://schemas.microsoft.com/office/drawing/2010/main" xmlns="" w="9525">
                 <a:solidFill>
                   <a:srgbClr val="000000"/>
                 </a:solidFill>
@@ -12457,7 +12461,7 @@
           <a:effectLst/>
           <a:extLst>
             <a:ext uri="{91240B29-F687-4f45-9708-019B960494DF}">
-              <a14:hiddenLine xmlns="" xmlns:a16="http://schemas.microsoft.com/office/drawing/2014/main" xmlns:p14="http://schemas.microsoft.com/office/powerpoint/2010/main" xmlns:a14="http://schemas.microsoft.com/office/drawing/2010/main" w="9525">
+              <a14:hiddenLine xmlns:a14="http://schemas.microsoft.com/office/drawing/2010/main" xmlns:p14="http://schemas.microsoft.com/office/powerpoint/2010/main" xmlns:a16="http://schemas.microsoft.com/office/drawing/2014/main" xmlns="" w="9525">
                 <a:solidFill>
                   <a:srgbClr val="000000"/>
                 </a:solidFill>
@@ -13429,7 +13433,7 @@
           <a:effectLst/>
           <a:extLst>
             <a:ext uri="{91240B29-F687-4f45-9708-019B960494DF}">
-              <a14:hiddenLine xmlns="" xmlns:a14="http://schemas.microsoft.com/office/drawing/2010/main" xmlns:a16="http://schemas.microsoft.com/office/drawing/2014/main" w="9525">
+              <a14:hiddenLine xmlns:a16="http://schemas.microsoft.com/office/drawing/2014/main" xmlns:a14="http://schemas.microsoft.com/office/drawing/2010/main" xmlns="" w="9525">
                 <a:solidFill>
                   <a:srgbClr val="000000"/>
                 </a:solidFill>
@@ -13833,7 +13837,7 @@
           <a:effectLst/>
           <a:extLst>
             <a:ext uri="{91240B29-F687-4f45-9708-019B960494DF}">
-              <a14:hiddenLine xmlns="" xmlns:a16="http://schemas.microsoft.com/office/drawing/2014/main" xmlns:p14="http://schemas.microsoft.com/office/powerpoint/2010/main" xmlns:a14="http://schemas.microsoft.com/office/drawing/2010/main" w="9525">
+              <a14:hiddenLine xmlns:a14="http://schemas.microsoft.com/office/drawing/2010/main" xmlns:p14="http://schemas.microsoft.com/office/powerpoint/2010/main" xmlns:a16="http://schemas.microsoft.com/office/drawing/2014/main" xmlns="" w="9525">
                 <a:solidFill>
                   <a:srgbClr val="000000"/>
                 </a:solidFill>
@@ -14559,7 +14563,7 @@
           <a:effectLst/>
           <a:extLst>
             <a:ext uri="{91240B29-F687-4f45-9708-019B960494DF}">
-              <a14:hiddenLine xmlns="" xmlns:a14="http://schemas.microsoft.com/office/drawing/2010/main" xmlns:a16="http://schemas.microsoft.com/office/drawing/2014/main" w="9525">
+              <a14:hiddenLine xmlns:a16="http://schemas.microsoft.com/office/drawing/2014/main" xmlns:a14="http://schemas.microsoft.com/office/drawing/2010/main" xmlns="" w="9525">
                 <a:solidFill>
                   <a:srgbClr val="000000"/>
                 </a:solidFill>
@@ -14955,7 +14959,7 @@
           <a:effectLst/>
           <a:extLst>
             <a:ext uri="{91240B29-F687-4f45-9708-019B960494DF}">
-              <a14:hiddenLine xmlns="" xmlns:a16="http://schemas.microsoft.com/office/drawing/2014/main" xmlns:p14="http://schemas.microsoft.com/office/powerpoint/2010/main" xmlns:a14="http://schemas.microsoft.com/office/drawing/2010/main" w="9525">
+              <a14:hiddenLine xmlns:a14="http://schemas.microsoft.com/office/drawing/2010/main" xmlns:p14="http://schemas.microsoft.com/office/powerpoint/2010/main" xmlns:a16="http://schemas.microsoft.com/office/drawing/2014/main" xmlns="" w="9525">
                 <a:solidFill>
                   <a:srgbClr val="000000"/>
                 </a:solidFill>
@@ -15884,7 +15888,7 @@
           <a:effectLst/>
           <a:extLst>
             <a:ext uri="{91240B29-F687-4f45-9708-019B960494DF}">
-              <a14:hiddenLine xmlns="" xmlns:a14="http://schemas.microsoft.com/office/drawing/2010/main" xmlns:a16="http://schemas.microsoft.com/office/drawing/2014/main" w="9525">
+              <a14:hiddenLine xmlns:a16="http://schemas.microsoft.com/office/drawing/2014/main" xmlns:a14="http://schemas.microsoft.com/office/drawing/2010/main" xmlns="" w="9525">
                 <a:solidFill>
                   <a:srgbClr val="000000"/>
                 </a:solidFill>
@@ -16308,7 +16312,7 @@
           <a:effectLst/>
           <a:extLst>
             <a:ext uri="{91240B29-F687-4f45-9708-019B960494DF}">
-              <a14:hiddenLine xmlns="" xmlns:a16="http://schemas.microsoft.com/office/drawing/2014/main" xmlns:p14="http://schemas.microsoft.com/office/powerpoint/2010/main" xmlns:a14="http://schemas.microsoft.com/office/drawing/2010/main" w="9525">
+              <a14:hiddenLine xmlns:a14="http://schemas.microsoft.com/office/drawing/2010/main" xmlns:p14="http://schemas.microsoft.com/office/powerpoint/2010/main" xmlns:a16="http://schemas.microsoft.com/office/drawing/2014/main" xmlns="" w="9525">
                 <a:solidFill>
                   <a:srgbClr val="000000"/>
                 </a:solidFill>
@@ -17194,7 +17198,7 @@
             </a:pPr>
             <a:r>
               <a:rPr lang="en-US" dirty="0"/>
-              <a:t>Body</a:t>
+              <a:t>Body – use mem stream and stream writer</a:t>
             </a:r>
           </a:p>
         </p:txBody>
@@ -17768,6 +17772,175 @@
 </file>
 
 <file path=ppt/slides/slide51.xml><?xml version="1.0" encoding="utf-8"?>
+<p:sld xmlns:a="http://schemas.openxmlformats.org/drawingml/2006/main" xmlns:r="http://schemas.openxmlformats.org/officeDocument/2006/relationships" xmlns:p="http://schemas.openxmlformats.org/presentationml/2006/main">
+  <p:cSld>
+    <p:spTree>
+      <p:nvGrpSpPr>
+        <p:cNvPr id="1" name=""/>
+        <p:cNvGrpSpPr/>
+        <p:nvPr/>
+      </p:nvGrpSpPr>
+      <p:grpSpPr>
+        <a:xfrm>
+          <a:off x="0" y="0"/>
+          <a:ext cx="0" cy="0"/>
+          <a:chOff x="0" y="0"/>
+          <a:chExt cx="0" cy="0"/>
+        </a:xfrm>
+      </p:grpSpPr>
+      <p:sp>
+        <p:nvSpPr>
+          <p:cNvPr id="4" name="Tytuł 3">
+            <a:extLst>
+              <a:ext uri="{FF2B5EF4-FFF2-40B4-BE49-F238E27FC236}">
+                <a16:creationId xmlns:a16="http://schemas.microsoft.com/office/drawing/2014/main" id="{957E8338-0628-4317-ABC0-ED77745FD359}"/>
+              </a:ext>
+            </a:extLst>
+          </p:cNvPr>
+          <p:cNvSpPr>
+            <a:spLocks noGrp="1"/>
+          </p:cNvSpPr>
+          <p:nvPr>
+            <p:ph type="title"/>
+          </p:nvPr>
+        </p:nvSpPr>
+        <p:spPr>
+          <a:xfrm>
+            <a:off x="965200" y="1218476"/>
+            <a:ext cx="3187318" cy="4421050"/>
+          </a:xfrm>
+          <a:effectLst/>
+        </p:spPr>
+        <p:txBody>
+          <a:bodyPr anchor="ctr">
+            <a:normAutofit/>
+          </a:bodyPr>
+          <a:lstStyle/>
+          <a:p>
+            <a:pPr algn="r"/>
+            <a:r>
+              <a:rPr lang="pl-PL" sz="3200">
+                <a:solidFill>
+                  <a:schemeClr val="tx1"/>
+                </a:solidFill>
+              </a:rPr>
+              <a:t>Toolset</a:t>
+            </a:r>
+          </a:p>
+        </p:txBody>
+      </p:sp>
+      <p:sp>
+        <p:nvSpPr>
+          <p:cNvPr id="5" name="Symbol zastępczy zawartości 4">
+            <a:extLst>
+              <a:ext uri="{FF2B5EF4-FFF2-40B4-BE49-F238E27FC236}">
+                <a16:creationId xmlns:a16="http://schemas.microsoft.com/office/drawing/2014/main" id="{412BA740-1269-4C45-A0BC-1592C4F77DA6}"/>
+              </a:ext>
+            </a:extLst>
+          </p:cNvPr>
+          <p:cNvSpPr>
+            <a:spLocks noGrp="1"/>
+          </p:cNvSpPr>
+          <p:nvPr>
+            <p:ph idx="1"/>
+          </p:nvPr>
+        </p:nvSpPr>
+        <p:spPr>
+          <a:xfrm>
+            <a:off x="5146751" y="1218475"/>
+            <a:ext cx="6080050" cy="4421051"/>
+          </a:xfrm>
+          <a:effectLst/>
+        </p:spPr>
+        <p:txBody>
+          <a:bodyPr>
+            <a:normAutofit/>
+          </a:bodyPr>
+          <a:lstStyle/>
+          <a:p>
+            <a:r>
+              <a:rPr lang="pl-PL" sz="1600" dirty="0"/>
+              <a:t>Visual Studio </a:t>
+            </a:r>
+            <a:r>
+              <a:rPr lang="pl-PL" sz="1600" dirty="0" err="1"/>
+              <a:t>or</a:t>
+            </a:r>
+            <a:r>
+              <a:rPr lang="pl-PL" sz="1600" dirty="0"/>
+              <a:t> Visual Studio </a:t>
+            </a:r>
+            <a:r>
+              <a:rPr lang="pl-PL" sz="1600" dirty="0" err="1"/>
+              <a:t>Code</a:t>
+            </a:r>
+            <a:endParaRPr lang="pl-PL" sz="1600" dirty="0"/>
+          </a:p>
+          <a:p>
+            <a:r>
+              <a:rPr lang="pl-PL" sz="1600" dirty="0" err="1"/>
+              <a:t>Ngrok</a:t>
+            </a:r>
+            <a:endParaRPr lang="pl-PL" sz="1600" dirty="0"/>
+          </a:p>
+          <a:p>
+            <a:r>
+              <a:rPr lang="pl-PL" sz="1600" dirty="0" err="1"/>
+              <a:t>Azure</a:t>
+            </a:r>
+            <a:r>
+              <a:rPr lang="pl-PL" sz="1600" dirty="0"/>
+              <a:t> CLI</a:t>
+            </a:r>
+          </a:p>
+          <a:p>
+            <a:r>
+              <a:rPr lang="pl-PL" sz="1600" dirty="0" err="1"/>
+              <a:t>Azure</a:t>
+            </a:r>
+            <a:r>
+              <a:rPr lang="pl-PL" sz="1600" dirty="0"/>
+              <a:t> Portal</a:t>
+            </a:r>
+          </a:p>
+          <a:p>
+            <a:r>
+              <a:rPr lang="pl-PL" sz="1600" dirty="0"/>
+              <a:t>A </a:t>
+            </a:r>
+            <a:r>
+              <a:rPr lang="pl-PL" sz="1600" dirty="0" err="1"/>
+              <a:t>little</a:t>
+            </a:r>
+            <a:r>
+              <a:rPr lang="pl-PL" sz="1600" dirty="0"/>
+              <a:t> </a:t>
+            </a:r>
+            <a:r>
+              <a:rPr lang="pl-PL" sz="1600" dirty="0" err="1"/>
+              <a:t>patience</a:t>
+            </a:r>
+            <a:r>
+              <a:rPr lang="pl-PL" sz="1600" dirty="0"/>
+              <a:t> TM</a:t>
+            </a:r>
+          </a:p>
+        </p:txBody>
+      </p:sp>
+    </p:spTree>
+    <p:extLst>
+      <p:ext uri="{BB962C8B-B14F-4D97-AF65-F5344CB8AC3E}">
+        <p14:creationId xmlns:p14="http://schemas.microsoft.com/office/powerpoint/2010/main" val="3278256587"/>
+      </p:ext>
+    </p:extLst>
+  </p:cSld>
+  <p:clrMapOvr>
+    <a:masterClrMapping/>
+  </p:clrMapOvr>
+</p:sld>
+</file>
+
+<file path=ppt/slides/slide52.xml><?xml version="1.0" encoding="utf-8"?>
 <p:sld xmlns:a="http://schemas.openxmlformats.org/drawingml/2006/main" xmlns:r="http://schemas.openxmlformats.org/officeDocument/2006/relationships" xmlns:p="http://schemas.openxmlformats.org/presentationml/2006/main">
   <p:cSld>
     <p:spTree>
@@ -18420,7 +18593,7 @@
 </p:sld>
 </file>
 
-<file path=ppt/slides/slide52.xml><?xml version="1.0" encoding="utf-8"?>
+<file path=ppt/slides/slide53.xml><?xml version="1.0" encoding="utf-8"?>
 <p:sld xmlns:a="http://schemas.openxmlformats.org/drawingml/2006/main" xmlns:r="http://schemas.openxmlformats.org/officeDocument/2006/relationships" xmlns:p="http://schemas.openxmlformats.org/presentationml/2006/main">
   <p:cSld>
     <p:spTree>
@@ -18528,7 +18701,7 @@
 </p:sld>
 </file>
 
-<file path=ppt/slides/slide53.xml><?xml version="1.0" encoding="utf-8"?>
+<file path=ppt/slides/slide54.xml><?xml version="1.0" encoding="utf-8"?>
 <p:sld xmlns:a="http://schemas.openxmlformats.org/drawingml/2006/main" xmlns:r="http://schemas.openxmlformats.org/officeDocument/2006/relationships" xmlns:p="http://schemas.openxmlformats.org/presentationml/2006/main">
   <p:cSld>
     <p:spTree>
@@ -18636,296 +18809,6 @@
 </p:sld>
 </file>
 
-<file path=ppt/slides/slide54.xml><?xml version="1.0" encoding="utf-8"?>
-<p:sld xmlns:a="http://schemas.openxmlformats.org/drawingml/2006/main" xmlns:r="http://schemas.openxmlformats.org/officeDocument/2006/relationships" xmlns:p="http://schemas.openxmlformats.org/presentationml/2006/main">
-  <p:cSld>
-    <p:spTree>
-      <p:nvGrpSpPr>
-        <p:cNvPr id="1" name=""/>
-        <p:cNvGrpSpPr/>
-        <p:nvPr/>
-      </p:nvGrpSpPr>
-      <p:grpSpPr>
-        <a:xfrm>
-          <a:off x="0" y="0"/>
-          <a:ext cx="0" cy="0"/>
-          <a:chOff x="0" y="0"/>
-          <a:chExt cx="0" cy="0"/>
-        </a:xfrm>
-      </p:grpSpPr>
-      <p:sp>
-        <p:nvSpPr>
-          <p:cNvPr id="4" name="Tytuł 3">
-            <a:extLst>
-              <a:ext uri="{FF2B5EF4-FFF2-40B4-BE49-F238E27FC236}">
-                <a16:creationId xmlns:a16="http://schemas.microsoft.com/office/drawing/2014/main" id="{FB6DB2D1-04D0-46FF-AACE-3F6DC0B935EC}"/>
-              </a:ext>
-            </a:extLst>
-          </p:cNvPr>
-          <p:cNvSpPr>
-            <a:spLocks noGrp="1"/>
-          </p:cNvSpPr>
-          <p:nvPr>
-            <p:ph type="title"/>
-          </p:nvPr>
-        </p:nvSpPr>
-        <p:spPr/>
-        <p:txBody>
-          <a:bodyPr/>
-          <a:lstStyle/>
-          <a:p>
-            <a:r>
-              <a:rPr lang="pl-PL" dirty="0"/>
-              <a:t>Event </a:t>
-            </a:r>
-            <a:r>
-              <a:rPr lang="pl-PL" dirty="0" err="1"/>
-              <a:t>Grid</a:t>
-            </a:r>
-            <a:r>
-              <a:rPr lang="pl-PL" dirty="0"/>
-              <a:t> </a:t>
-            </a:r>
-            <a:r>
-              <a:rPr lang="pl-PL" dirty="0" err="1"/>
-              <a:t>Publishers</a:t>
-            </a:r>
-            <a:endParaRPr lang="pl-PL" dirty="0"/>
-          </a:p>
-        </p:txBody>
-      </p:sp>
-      <p:sp>
-        <p:nvSpPr>
-          <p:cNvPr id="5" name="Symbol zastępczy tekstu 4">
-            <a:extLst>
-              <a:ext uri="{FF2B5EF4-FFF2-40B4-BE49-F238E27FC236}">
-                <a16:creationId xmlns:a16="http://schemas.microsoft.com/office/drawing/2014/main" id="{DDECDB50-AE48-4F2C-9949-389F3AACE293}"/>
-              </a:ext>
-            </a:extLst>
-          </p:cNvPr>
-          <p:cNvSpPr>
-            <a:spLocks noGrp="1"/>
-          </p:cNvSpPr>
-          <p:nvPr>
-            <p:ph type="body" idx="1"/>
-          </p:nvPr>
-        </p:nvSpPr>
-        <p:spPr/>
-        <p:txBody>
-          <a:bodyPr/>
-          <a:lstStyle/>
-          <a:p>
-            <a:r>
-              <a:rPr lang="en-US" dirty="0"/>
-              <a:t>Built in</a:t>
-            </a:r>
-          </a:p>
-        </p:txBody>
-      </p:sp>
-      <p:sp>
-        <p:nvSpPr>
-          <p:cNvPr id="6" name="Symbol zastępczy zawartości 5">
-            <a:extLst>
-              <a:ext uri="{FF2B5EF4-FFF2-40B4-BE49-F238E27FC236}">
-                <a16:creationId xmlns:a16="http://schemas.microsoft.com/office/drawing/2014/main" id="{2B19FDC3-4F08-43D5-A559-B8ECE5E234C4}"/>
-              </a:ext>
-            </a:extLst>
-          </p:cNvPr>
-          <p:cNvSpPr>
-            <a:spLocks noGrp="1"/>
-          </p:cNvSpPr>
-          <p:nvPr>
-            <p:ph sz="half" idx="2"/>
-          </p:nvPr>
-        </p:nvSpPr>
-        <p:spPr/>
-        <p:txBody>
-          <a:bodyPr>
-            <a:normAutofit fontScale="85000" lnSpcReduction="20000"/>
-          </a:bodyPr>
-          <a:lstStyle/>
-          <a:p>
-            <a:r>
-              <a:rPr lang="pl-PL" dirty="0" err="1"/>
-              <a:t>Azure</a:t>
-            </a:r>
-            <a:r>
-              <a:rPr lang="pl-PL" dirty="0"/>
-              <a:t> </a:t>
-            </a:r>
-            <a:r>
-              <a:rPr lang="pl-PL" dirty="0" err="1"/>
-              <a:t>Subscriptions</a:t>
-            </a:r>
-            <a:r>
-              <a:rPr lang="pl-PL" dirty="0"/>
-              <a:t> </a:t>
-            </a:r>
-          </a:p>
-          <a:p>
-            <a:r>
-              <a:rPr lang="pl-PL" dirty="0" err="1"/>
-              <a:t>Container</a:t>
-            </a:r>
-            <a:r>
-              <a:rPr lang="pl-PL" dirty="0"/>
-              <a:t> Registry</a:t>
-            </a:r>
-          </a:p>
-          <a:p>
-            <a:r>
-              <a:rPr lang="pl-PL" dirty="0"/>
-              <a:t>Event </a:t>
-            </a:r>
-            <a:r>
-              <a:rPr lang="pl-PL" dirty="0" err="1"/>
-              <a:t>Hubs</a:t>
-            </a:r>
-            <a:endParaRPr lang="pl-PL" dirty="0"/>
-          </a:p>
-          <a:p>
-            <a:r>
-              <a:rPr lang="pl-PL" dirty="0" err="1"/>
-              <a:t>IoT</a:t>
-            </a:r>
-            <a:r>
-              <a:rPr lang="pl-PL" dirty="0"/>
-              <a:t> Hub</a:t>
-            </a:r>
-          </a:p>
-          <a:p>
-            <a:r>
-              <a:rPr lang="pl-PL" dirty="0"/>
-              <a:t>Media Services</a:t>
-            </a:r>
-          </a:p>
-          <a:p>
-            <a:r>
-              <a:rPr lang="pl-PL" dirty="0"/>
-              <a:t>Resource </a:t>
-            </a:r>
-            <a:r>
-              <a:rPr lang="pl-PL" dirty="0" err="1"/>
-              <a:t>Groups</a:t>
-            </a:r>
-            <a:endParaRPr lang="pl-PL" dirty="0"/>
-          </a:p>
-          <a:p>
-            <a:r>
-              <a:rPr lang="pl-PL" dirty="0"/>
-              <a:t>Service Bus</a:t>
-            </a:r>
-          </a:p>
-          <a:p>
-            <a:r>
-              <a:rPr lang="pl-PL" dirty="0"/>
-              <a:t>Storage </a:t>
-            </a:r>
-            <a:r>
-              <a:rPr lang="pl-PL" dirty="0" err="1"/>
-              <a:t>Blob</a:t>
-            </a:r>
-            <a:endParaRPr lang="pl-PL" dirty="0"/>
-          </a:p>
-          <a:p>
-            <a:r>
-              <a:rPr lang="pl-PL" dirty="0"/>
-              <a:t>Storage General-</a:t>
-            </a:r>
-            <a:r>
-              <a:rPr lang="pl-PL" dirty="0" err="1"/>
-              <a:t>purpose</a:t>
-            </a:r>
-            <a:endParaRPr lang="pl-PL" dirty="0"/>
-          </a:p>
-          <a:p>
-            <a:r>
-              <a:rPr lang="pl-PL" dirty="0" err="1"/>
-              <a:t>Azure</a:t>
-            </a:r>
-            <a:r>
-              <a:rPr lang="pl-PL" dirty="0"/>
-              <a:t> </a:t>
-            </a:r>
-            <a:r>
-              <a:rPr lang="pl-PL" dirty="0" err="1"/>
-              <a:t>Maps</a:t>
-            </a:r>
-            <a:endParaRPr lang="pl-PL" dirty="0"/>
-          </a:p>
-        </p:txBody>
-      </p:sp>
-      <p:sp>
-        <p:nvSpPr>
-          <p:cNvPr id="7" name="Symbol zastępczy tekstu 6">
-            <a:extLst>
-              <a:ext uri="{FF2B5EF4-FFF2-40B4-BE49-F238E27FC236}">
-                <a16:creationId xmlns:a16="http://schemas.microsoft.com/office/drawing/2014/main" id="{F9BC82B8-AFF7-47B5-BB53-D14C461F5948}"/>
-              </a:ext>
-            </a:extLst>
-          </p:cNvPr>
-          <p:cNvSpPr>
-            <a:spLocks noGrp="1"/>
-          </p:cNvSpPr>
-          <p:nvPr>
-            <p:ph type="body" sz="quarter" idx="3"/>
-          </p:nvPr>
-        </p:nvSpPr>
-        <p:spPr/>
-        <p:txBody>
-          <a:bodyPr/>
-          <a:lstStyle/>
-          <a:p>
-            <a:r>
-              <a:rPr lang="en-US" dirty="0"/>
-              <a:t>Custom</a:t>
-            </a:r>
-          </a:p>
-        </p:txBody>
-      </p:sp>
-      <p:sp>
-        <p:nvSpPr>
-          <p:cNvPr id="8" name="Symbol zastępczy zawartości 7">
-            <a:extLst>
-              <a:ext uri="{FF2B5EF4-FFF2-40B4-BE49-F238E27FC236}">
-                <a16:creationId xmlns:a16="http://schemas.microsoft.com/office/drawing/2014/main" id="{4858852D-6029-4D64-AF77-2564D6288EE6}"/>
-              </a:ext>
-            </a:extLst>
-          </p:cNvPr>
-          <p:cNvSpPr>
-            <a:spLocks noGrp="1"/>
-          </p:cNvSpPr>
-          <p:nvPr>
-            <p:ph sz="quarter" idx="4"/>
-          </p:nvPr>
-        </p:nvSpPr>
-        <p:spPr/>
-        <p:txBody>
-          <a:bodyPr>
-            <a:normAutofit fontScale="85000" lnSpcReduction="20000"/>
-          </a:bodyPr>
-          <a:lstStyle/>
-          <a:p>
-            <a:r>
-              <a:rPr lang="en-US" dirty="0"/>
-              <a:t>Whatever custom Topic you want and need</a:t>
-            </a:r>
-          </a:p>
-        </p:txBody>
-      </p:sp>
-    </p:spTree>
-    <p:extLst>
-      <p:ext uri="{BB962C8B-B14F-4D97-AF65-F5344CB8AC3E}">
-        <p14:creationId xmlns:p14="http://schemas.microsoft.com/office/powerpoint/2010/main" val="3981712074"/>
-      </p:ext>
-    </p:extLst>
-  </p:cSld>
-  <p:clrMapOvr>
-    <a:masterClrMapping/>
-  </p:clrMapOvr>
-</p:sld>
-</file>
-
 <file path=ppt/slides/slide55.xml><?xml version="1.0" encoding="utf-8"?>
 <p:sld xmlns:a="http://schemas.openxmlformats.org/drawingml/2006/main" xmlns:r="http://schemas.openxmlformats.org/officeDocument/2006/relationships" xmlns:p="http://schemas.openxmlformats.org/presentationml/2006/main">
   <p:cSld>
@@ -18978,7 +18861,7 @@
             </a:r>
             <a:r>
               <a:rPr lang="pl-PL" dirty="0" err="1"/>
-              <a:t>Handlers</a:t>
+              <a:t>Publishers</a:t>
             </a:r>
             <a:endParaRPr lang="pl-PL" dirty="0"/>
           </a:p>
@@ -19031,7 +18914,7 @@
         <p:spPr/>
         <p:txBody>
           <a:bodyPr>
-            <a:normAutofit lnSpcReduction="10000"/>
+            <a:normAutofit fontScale="85000" lnSpcReduction="20000"/>
           </a:bodyPr>
           <a:lstStyle/>
           <a:p>
@@ -19041,8 +18924,92 @@
             </a:r>
             <a:r>
               <a:rPr lang="pl-PL" dirty="0"/>
-              <a:t> Automation</a:t>
-            </a:r>
+              <a:t> </a:t>
+            </a:r>
+            <a:r>
+              <a:rPr lang="pl-PL" dirty="0" err="1"/>
+              <a:t>Subscriptions</a:t>
+            </a:r>
+            <a:r>
+              <a:rPr lang="pl-PL" dirty="0"/>
+              <a:t> </a:t>
+            </a:r>
+          </a:p>
+          <a:p>
+            <a:r>
+              <a:rPr lang="pl-PL" dirty="0" err="1"/>
+              <a:t>Container</a:t>
+            </a:r>
+            <a:r>
+              <a:rPr lang="pl-PL" dirty="0"/>
+              <a:t> Registry</a:t>
+            </a:r>
+          </a:p>
+          <a:p>
+            <a:r>
+              <a:rPr lang="pl-PL" dirty="0"/>
+              <a:t>Event </a:t>
+            </a:r>
+            <a:r>
+              <a:rPr lang="pl-PL" dirty="0" err="1"/>
+              <a:t>Hubs</a:t>
+            </a:r>
+            <a:endParaRPr lang="pl-PL" dirty="0"/>
+          </a:p>
+          <a:p>
+            <a:r>
+              <a:rPr lang="pl-PL" dirty="0" err="1"/>
+              <a:t>IoT</a:t>
+            </a:r>
+            <a:r>
+              <a:rPr lang="pl-PL" dirty="0"/>
+              <a:t> Hub</a:t>
+            </a:r>
+          </a:p>
+          <a:p>
+            <a:r>
+              <a:rPr lang="pl-PL" dirty="0"/>
+              <a:t>Media Services</a:t>
+            </a:r>
+          </a:p>
+          <a:p>
+            <a:r>
+              <a:rPr lang="pl-PL" dirty="0"/>
+              <a:t>Resource </a:t>
+            </a:r>
+            <a:r>
+              <a:rPr lang="pl-PL" dirty="0" err="1"/>
+              <a:t>Groups</a:t>
+            </a:r>
+            <a:endParaRPr lang="pl-PL" dirty="0"/>
+          </a:p>
+          <a:p>
+            <a:r>
+              <a:rPr lang="pl-PL" dirty="0"/>
+              <a:t>Service Bus</a:t>
+            </a:r>
+          </a:p>
+          <a:p>
+            <a:r>
+              <a:rPr lang="pl-PL" dirty="0"/>
+              <a:t>Storage </a:t>
+            </a:r>
+            <a:r>
+              <a:rPr lang="pl-PL" dirty="0" err="1"/>
+              <a:t>Blob</a:t>
+            </a:r>
+            <a:endParaRPr lang="pl-PL" dirty="0"/>
+          </a:p>
+          <a:p>
+            <a:r>
+              <a:rPr lang="pl-PL" dirty="0"/>
+              <a:t>Storage General-</a:t>
+            </a:r>
+            <a:r>
+              <a:rPr lang="pl-PL" dirty="0" err="1"/>
+              <a:t>purpose</a:t>
+            </a:r>
+            <a:endParaRPr lang="pl-PL" dirty="0"/>
           </a:p>
           <a:p>
             <a:r>
@@ -19055,80 +19022,9 @@
             </a:r>
             <a:r>
               <a:rPr lang="pl-PL" dirty="0" err="1"/>
-              <a:t>Functions</a:t>
+              <a:t>Maps</a:t>
             </a:r>
             <a:endParaRPr lang="pl-PL" dirty="0"/>
-          </a:p>
-          <a:p>
-            <a:r>
-              <a:rPr lang="pl-PL" dirty="0"/>
-              <a:t>Event </a:t>
-            </a:r>
-            <a:r>
-              <a:rPr lang="pl-PL" dirty="0" err="1"/>
-              <a:t>Hubs</a:t>
-            </a:r>
-            <a:endParaRPr lang="pl-PL" dirty="0"/>
-          </a:p>
-          <a:p>
-            <a:r>
-              <a:rPr lang="pl-PL" dirty="0" err="1"/>
-              <a:t>Hybrid</a:t>
-            </a:r>
-            <a:r>
-              <a:rPr lang="pl-PL" dirty="0"/>
-              <a:t> </a:t>
-            </a:r>
-            <a:r>
-              <a:rPr lang="pl-PL" dirty="0" err="1"/>
-              <a:t>Connections</a:t>
-            </a:r>
-            <a:endParaRPr lang="pl-PL" dirty="0"/>
-          </a:p>
-          <a:p>
-            <a:r>
-              <a:rPr lang="pl-PL" dirty="0" err="1"/>
-              <a:t>Logic</a:t>
-            </a:r>
-            <a:r>
-              <a:rPr lang="pl-PL" dirty="0"/>
-              <a:t> </a:t>
-            </a:r>
-            <a:r>
-              <a:rPr lang="pl-PL" dirty="0" err="1"/>
-              <a:t>Apps</a:t>
-            </a:r>
-            <a:endParaRPr lang="pl-PL" dirty="0"/>
-          </a:p>
-          <a:p>
-            <a:r>
-              <a:rPr lang="pl-PL" dirty="0"/>
-              <a:t>Microsoft </a:t>
-            </a:r>
-            <a:r>
-              <a:rPr lang="pl-PL" dirty="0" err="1"/>
-              <a:t>Flow</a:t>
-            </a:r>
-            <a:endParaRPr lang="pl-PL" dirty="0"/>
-          </a:p>
-          <a:p>
-            <a:r>
-              <a:rPr lang="pl-PL" dirty="0"/>
-              <a:t>Queue Storage</a:t>
-            </a:r>
-          </a:p>
-          <a:p>
-            <a:r>
-              <a:rPr lang="pl-PL" dirty="0" err="1"/>
-              <a:t>WebHooks</a:t>
-            </a:r>
-            <a:endParaRPr lang="pl-PL" dirty="0"/>
-          </a:p>
-          <a:p>
-            <a:pPr marL="0" indent="0">
-              <a:buNone/>
-            </a:pPr>
-            <a:endParaRPr lang="en-US" dirty="0"/>
           </a:p>
         </p:txBody>
       </p:sp>
@@ -19179,19 +19075,13 @@
         <p:spPr/>
         <p:txBody>
           <a:bodyPr>
-            <a:normAutofit lnSpcReduction="10000"/>
+            <a:normAutofit fontScale="85000" lnSpcReduction="20000"/>
           </a:bodyPr>
           <a:lstStyle/>
           <a:p>
             <a:r>
               <a:rPr lang="en-US" dirty="0"/>
-              <a:t>As custom http endpoint</a:t>
-            </a:r>
-          </a:p>
-          <a:p>
-            <a:r>
-              <a:rPr lang="en-US" dirty="0"/>
-              <a:t>As custom Webhook endpoint</a:t>
+              <a:t>Whatever custom Topic you want and need</a:t>
             </a:r>
           </a:p>
         </p:txBody>
@@ -19199,7 +19089,7 @@
     </p:spTree>
     <p:extLst>
       <p:ext uri="{BB962C8B-B14F-4D97-AF65-F5344CB8AC3E}">
-        <p14:creationId xmlns:p14="http://schemas.microsoft.com/office/powerpoint/2010/main" val="2669858438"/>
+        <p14:creationId xmlns:p14="http://schemas.microsoft.com/office/powerpoint/2010/main" val="3981712074"/>
       </p:ext>
     </p:extLst>
   </p:cSld>
@@ -19257,7 +19147,40 @@
             </a:r>
             <a:r>
               <a:rPr lang="pl-PL" dirty="0"/>
-              <a:t> - Demo</a:t>
+              <a:t> </a:t>
+            </a:r>
+            <a:r>
+              <a:rPr lang="pl-PL" dirty="0" err="1"/>
+              <a:t>Handlers</a:t>
+            </a:r>
+            <a:endParaRPr lang="pl-PL" dirty="0"/>
+          </a:p>
+        </p:txBody>
+      </p:sp>
+      <p:sp>
+        <p:nvSpPr>
+          <p:cNvPr id="5" name="Symbol zastępczy tekstu 4">
+            <a:extLst>
+              <a:ext uri="{FF2B5EF4-FFF2-40B4-BE49-F238E27FC236}">
+                <a16:creationId xmlns:a16="http://schemas.microsoft.com/office/drawing/2014/main" id="{DDECDB50-AE48-4F2C-9949-389F3AACE293}"/>
+              </a:ext>
+            </a:extLst>
+          </p:cNvPr>
+          <p:cNvSpPr>
+            <a:spLocks noGrp="1"/>
+          </p:cNvSpPr>
+          <p:nvPr>
+            <p:ph type="body" idx="1"/>
+          </p:nvPr>
+        </p:nvSpPr>
+        <p:spPr/>
+        <p:txBody>
+          <a:bodyPr/>
+          <a:lstStyle/>
+          <a:p>
+            <a:r>
+              <a:rPr lang="en-US" dirty="0"/>
+              <a:t>Built in</a:t>
             </a:r>
           </a:p>
         </p:txBody>
@@ -19278,33 +19201,170 @@
             <p:ph sz="half" idx="2"/>
           </p:nvPr>
         </p:nvSpPr>
-        <p:spPr>
-          <a:xfrm>
-            <a:off x="814728" y="2751138"/>
-            <a:ext cx="10200601" cy="3109913"/>
-          </a:xfrm>
-        </p:spPr>
+        <p:spPr/>
         <p:txBody>
           <a:bodyPr>
-            <a:normAutofit/>
+            <a:normAutofit lnSpcReduction="10000"/>
           </a:bodyPr>
           <a:lstStyle/>
           <a:p>
             <a:r>
+              <a:rPr lang="pl-PL" dirty="0" err="1"/>
+              <a:t>Azure</a:t>
+            </a:r>
+            <a:r>
+              <a:rPr lang="pl-PL" dirty="0"/>
+              <a:t> Automation</a:t>
+            </a:r>
+          </a:p>
+          <a:p>
+            <a:r>
+              <a:rPr lang="pl-PL" dirty="0" err="1"/>
+              <a:t>Azure</a:t>
+            </a:r>
+            <a:r>
+              <a:rPr lang="pl-PL" dirty="0"/>
+              <a:t> </a:t>
+            </a:r>
+            <a:r>
+              <a:rPr lang="pl-PL" dirty="0" err="1"/>
+              <a:t>Functions</a:t>
+            </a:r>
+            <a:endParaRPr lang="pl-PL" dirty="0"/>
+          </a:p>
+          <a:p>
+            <a:r>
+              <a:rPr lang="pl-PL" dirty="0"/>
+              <a:t>Event </a:t>
+            </a:r>
+            <a:r>
+              <a:rPr lang="pl-PL" dirty="0" err="1"/>
+              <a:t>Hubs</a:t>
+            </a:r>
+            <a:endParaRPr lang="pl-PL" dirty="0"/>
+          </a:p>
+          <a:p>
+            <a:r>
+              <a:rPr lang="pl-PL" dirty="0" err="1"/>
+              <a:t>Hybrid</a:t>
+            </a:r>
+            <a:r>
+              <a:rPr lang="pl-PL" dirty="0"/>
+              <a:t> </a:t>
+            </a:r>
+            <a:r>
+              <a:rPr lang="pl-PL" dirty="0" err="1"/>
+              <a:t>Connections</a:t>
+            </a:r>
+            <a:endParaRPr lang="pl-PL" dirty="0"/>
+          </a:p>
+          <a:p>
+            <a:r>
+              <a:rPr lang="pl-PL" dirty="0" err="1"/>
+              <a:t>Logic</a:t>
+            </a:r>
+            <a:r>
+              <a:rPr lang="pl-PL" dirty="0"/>
+              <a:t> </a:t>
+            </a:r>
+            <a:r>
+              <a:rPr lang="pl-PL" dirty="0" err="1"/>
+              <a:t>Apps</a:t>
+            </a:r>
+            <a:endParaRPr lang="pl-PL" dirty="0"/>
+          </a:p>
+          <a:p>
+            <a:r>
+              <a:rPr lang="pl-PL" dirty="0"/>
+              <a:t>Microsoft </a:t>
+            </a:r>
+            <a:r>
+              <a:rPr lang="pl-PL" dirty="0" err="1"/>
+              <a:t>Flow</a:t>
+            </a:r>
+            <a:endParaRPr lang="pl-PL" dirty="0"/>
+          </a:p>
+          <a:p>
+            <a:r>
+              <a:rPr lang="pl-PL" dirty="0"/>
+              <a:t>Queue Storage</a:t>
+            </a:r>
+          </a:p>
+          <a:p>
+            <a:r>
+              <a:rPr lang="pl-PL" dirty="0" err="1"/>
+              <a:t>WebHooks</a:t>
+            </a:r>
+            <a:endParaRPr lang="pl-PL" dirty="0"/>
+          </a:p>
+          <a:p>
+            <a:pPr marL="0" indent="0">
+              <a:buNone/>
+            </a:pPr>
+            <a:endParaRPr lang="en-US" dirty="0"/>
+          </a:p>
+        </p:txBody>
+      </p:sp>
+      <p:sp>
+        <p:nvSpPr>
+          <p:cNvPr id="7" name="Symbol zastępczy tekstu 6">
+            <a:extLst>
+              <a:ext uri="{FF2B5EF4-FFF2-40B4-BE49-F238E27FC236}">
+                <a16:creationId xmlns:a16="http://schemas.microsoft.com/office/drawing/2014/main" id="{F9BC82B8-AFF7-47B5-BB53-D14C461F5948}"/>
+              </a:ext>
+            </a:extLst>
+          </p:cNvPr>
+          <p:cNvSpPr>
+            <a:spLocks noGrp="1"/>
+          </p:cNvSpPr>
+          <p:nvPr>
+            <p:ph type="body" sz="quarter" idx="3"/>
+          </p:nvPr>
+        </p:nvSpPr>
+        <p:spPr/>
+        <p:txBody>
+          <a:bodyPr/>
+          <a:lstStyle/>
+          <a:p>
+            <a:r>
               <a:rPr lang="en-US" dirty="0"/>
-              <a:t>Creating Event Grid</a:t>
-            </a:r>
-          </a:p>
+              <a:t>Custom</a:t>
+            </a:r>
+          </a:p>
+        </p:txBody>
+      </p:sp>
+      <p:sp>
+        <p:nvSpPr>
+          <p:cNvPr id="8" name="Symbol zastępczy zawartości 7">
+            <a:extLst>
+              <a:ext uri="{FF2B5EF4-FFF2-40B4-BE49-F238E27FC236}">
+                <a16:creationId xmlns:a16="http://schemas.microsoft.com/office/drawing/2014/main" id="{4858852D-6029-4D64-AF77-2564D6288EE6}"/>
+              </a:ext>
+            </a:extLst>
+          </p:cNvPr>
+          <p:cNvSpPr>
+            <a:spLocks noGrp="1"/>
+          </p:cNvSpPr>
+          <p:nvPr>
+            <p:ph sz="quarter" idx="4"/>
+          </p:nvPr>
+        </p:nvSpPr>
+        <p:spPr/>
+        <p:txBody>
+          <a:bodyPr>
+            <a:normAutofit lnSpcReduction="10000"/>
+          </a:bodyPr>
+          <a:lstStyle/>
           <a:p>
             <a:r>
               <a:rPr lang="en-US" dirty="0"/>
-              <a:t>Creating Custom Topic</a:t>
+              <a:t>As custom http endpoint</a:t>
             </a:r>
           </a:p>
           <a:p>
             <a:r>
               <a:rPr lang="en-US" dirty="0"/>
-              <a:t>Publishing to Custom Topic</a:t>
+              <a:t>As custom Webhook endpoint</a:t>
             </a:r>
           </a:p>
         </p:txBody>
@@ -19312,7 +19372,7 @@
     </p:spTree>
     <p:extLst>
       <p:ext uri="{BB962C8B-B14F-4D97-AF65-F5344CB8AC3E}">
-        <p14:creationId xmlns:p14="http://schemas.microsoft.com/office/powerpoint/2010/main" val="1614553516"/>
+        <p14:creationId xmlns:p14="http://schemas.microsoft.com/office/powerpoint/2010/main" val="2669858438"/>
       </p:ext>
     </p:extLst>
   </p:cSld>
@@ -19361,8 +19421,24 @@
           <a:lstStyle/>
           <a:p>
             <a:r>
-              <a:rPr lang="en-US" dirty="0"/>
-              <a:t>Event Grid – Exercises</a:t>
+              <a:rPr lang="pl-PL" dirty="0"/>
+              <a:t>Event </a:t>
+            </a:r>
+            <a:r>
+              <a:rPr lang="pl-PL" dirty="0" err="1"/>
+              <a:t>Grid</a:t>
+            </a:r>
+            <a:r>
+              <a:rPr lang="pl-PL" dirty="0"/>
+              <a:t> „</a:t>
+            </a:r>
+            <a:r>
+              <a:rPr lang="pl-PL" dirty="0" err="1"/>
+              <a:t>Limitation</a:t>
+            </a:r>
+            <a:r>
+              <a:rPr lang="pl-PL" dirty="0"/>
+              <a:t>”</a:t>
             </a:r>
           </a:p>
         </p:txBody>
@@ -19386,7 +19462,7 @@
         <p:spPr>
           <a:xfrm>
             <a:off x="814728" y="2751138"/>
-            <a:ext cx="10200601" cy="3109913"/>
+            <a:ext cx="10567269" cy="3109913"/>
           </a:xfrm>
         </p:spPr>
         <p:txBody>
@@ -19395,56 +19471,21 @@
           </a:bodyPr>
           <a:lstStyle/>
           <a:p>
-            <a:pPr>
-              <a:buFont typeface="+mj-lt"/>
-              <a:buAutoNum type="arabicPeriod"/>
-            </a:pPr>
             <a:r>
               <a:rPr lang="en-US" dirty="0"/>
-              <a:t>Create function (</a:t>
-            </a:r>
-            <a:r>
-              <a:rPr lang="en-US" dirty="0" err="1"/>
-              <a:t>HttpTrigger</a:t>
-            </a:r>
+              <a:t>No Output binding in Functions</a:t>
+            </a:r>
+          </a:p>
+          <a:p>
             <a:r>
               <a:rPr lang="en-US" dirty="0"/>
-              <a:t>)</a:t>
-            </a:r>
-          </a:p>
-          <a:p>
-            <a:pPr>
-              <a:buFont typeface="+mj-lt"/>
-              <a:buAutoNum type="arabicPeriod"/>
-            </a:pPr>
+              <a:t>Not “easy“ to publish custom event</a:t>
+            </a:r>
+          </a:p>
+          <a:p>
             <a:r>
               <a:rPr lang="en-US" dirty="0"/>
-              <a:t>Function should receive information about user (Name, email, Age, Fav animal: cat | dog)</a:t>
-            </a:r>
-          </a:p>
-          <a:p>
-            <a:pPr>
-              <a:buFont typeface="+mj-lt"/>
-              <a:buAutoNum type="arabicPeriod"/>
-            </a:pPr>
-            <a:r>
-              <a:rPr lang="en-US" dirty="0"/>
-              <a:t>Once proper information is received it should be published to custom topic: </a:t>
-            </a:r>
-            <a:r>
-              <a:rPr lang="en-US" dirty="0" err="1"/>
-              <a:t>PersonHired</a:t>
-            </a:r>
-            <a:endParaRPr lang="en-US" dirty="0"/>
-          </a:p>
-          <a:p>
-            <a:pPr>
-              <a:buFont typeface="+mj-lt"/>
-              <a:buAutoNum type="arabicPeriod"/>
-            </a:pPr>
-            <a:r>
-              <a:rPr lang="en-US" dirty="0"/>
-              <a:t>Make sure that event have been executed</a:t>
+              <a:t>Azure UI… not always works</a:t>
             </a:r>
           </a:p>
         </p:txBody>
@@ -19452,7 +19493,7 @@
     </p:spTree>
     <p:extLst>
       <p:ext uri="{BB962C8B-B14F-4D97-AF65-F5344CB8AC3E}">
-        <p14:creationId xmlns:p14="http://schemas.microsoft.com/office/powerpoint/2010/main" val="1752779467"/>
+        <p14:creationId xmlns:p14="http://schemas.microsoft.com/office/powerpoint/2010/main" val="1847654897"/>
       </p:ext>
     </p:extLst>
   </p:cSld>
@@ -19481,10 +19522,10 @@
       </p:grpSpPr>
       <p:sp>
         <p:nvSpPr>
-          <p:cNvPr id="2" name="Tytuł 1">
+          <p:cNvPr id="4" name="Tytuł 3">
             <a:extLst>
               <a:ext uri="{FF2B5EF4-FFF2-40B4-BE49-F238E27FC236}">
-                <a16:creationId xmlns:a16="http://schemas.microsoft.com/office/drawing/2014/main" id="{E2706499-BF81-4E20-8EAB-2E0B2DE9D6C4}"/>
+                <a16:creationId xmlns:a16="http://schemas.microsoft.com/office/drawing/2014/main" id="{FB6DB2D1-04D0-46FF-AACE-3F6DC0B935EC}"/>
               </a:ext>
             </a:extLst>
           </p:cNvPr>
@@ -19501,27 +19542,26 @@
           <a:lstStyle/>
           <a:p>
             <a:r>
-              <a:rPr lang="pl-PL" dirty="0" err="1"/>
-              <a:t>Things</a:t>
-            </a:r>
-            <a:r>
-              <a:rPr lang="pl-PL" dirty="0"/>
-              <a:t> to </a:t>
-            </a:r>
-            <a:r>
-              <a:rPr lang="pl-PL" dirty="0" err="1"/>
-              <a:t>note</a:t>
-            </a:r>
-            <a:endParaRPr lang="pl-PL" dirty="0"/>
-          </a:p>
-        </p:txBody>
-      </p:sp>
-      <p:sp>
-        <p:nvSpPr>
-          <p:cNvPr id="3" name="Symbol zastępczy zawartości 2">
+              <a:rPr lang="pl-PL" dirty="0"/>
+              <a:t>Event </a:t>
+            </a:r>
+            <a:r>
+              <a:rPr lang="pl-PL" dirty="0" err="1"/>
+              <a:t>Grid</a:t>
+            </a:r>
+            <a:r>
+              <a:rPr lang="pl-PL" dirty="0"/>
+              <a:t> - Demo</a:t>
+            </a:r>
+          </a:p>
+        </p:txBody>
+      </p:sp>
+      <p:sp>
+        <p:nvSpPr>
+          <p:cNvPr id="6" name="Symbol zastępczy zawartości 5">
             <a:extLst>
               <a:ext uri="{FF2B5EF4-FFF2-40B4-BE49-F238E27FC236}">
-                <a16:creationId xmlns:a16="http://schemas.microsoft.com/office/drawing/2014/main" id="{C5FE8820-2ACD-4C35-B717-5E2B8F5E2412}"/>
+                <a16:creationId xmlns:a16="http://schemas.microsoft.com/office/drawing/2014/main" id="{2B19FDC3-4F08-43D5-A559-B8ECE5E234C4}"/>
               </a:ext>
             </a:extLst>
           </p:cNvPr>
@@ -19529,29 +19569,42 @@
             <a:spLocks noGrp="1"/>
           </p:cNvSpPr>
           <p:nvPr>
-            <p:ph idx="1"/>
-          </p:nvPr>
-        </p:nvSpPr>
-        <p:spPr/>
-        <p:txBody>
-          <a:bodyPr/>
+            <p:ph sz="half" idx="2"/>
+          </p:nvPr>
+        </p:nvSpPr>
+        <p:spPr>
+          <a:xfrm>
+            <a:off x="814728" y="2751138"/>
+            <a:ext cx="10200601" cy="3109913"/>
+          </a:xfrm>
+        </p:spPr>
+        <p:txBody>
+          <a:bodyPr>
+            <a:normAutofit/>
+          </a:bodyPr>
           <a:lstStyle/>
           <a:p>
             <a:r>
               <a:rPr lang="en-US" dirty="0"/>
-              <a:t>Pay as you go</a:t>
+              <a:t>Creating Event Grid Topic</a:t>
             </a:r>
           </a:p>
           <a:p>
             <a:r>
               <a:rPr lang="en-US" dirty="0"/>
-              <a:t>Scalable solution with 99,99 SLA</a:t>
+              <a:t>Adding Subscription</a:t>
             </a:r>
           </a:p>
           <a:p>
             <a:r>
               <a:rPr lang="en-US" dirty="0"/>
-              <a:t>Easy to start using it with our own code</a:t>
+              <a:t>Publishing to Event Grid Topic</a:t>
+            </a:r>
+          </a:p>
+          <a:p>
+            <a:r>
+              <a:rPr lang="en-US" dirty="0"/>
+              <a:t>Reacting on custom Event Grid Topic</a:t>
             </a:r>
           </a:p>
         </p:txBody>
@@ -19559,7 +19612,7 @@
     </p:spTree>
     <p:extLst>
       <p:ext uri="{BB962C8B-B14F-4D97-AF65-F5344CB8AC3E}">
-        <p14:creationId xmlns:p14="http://schemas.microsoft.com/office/powerpoint/2010/main" val="2126295080"/>
+        <p14:creationId xmlns:p14="http://schemas.microsoft.com/office/powerpoint/2010/main" val="1614553516"/>
       </p:ext>
     </p:extLst>
   </p:cSld>
@@ -19591,7 +19644,7 @@
           <p:cNvPr id="4" name="Tytuł 3">
             <a:extLst>
               <a:ext uri="{FF2B5EF4-FFF2-40B4-BE49-F238E27FC236}">
-                <a16:creationId xmlns:a16="http://schemas.microsoft.com/office/drawing/2014/main" id="{940AAD03-8286-4236-9EE3-B78F24BCA549}"/>
+                <a16:creationId xmlns:a16="http://schemas.microsoft.com/office/drawing/2014/main" id="{FB6DB2D1-04D0-46FF-AACE-3F6DC0B935EC}"/>
               </a:ext>
             </a:extLst>
           </p:cNvPr>
@@ -19609,17 +19662,17 @@
           <a:p>
             <a:r>
               <a:rPr lang="en-US" dirty="0"/>
-              <a:t>Azure Logic App</a:t>
-            </a:r>
-          </a:p>
-        </p:txBody>
-      </p:sp>
-      <p:sp>
-        <p:nvSpPr>
-          <p:cNvPr id="5" name="Symbol zastępczy tekstu 4">
+              <a:t>Event Grid – Exercises (easy)</a:t>
+            </a:r>
+          </a:p>
+        </p:txBody>
+      </p:sp>
+      <p:sp>
+        <p:nvSpPr>
+          <p:cNvPr id="6" name="Symbol zastępczy zawartości 5">
             <a:extLst>
               <a:ext uri="{FF2B5EF4-FFF2-40B4-BE49-F238E27FC236}">
-                <a16:creationId xmlns:a16="http://schemas.microsoft.com/office/drawing/2014/main" id="{311A8156-965D-471E-B80E-1B55ED7AFEFE}"/>
+                <a16:creationId xmlns:a16="http://schemas.microsoft.com/office/drawing/2014/main" id="{2B19FDC3-4F08-43D5-A559-B8ECE5E234C4}"/>
               </a:ext>
             </a:extLst>
           </p:cNvPr>
@@ -19627,17 +19680,48 @@
             <a:spLocks noGrp="1"/>
           </p:cNvSpPr>
           <p:nvPr>
-            <p:ph type="body" idx="1"/>
-          </p:nvPr>
-        </p:nvSpPr>
-        <p:spPr/>
-        <p:txBody>
-          <a:bodyPr/>
+            <p:ph sz="half" idx="2"/>
+          </p:nvPr>
+        </p:nvSpPr>
+        <p:spPr>
+          <a:xfrm>
+            <a:off x="814728" y="2751138"/>
+            <a:ext cx="10200601" cy="3109913"/>
+          </a:xfrm>
+        </p:spPr>
+        <p:txBody>
+          <a:bodyPr>
+            <a:normAutofit/>
+          </a:bodyPr>
           <a:lstStyle/>
           <a:p>
+            <a:pPr>
+              <a:buFont typeface="+mj-lt"/>
+              <a:buAutoNum type="arabicPeriod"/>
+            </a:pPr>
             <a:r>
               <a:rPr lang="en-US" dirty="0"/>
-              <a:t>Serverless Workflow</a:t>
+              <a:t>Create function that reacts on Event Grid event</a:t>
+            </a:r>
+          </a:p>
+          <a:p>
+            <a:pPr>
+              <a:buFont typeface="+mj-lt"/>
+              <a:buAutoNum type="arabicPeriod"/>
+            </a:pPr>
+            <a:r>
+              <a:rPr lang="en-US" dirty="0"/>
+              <a:t>React on creating new blob</a:t>
+            </a:r>
+          </a:p>
+          <a:p>
+            <a:pPr>
+              <a:buFont typeface="+mj-lt"/>
+              <a:buAutoNum type="arabicPeriod"/>
+            </a:pPr>
+            <a:r>
+              <a:rPr lang="en-US" dirty="0"/>
+              <a:t>Return information about what blob had been created</a:t>
             </a:r>
           </a:p>
         </p:txBody>
@@ -19645,7 +19729,7 @@
     </p:spTree>
     <p:extLst>
       <p:ext uri="{BB962C8B-B14F-4D97-AF65-F5344CB8AC3E}">
-        <p14:creationId xmlns:p14="http://schemas.microsoft.com/office/powerpoint/2010/main" val="15009661"/>
+        <p14:creationId xmlns:p14="http://schemas.microsoft.com/office/powerpoint/2010/main" val="1752779467"/>
       </p:ext>
     </p:extLst>
   </p:cSld>
@@ -19774,7 +19858,7 @@
           <a:ln/>
           <a:extLst>
             <a:ext uri="{91240B29-F687-4f45-9708-019B960494DF}">
-              <a14:hiddenLine xmlns="" xmlns:a16="http://schemas.microsoft.com/office/drawing/2014/main" xmlns:p14="http://schemas.microsoft.com/office/powerpoint/2010/main" xmlns:a14="http://schemas.microsoft.com/office/drawing/2010/main" w="9525">
+              <a14:hiddenLine xmlns:a14="http://schemas.microsoft.com/office/drawing/2010/main" xmlns:p14="http://schemas.microsoft.com/office/powerpoint/2010/main" xmlns:a16="http://schemas.microsoft.com/office/drawing/2014/main" xmlns="" w="9525">
                 <a:solidFill>
                   <a:srgbClr val="000000"/>
                 </a:solidFill>
@@ -20395,18 +20479,9 @@
           <a:lstStyle/>
           <a:p>
             <a:r>
-              <a:rPr lang="pl-PL" dirty="0" err="1"/>
-              <a:t>Logic</a:t>
-            </a:r>
-            <a:r>
-              <a:rPr lang="pl-PL" dirty="0"/>
-              <a:t> </a:t>
-            </a:r>
-            <a:r>
-              <a:rPr lang="pl-PL" dirty="0" err="1"/>
-              <a:t>App</a:t>
-            </a:r>
-            <a:endParaRPr lang="pl-PL" dirty="0"/>
+              <a:rPr lang="en-US" dirty="0"/>
+              <a:t>Event Grid – Exercises (hard)</a:t>
+            </a:r>
           </a:p>
         </p:txBody>
       </p:sp>
@@ -20438,41 +20513,51 @@
           </a:bodyPr>
           <a:lstStyle/>
           <a:p>
+            <a:pPr>
+              <a:buFont typeface="+mj-lt"/>
+              <a:buAutoNum type="arabicPeriod"/>
+            </a:pPr>
             <a:r>
               <a:rPr lang="en-US" dirty="0"/>
-              <a:t>A way to structure flow of serverless application</a:t>
-            </a:r>
-          </a:p>
-          <a:p>
+              <a:t>Create function (</a:t>
+            </a:r>
+            <a:r>
+              <a:rPr lang="en-US" dirty="0" err="1"/>
+              <a:t>HttpTrigger</a:t>
+            </a:r>
             <a:r>
               <a:rPr lang="en-US" dirty="0"/>
-              <a:t>Allow integration between multiple parts</a:t>
-            </a:r>
-          </a:p>
-          <a:p>
+              <a:t>)</a:t>
+            </a:r>
+          </a:p>
+          <a:p>
+            <a:pPr>
+              <a:buFont typeface="+mj-lt"/>
+              <a:buAutoNum type="arabicPeriod"/>
+            </a:pPr>
             <a:r>
               <a:rPr lang="en-US" dirty="0"/>
-              <a:t>Business friendly – UI available</a:t>
-            </a:r>
-          </a:p>
-          <a:p>
+              <a:t>Function should receive information about user (Name, email, Age, Fav animal: cat | dog)</a:t>
+            </a:r>
+          </a:p>
+          <a:p>
+            <a:pPr>
+              <a:buFont typeface="+mj-lt"/>
+              <a:buAutoNum type="arabicPeriod"/>
+            </a:pPr>
             <a:r>
               <a:rPr lang="en-US" dirty="0"/>
-              <a:t>Dev friendly – All workflow as </a:t>
-            </a:r>
-            <a:r>
-              <a:rPr lang="en-US" dirty="0" err="1"/>
-              <a:t>json</a:t>
-            </a:r>
+              <a:t>Once proper information is received it should be published to custom topic</a:t>
+            </a:r>
+          </a:p>
+          <a:p>
+            <a:pPr>
+              <a:buFont typeface="+mj-lt"/>
+              <a:buAutoNum type="arabicPeriod"/>
+            </a:pPr>
             <a:r>
               <a:rPr lang="en-US" dirty="0"/>
-              <a:t> file</a:t>
-            </a:r>
-          </a:p>
-          <a:p>
-            <a:r>
-              <a:rPr lang="en-US" dirty="0"/>
-              <a:t>Microsoft dev friendly – yep, Visual Studio UI available… </a:t>
+              <a:t>Make sure that event have been executed</a:t>
             </a:r>
           </a:p>
         </p:txBody>
@@ -20480,7 +20565,7 @@
     </p:spTree>
     <p:extLst>
       <p:ext uri="{BB962C8B-B14F-4D97-AF65-F5344CB8AC3E}">
-        <p14:creationId xmlns:p14="http://schemas.microsoft.com/office/powerpoint/2010/main" val="925862103"/>
+        <p14:creationId xmlns:p14="http://schemas.microsoft.com/office/powerpoint/2010/main" val="594503288"/>
       </p:ext>
     </p:extLst>
   </p:cSld>
@@ -20509,10 +20594,10 @@
       </p:grpSpPr>
       <p:sp>
         <p:nvSpPr>
-          <p:cNvPr id="4" name="Tytuł 3">
+          <p:cNvPr id="2" name="Tytuł 1">
             <a:extLst>
               <a:ext uri="{FF2B5EF4-FFF2-40B4-BE49-F238E27FC236}">
-                <a16:creationId xmlns:a16="http://schemas.microsoft.com/office/drawing/2014/main" id="{FB6DB2D1-04D0-46FF-AACE-3F6DC0B935EC}"/>
+                <a16:creationId xmlns:a16="http://schemas.microsoft.com/office/drawing/2014/main" id="{E2706499-BF81-4E20-8EAB-2E0B2DE9D6C4}"/>
               </a:ext>
             </a:extLst>
           </p:cNvPr>
@@ -20530,29 +20615,26 @@
           <a:p>
             <a:r>
               <a:rPr lang="pl-PL" dirty="0" err="1"/>
-              <a:t>Logic</a:t>
-            </a:r>
-            <a:r>
-              <a:rPr lang="pl-PL" dirty="0"/>
-              <a:t> </a:t>
-            </a:r>
-            <a:r>
-              <a:rPr lang="pl-PL" dirty="0" err="1"/>
-              <a:t>App</a:t>
-            </a:r>
-            <a:r>
-              <a:rPr lang="pl-PL" dirty="0"/>
-              <a:t> - Demo</a:t>
-            </a:r>
-          </a:p>
-        </p:txBody>
-      </p:sp>
-      <p:sp>
-        <p:nvSpPr>
-          <p:cNvPr id="6" name="Symbol zastępczy zawartości 5">
+              <a:t>Things</a:t>
+            </a:r>
+            <a:r>
+              <a:rPr lang="pl-PL" dirty="0"/>
+              <a:t> to </a:t>
+            </a:r>
+            <a:r>
+              <a:rPr lang="pl-PL" dirty="0" err="1"/>
+              <a:t>note</a:t>
+            </a:r>
+            <a:endParaRPr lang="pl-PL" dirty="0"/>
+          </a:p>
+        </p:txBody>
+      </p:sp>
+      <p:sp>
+        <p:nvSpPr>
+          <p:cNvPr id="3" name="Symbol zastępczy zawartości 2">
             <a:extLst>
               <a:ext uri="{FF2B5EF4-FFF2-40B4-BE49-F238E27FC236}">
-                <a16:creationId xmlns:a16="http://schemas.microsoft.com/office/drawing/2014/main" id="{2B19FDC3-4F08-43D5-A559-B8ECE5E234C4}"/>
+                <a16:creationId xmlns:a16="http://schemas.microsoft.com/office/drawing/2014/main" id="{C5FE8820-2ACD-4C35-B717-5E2B8F5E2412}"/>
               </a:ext>
             </a:extLst>
           </p:cNvPr>
@@ -20560,36 +20642,29 @@
             <a:spLocks noGrp="1"/>
           </p:cNvSpPr>
           <p:nvPr>
-            <p:ph sz="half" idx="2"/>
-          </p:nvPr>
-        </p:nvSpPr>
-        <p:spPr>
-          <a:xfrm>
-            <a:off x="814728" y="2751138"/>
-            <a:ext cx="10200601" cy="3109913"/>
-          </a:xfrm>
-        </p:spPr>
-        <p:txBody>
-          <a:bodyPr>
-            <a:normAutofit/>
-          </a:bodyPr>
+            <p:ph idx="1"/>
+          </p:nvPr>
+        </p:nvSpPr>
+        <p:spPr/>
+        <p:txBody>
+          <a:bodyPr/>
           <a:lstStyle/>
           <a:p>
             <a:r>
               <a:rPr lang="en-US" dirty="0"/>
-              <a:t>Create Logic App</a:t>
+              <a:t>Pay as you go</a:t>
             </a:r>
           </a:p>
           <a:p>
             <a:r>
               <a:rPr lang="en-US" dirty="0"/>
-              <a:t>Show Possible options</a:t>
+              <a:t>Scalable solution with 99,99 SLA</a:t>
             </a:r>
           </a:p>
           <a:p>
             <a:r>
               <a:rPr lang="en-US" dirty="0"/>
-              <a:t>Show how to run simple flow</a:t>
+              <a:t>Easy to start using it with our own code</a:t>
             </a:r>
           </a:p>
         </p:txBody>
@@ -20597,7 +20672,7 @@
     </p:spTree>
     <p:extLst>
       <p:ext uri="{BB962C8B-B14F-4D97-AF65-F5344CB8AC3E}">
-        <p14:creationId xmlns:p14="http://schemas.microsoft.com/office/powerpoint/2010/main" val="2125732064"/>
+        <p14:creationId xmlns:p14="http://schemas.microsoft.com/office/powerpoint/2010/main" val="2126295080"/>
       </p:ext>
     </p:extLst>
   </p:cSld>
@@ -20629,7 +20704,7 @@
           <p:cNvPr id="4" name="Tytuł 3">
             <a:extLst>
               <a:ext uri="{FF2B5EF4-FFF2-40B4-BE49-F238E27FC236}">
-                <a16:creationId xmlns:a16="http://schemas.microsoft.com/office/drawing/2014/main" id="{FB6DB2D1-04D0-46FF-AACE-3F6DC0B935EC}"/>
+                <a16:creationId xmlns:a16="http://schemas.microsoft.com/office/drawing/2014/main" id="{940AAD03-8286-4236-9EE3-B78F24BCA549}"/>
               </a:ext>
             </a:extLst>
           </p:cNvPr>
@@ -20647,8 +20722,103 @@
           <a:p>
             <a:r>
               <a:rPr lang="en-US" dirty="0"/>
-              <a:t>Logic App – Exercises</a:t>
-            </a:r>
+              <a:t>Azure Logic App</a:t>
+            </a:r>
+          </a:p>
+        </p:txBody>
+      </p:sp>
+      <p:sp>
+        <p:nvSpPr>
+          <p:cNvPr id="5" name="Symbol zastępczy tekstu 4">
+            <a:extLst>
+              <a:ext uri="{FF2B5EF4-FFF2-40B4-BE49-F238E27FC236}">
+                <a16:creationId xmlns:a16="http://schemas.microsoft.com/office/drawing/2014/main" id="{311A8156-965D-471E-B80E-1B55ED7AFEFE}"/>
+              </a:ext>
+            </a:extLst>
+          </p:cNvPr>
+          <p:cNvSpPr>
+            <a:spLocks noGrp="1"/>
+          </p:cNvSpPr>
+          <p:nvPr>
+            <p:ph type="body" idx="1"/>
+          </p:nvPr>
+        </p:nvSpPr>
+        <p:spPr/>
+        <p:txBody>
+          <a:bodyPr/>
+          <a:lstStyle/>
+          <a:p>
+            <a:r>
+              <a:rPr lang="en-US" dirty="0"/>
+              <a:t>Serverless Workflow</a:t>
+            </a:r>
+          </a:p>
+        </p:txBody>
+      </p:sp>
+    </p:spTree>
+    <p:extLst>
+      <p:ext uri="{BB962C8B-B14F-4D97-AF65-F5344CB8AC3E}">
+        <p14:creationId xmlns:p14="http://schemas.microsoft.com/office/powerpoint/2010/main" val="15009661"/>
+      </p:ext>
+    </p:extLst>
+  </p:cSld>
+  <p:clrMapOvr>
+    <a:masterClrMapping/>
+  </p:clrMapOvr>
+</p:sld>
+</file>
+
+<file path=ppt/slides/slide63.xml><?xml version="1.0" encoding="utf-8"?>
+<p:sld xmlns:a="http://schemas.openxmlformats.org/drawingml/2006/main" xmlns:r="http://schemas.openxmlformats.org/officeDocument/2006/relationships" xmlns:p="http://schemas.openxmlformats.org/presentationml/2006/main">
+  <p:cSld>
+    <p:spTree>
+      <p:nvGrpSpPr>
+        <p:cNvPr id="1" name=""/>
+        <p:cNvGrpSpPr/>
+        <p:nvPr/>
+      </p:nvGrpSpPr>
+      <p:grpSpPr>
+        <a:xfrm>
+          <a:off x="0" y="0"/>
+          <a:ext cx="0" cy="0"/>
+          <a:chOff x="0" y="0"/>
+          <a:chExt cx="0" cy="0"/>
+        </a:xfrm>
+      </p:grpSpPr>
+      <p:sp>
+        <p:nvSpPr>
+          <p:cNvPr id="4" name="Tytuł 3">
+            <a:extLst>
+              <a:ext uri="{FF2B5EF4-FFF2-40B4-BE49-F238E27FC236}">
+                <a16:creationId xmlns:a16="http://schemas.microsoft.com/office/drawing/2014/main" id="{FB6DB2D1-04D0-46FF-AACE-3F6DC0B935EC}"/>
+              </a:ext>
+            </a:extLst>
+          </p:cNvPr>
+          <p:cNvSpPr>
+            <a:spLocks noGrp="1"/>
+          </p:cNvSpPr>
+          <p:nvPr>
+            <p:ph type="title"/>
+          </p:nvPr>
+        </p:nvSpPr>
+        <p:spPr/>
+        <p:txBody>
+          <a:bodyPr/>
+          <a:lstStyle/>
+          <a:p>
+            <a:r>
+              <a:rPr lang="pl-PL" dirty="0" err="1"/>
+              <a:t>Logic</a:t>
+            </a:r>
+            <a:r>
+              <a:rPr lang="pl-PL" dirty="0"/>
+              <a:t> </a:t>
+            </a:r>
+            <a:r>
+              <a:rPr lang="pl-PL" dirty="0" err="1"/>
+              <a:t>App</a:t>
+            </a:r>
+            <a:endParaRPr lang="pl-PL" dirty="0"/>
           </a:p>
         </p:txBody>
       </p:sp>
@@ -20680,13 +20850,402 @@
           </a:bodyPr>
           <a:lstStyle/>
           <a:p>
+            <a:r>
+              <a:rPr lang="en-US" dirty="0"/>
+              <a:t>A way to structure flow of serverless application</a:t>
+            </a:r>
+          </a:p>
+          <a:p>
+            <a:r>
+              <a:rPr lang="en-US" dirty="0"/>
+              <a:t>Allow integration between multiple parts</a:t>
+            </a:r>
+          </a:p>
+          <a:p>
+            <a:r>
+              <a:rPr lang="en-US" dirty="0"/>
+              <a:t>Business friendly – UI available</a:t>
+            </a:r>
+          </a:p>
+          <a:p>
+            <a:r>
+              <a:rPr lang="en-US" dirty="0"/>
+              <a:t>Dev friendly – All workflow as </a:t>
+            </a:r>
+            <a:r>
+              <a:rPr lang="en-US" dirty="0" err="1"/>
+              <a:t>json</a:t>
+            </a:r>
+            <a:r>
+              <a:rPr lang="en-US" dirty="0"/>
+              <a:t> file</a:t>
+            </a:r>
+          </a:p>
+          <a:p>
+            <a:r>
+              <a:rPr lang="en-US" dirty="0"/>
+              <a:t>Microsoft dev friendly – yep, Visual Studio UI available… </a:t>
+            </a:r>
+          </a:p>
+        </p:txBody>
+      </p:sp>
+    </p:spTree>
+    <p:extLst>
+      <p:ext uri="{BB962C8B-B14F-4D97-AF65-F5344CB8AC3E}">
+        <p14:creationId xmlns:p14="http://schemas.microsoft.com/office/powerpoint/2010/main" val="925862103"/>
+      </p:ext>
+    </p:extLst>
+  </p:cSld>
+  <p:clrMapOvr>
+    <a:masterClrMapping/>
+  </p:clrMapOvr>
+</p:sld>
+</file>
+
+<file path=ppt/slides/slide64.xml><?xml version="1.0" encoding="utf-8"?>
+<p:sld xmlns:a="http://schemas.openxmlformats.org/drawingml/2006/main" xmlns:r="http://schemas.openxmlformats.org/officeDocument/2006/relationships" xmlns:p="http://schemas.openxmlformats.org/presentationml/2006/main">
+  <p:cSld>
+    <p:spTree>
+      <p:nvGrpSpPr>
+        <p:cNvPr id="1" name=""/>
+        <p:cNvGrpSpPr/>
+        <p:nvPr/>
+      </p:nvGrpSpPr>
+      <p:grpSpPr>
+        <a:xfrm>
+          <a:off x="0" y="0"/>
+          <a:ext cx="0" cy="0"/>
+          <a:chOff x="0" y="0"/>
+          <a:chExt cx="0" cy="0"/>
+        </a:xfrm>
+      </p:grpSpPr>
+      <p:sp>
+        <p:nvSpPr>
+          <p:cNvPr id="4" name="Tytuł 3">
+            <a:extLst>
+              <a:ext uri="{FF2B5EF4-FFF2-40B4-BE49-F238E27FC236}">
+                <a16:creationId xmlns:a16="http://schemas.microsoft.com/office/drawing/2014/main" id="{FB6DB2D1-04D0-46FF-AACE-3F6DC0B935EC}"/>
+              </a:ext>
+            </a:extLst>
+          </p:cNvPr>
+          <p:cNvSpPr>
+            <a:spLocks noGrp="1"/>
+          </p:cNvSpPr>
+          <p:nvPr>
+            <p:ph type="title"/>
+          </p:nvPr>
+        </p:nvSpPr>
+        <p:spPr/>
+        <p:txBody>
+          <a:bodyPr/>
+          <a:lstStyle/>
+          <a:p>
+            <a:r>
+              <a:rPr lang="pl-PL" dirty="0" err="1"/>
+              <a:t>Logic</a:t>
+            </a:r>
+            <a:r>
+              <a:rPr lang="pl-PL" dirty="0"/>
+              <a:t> </a:t>
+            </a:r>
+            <a:r>
+              <a:rPr lang="pl-PL" dirty="0" err="1"/>
+              <a:t>App</a:t>
+            </a:r>
+            <a:r>
+              <a:rPr lang="pl-PL" dirty="0"/>
+              <a:t> </a:t>
+            </a:r>
+            <a:r>
+              <a:rPr lang="pl-PL" dirty="0" err="1"/>
+              <a:t>when</a:t>
+            </a:r>
+            <a:r>
+              <a:rPr lang="pl-PL" dirty="0"/>
+              <a:t> to </a:t>
+            </a:r>
+            <a:r>
+              <a:rPr lang="pl-PL" dirty="0" err="1"/>
+              <a:t>use</a:t>
+            </a:r>
+            <a:r>
+              <a:rPr lang="pl-PL" dirty="0"/>
+              <a:t> </a:t>
+            </a:r>
+            <a:r>
+              <a:rPr lang="pl-PL" dirty="0" err="1"/>
+              <a:t>it</a:t>
+            </a:r>
+            <a:r>
+              <a:rPr lang="pl-PL" dirty="0"/>
+              <a:t>?</a:t>
+            </a:r>
+          </a:p>
+        </p:txBody>
+      </p:sp>
+      <p:sp>
+        <p:nvSpPr>
+          <p:cNvPr id="6" name="Symbol zastępczy zawartości 5">
+            <a:extLst>
+              <a:ext uri="{FF2B5EF4-FFF2-40B4-BE49-F238E27FC236}">
+                <a16:creationId xmlns:a16="http://schemas.microsoft.com/office/drawing/2014/main" id="{2B19FDC3-4F08-43D5-A559-B8ECE5E234C4}"/>
+              </a:ext>
+            </a:extLst>
+          </p:cNvPr>
+          <p:cNvSpPr>
+            <a:spLocks noGrp="1"/>
+          </p:cNvSpPr>
+          <p:nvPr>
+            <p:ph sz="half" idx="2"/>
+          </p:nvPr>
+        </p:nvSpPr>
+        <p:spPr>
+          <a:xfrm>
+            <a:off x="814728" y="2751138"/>
+            <a:ext cx="10200601" cy="3109913"/>
+          </a:xfrm>
+        </p:spPr>
+        <p:txBody>
+          <a:bodyPr>
+            <a:normAutofit/>
+          </a:bodyPr>
+          <a:lstStyle/>
+          <a:p>
+            <a:r>
+              <a:rPr lang="en-US" dirty="0"/>
+              <a:t>Simple repetitive tasks – summarize all expanses on monthly basis, sending email to newly hired employee</a:t>
+            </a:r>
+          </a:p>
+          <a:p>
+            <a:r>
+              <a:rPr lang="en-US" dirty="0"/>
+              <a:t>As integration between two system – adapter pattern</a:t>
+            </a:r>
+          </a:p>
+          <a:p>
+            <a:r>
+              <a:rPr lang="en-US" dirty="0"/>
+              <a:t>As an enricher</a:t>
+            </a:r>
+          </a:p>
+          <a:p>
+            <a:r>
+              <a:rPr lang="en-US" dirty="0"/>
+              <a:t>As a complex validation logic</a:t>
+            </a:r>
+          </a:p>
+        </p:txBody>
+      </p:sp>
+    </p:spTree>
+    <p:extLst>
+      <p:ext uri="{BB962C8B-B14F-4D97-AF65-F5344CB8AC3E}">
+        <p14:creationId xmlns:p14="http://schemas.microsoft.com/office/powerpoint/2010/main" val="3020829362"/>
+      </p:ext>
+    </p:extLst>
+  </p:cSld>
+  <p:clrMapOvr>
+    <a:masterClrMapping/>
+  </p:clrMapOvr>
+</p:sld>
+</file>
+
+<file path=ppt/slides/slide65.xml><?xml version="1.0" encoding="utf-8"?>
+<p:sld xmlns:a="http://schemas.openxmlformats.org/drawingml/2006/main" xmlns:r="http://schemas.openxmlformats.org/officeDocument/2006/relationships" xmlns:p="http://schemas.openxmlformats.org/presentationml/2006/main">
+  <p:cSld>
+    <p:spTree>
+      <p:nvGrpSpPr>
+        <p:cNvPr id="1" name=""/>
+        <p:cNvGrpSpPr/>
+        <p:nvPr/>
+      </p:nvGrpSpPr>
+      <p:grpSpPr>
+        <a:xfrm>
+          <a:off x="0" y="0"/>
+          <a:ext cx="0" cy="0"/>
+          <a:chOff x="0" y="0"/>
+          <a:chExt cx="0" cy="0"/>
+        </a:xfrm>
+      </p:grpSpPr>
+      <p:sp>
+        <p:nvSpPr>
+          <p:cNvPr id="4" name="Tytuł 3">
+            <a:extLst>
+              <a:ext uri="{FF2B5EF4-FFF2-40B4-BE49-F238E27FC236}">
+                <a16:creationId xmlns:a16="http://schemas.microsoft.com/office/drawing/2014/main" id="{FB6DB2D1-04D0-46FF-AACE-3F6DC0B935EC}"/>
+              </a:ext>
+            </a:extLst>
+          </p:cNvPr>
+          <p:cNvSpPr>
+            <a:spLocks noGrp="1"/>
+          </p:cNvSpPr>
+          <p:nvPr>
+            <p:ph type="title"/>
+          </p:nvPr>
+        </p:nvSpPr>
+        <p:spPr/>
+        <p:txBody>
+          <a:bodyPr/>
+          <a:lstStyle/>
+          <a:p>
+            <a:r>
+              <a:rPr lang="pl-PL" dirty="0" err="1"/>
+              <a:t>Logic</a:t>
+            </a:r>
+            <a:r>
+              <a:rPr lang="pl-PL" dirty="0"/>
+              <a:t> </a:t>
+            </a:r>
+            <a:r>
+              <a:rPr lang="pl-PL" dirty="0" err="1"/>
+              <a:t>App</a:t>
+            </a:r>
+            <a:r>
+              <a:rPr lang="pl-PL" dirty="0"/>
+              <a:t> - Demo</a:t>
+            </a:r>
+          </a:p>
+        </p:txBody>
+      </p:sp>
+      <p:sp>
+        <p:nvSpPr>
+          <p:cNvPr id="6" name="Symbol zastępczy zawartości 5">
+            <a:extLst>
+              <a:ext uri="{FF2B5EF4-FFF2-40B4-BE49-F238E27FC236}">
+                <a16:creationId xmlns:a16="http://schemas.microsoft.com/office/drawing/2014/main" id="{2B19FDC3-4F08-43D5-A559-B8ECE5E234C4}"/>
+              </a:ext>
+            </a:extLst>
+          </p:cNvPr>
+          <p:cNvSpPr>
+            <a:spLocks noGrp="1"/>
+          </p:cNvSpPr>
+          <p:nvPr>
+            <p:ph sz="half" idx="2"/>
+          </p:nvPr>
+        </p:nvSpPr>
+        <p:spPr>
+          <a:xfrm>
+            <a:off x="814728" y="2751138"/>
+            <a:ext cx="10200601" cy="3109913"/>
+          </a:xfrm>
+        </p:spPr>
+        <p:txBody>
+          <a:bodyPr>
+            <a:normAutofit/>
+          </a:bodyPr>
+          <a:lstStyle/>
+          <a:p>
+            <a:r>
+              <a:rPr lang="en-US" dirty="0"/>
+              <a:t>Create Logic App</a:t>
+            </a:r>
+          </a:p>
+          <a:p>
+            <a:r>
+              <a:rPr lang="en-US" dirty="0"/>
+              <a:t>Show Possible options</a:t>
+            </a:r>
+          </a:p>
+          <a:p>
+            <a:r>
+              <a:rPr lang="en-US" dirty="0"/>
+              <a:t>Show how to run simple flow</a:t>
+            </a:r>
+          </a:p>
+        </p:txBody>
+      </p:sp>
+    </p:spTree>
+    <p:extLst>
+      <p:ext uri="{BB962C8B-B14F-4D97-AF65-F5344CB8AC3E}">
+        <p14:creationId xmlns:p14="http://schemas.microsoft.com/office/powerpoint/2010/main" val="2125732064"/>
+      </p:ext>
+    </p:extLst>
+  </p:cSld>
+  <p:clrMapOvr>
+    <a:masterClrMapping/>
+  </p:clrMapOvr>
+</p:sld>
+</file>
+
+<file path=ppt/slides/slide66.xml><?xml version="1.0" encoding="utf-8"?>
+<p:sld xmlns:a="http://schemas.openxmlformats.org/drawingml/2006/main" xmlns:r="http://schemas.openxmlformats.org/officeDocument/2006/relationships" xmlns:p="http://schemas.openxmlformats.org/presentationml/2006/main">
+  <p:cSld>
+    <p:spTree>
+      <p:nvGrpSpPr>
+        <p:cNvPr id="1" name=""/>
+        <p:cNvGrpSpPr/>
+        <p:nvPr/>
+      </p:nvGrpSpPr>
+      <p:grpSpPr>
+        <a:xfrm>
+          <a:off x="0" y="0"/>
+          <a:ext cx="0" cy="0"/>
+          <a:chOff x="0" y="0"/>
+          <a:chExt cx="0" cy="0"/>
+        </a:xfrm>
+      </p:grpSpPr>
+      <p:sp>
+        <p:nvSpPr>
+          <p:cNvPr id="4" name="Tytuł 3">
+            <a:extLst>
+              <a:ext uri="{FF2B5EF4-FFF2-40B4-BE49-F238E27FC236}">
+                <a16:creationId xmlns:a16="http://schemas.microsoft.com/office/drawing/2014/main" id="{FB6DB2D1-04D0-46FF-AACE-3F6DC0B935EC}"/>
+              </a:ext>
+            </a:extLst>
+          </p:cNvPr>
+          <p:cNvSpPr>
+            <a:spLocks noGrp="1"/>
+          </p:cNvSpPr>
+          <p:nvPr>
+            <p:ph type="title"/>
+          </p:nvPr>
+        </p:nvSpPr>
+        <p:spPr/>
+        <p:txBody>
+          <a:bodyPr/>
+          <a:lstStyle/>
+          <a:p>
+            <a:r>
+              <a:rPr lang="en-US" dirty="0"/>
+              <a:t>Logic App – Exercises</a:t>
+            </a:r>
+          </a:p>
+        </p:txBody>
+      </p:sp>
+      <p:sp>
+        <p:nvSpPr>
+          <p:cNvPr id="6" name="Symbol zastępczy zawartości 5">
+            <a:extLst>
+              <a:ext uri="{FF2B5EF4-FFF2-40B4-BE49-F238E27FC236}">
+                <a16:creationId xmlns:a16="http://schemas.microsoft.com/office/drawing/2014/main" id="{2B19FDC3-4F08-43D5-A559-B8ECE5E234C4}"/>
+              </a:ext>
+            </a:extLst>
+          </p:cNvPr>
+          <p:cNvSpPr>
+            <a:spLocks noGrp="1"/>
+          </p:cNvSpPr>
+          <p:nvPr>
+            <p:ph sz="half" idx="2"/>
+          </p:nvPr>
+        </p:nvSpPr>
+        <p:spPr>
+          <a:xfrm>
+            <a:off x="814728" y="2751138"/>
+            <a:ext cx="10200601" cy="3109913"/>
+          </a:xfrm>
+        </p:spPr>
+        <p:txBody>
+          <a:bodyPr>
+            <a:normAutofit/>
+          </a:bodyPr>
+          <a:lstStyle/>
+          <a:p>
             <a:pPr>
               <a:buFont typeface="+mj-lt"/>
               <a:buAutoNum type="arabicPeriod"/>
             </a:pPr>
             <a:r>
               <a:rPr lang="en-US" dirty="0"/>
-              <a:t>Create Logic App</a:t>
+              <a:t>Create Logic App with HTTP entry point</a:t>
             </a:r>
           </a:p>
           <a:p>
@@ -20696,7 +21255,7 @@
             </a:pPr>
             <a:r>
               <a:rPr lang="en-US" dirty="0"/>
-              <a:t>As entry point create Event Grid trigger</a:t>
+              <a:t>Entry points should receive PESEL, full name and email</a:t>
             </a:r>
           </a:p>
           <a:p>
@@ -20706,15 +21265,7 @@
             </a:pPr>
             <a:r>
               <a:rPr lang="en-US" dirty="0"/>
-              <a:t>Events from </a:t>
-            </a:r>
-            <a:r>
-              <a:rPr lang="en-US" dirty="0" err="1"/>
-              <a:t>PersonHired</a:t>
-            </a:r>
-            <a:r>
-              <a:rPr lang="en-US" dirty="0"/>
-              <a:t> custom topic should cause Logic App to run</a:t>
+              <a:t>Validate PESEL with function</a:t>
             </a:r>
           </a:p>
           <a:p>
@@ -20724,7 +21275,7 @@
             </a:pPr>
             <a:r>
               <a:rPr lang="en-US" dirty="0"/>
-              <a:t>We should extract information from the event</a:t>
+              <a:t>If succeed, send email to person and add full name to Google/Excel workbook</a:t>
             </a:r>
           </a:p>
           <a:p>
@@ -20734,33 +21285,8 @@
             </a:pPr>
             <a:r>
               <a:rPr lang="en-US" dirty="0"/>
-              <a:t>Use it to send email saying Hello to newly hired person</a:t>
-            </a:r>
-          </a:p>
-          <a:p>
-            <a:pPr>
-              <a:buFont typeface="+mj-lt"/>
-              <a:buAutoNum type="arabicPeriod"/>
-            </a:pPr>
-            <a:r>
-              <a:rPr lang="en-US" dirty="0"/>
-              <a:t>Add newly hired person to Excel/Google Sheet</a:t>
-            </a:r>
-          </a:p>
-          <a:p>
-            <a:pPr>
-              <a:buFont typeface="+mj-lt"/>
-              <a:buAutoNum type="arabicPeriod"/>
-            </a:pPr>
-            <a:r>
-              <a:rPr lang="en-US" dirty="0"/>
-              <a:t>Generate new Event: </a:t>
-            </a:r>
-            <a:r>
-              <a:rPr lang="en-US" dirty="0" err="1"/>
-              <a:t>PersonNotified</a:t>
-            </a:r>
-            <a:endParaRPr lang="en-US" dirty="0"/>
+              <a:t>Generate new Event if</a:t>
+            </a:r>
           </a:p>
         </p:txBody>
       </p:sp>
@@ -20777,7 +21303,7 @@
 </p:sld>
 </file>
 
-<file path=ppt/slides/slide63.xml><?xml version="1.0" encoding="utf-8"?>
+<file path=ppt/slides/slide67.xml><?xml version="1.0" encoding="utf-8"?>
 <p:sld xmlns:a="http://schemas.openxmlformats.org/drawingml/2006/main" xmlns:r="http://schemas.openxmlformats.org/officeDocument/2006/relationships" xmlns:p="http://schemas.openxmlformats.org/presentationml/2006/main">
   <p:cSld>
     <p:spTree>
@@ -21009,7 +21535,7 @@
           <a:ln/>
           <a:extLst>
             <a:ext uri="{91240B29-F687-4f45-9708-019B960494DF}">
-              <a14:hiddenLine xmlns="" xmlns:a16="http://schemas.microsoft.com/office/drawing/2014/main" xmlns:p14="http://schemas.microsoft.com/office/powerpoint/2010/main" xmlns:a14="http://schemas.microsoft.com/office/drawing/2010/main" w="9525">
+              <a14:hiddenLine xmlns:a14="http://schemas.microsoft.com/office/drawing/2010/main" xmlns:p14="http://schemas.microsoft.com/office/powerpoint/2010/main" xmlns:a16="http://schemas.microsoft.com/office/drawing/2014/main" xmlns="" w="9525">
                 <a:solidFill>
                   <a:srgbClr val="000000"/>
                 </a:solidFill>

</xml_diff>